<commit_message>
updating presentation after group call
</commit_message>
<xml_diff>
--- a/Presentation/GiterDun Presentation.pptx
+++ b/Presentation/GiterDun Presentation.pptx
@@ -5,18 +5,19 @@
     <p:sldMasterId id="2147483648" r:id="rId1"/>
   </p:sldMasterIdLst>
   <p:notesMasterIdLst>
-    <p:notesMasterId r:id="rId11"/>
+    <p:notesMasterId r:id="rId12"/>
   </p:notesMasterIdLst>
   <p:sldIdLst>
     <p:sldId id="258" r:id="rId2"/>
-    <p:sldId id="257" r:id="rId3"/>
-    <p:sldId id="733" r:id="rId4"/>
+    <p:sldId id="733" r:id="rId3"/>
+    <p:sldId id="257" r:id="rId4"/>
     <p:sldId id="736" r:id="rId5"/>
     <p:sldId id="737" r:id="rId6"/>
     <p:sldId id="735" r:id="rId7"/>
     <p:sldId id="740" r:id="rId8"/>
     <p:sldId id="741" r:id="rId9"/>
-    <p:sldId id="742" r:id="rId10"/>
+    <p:sldId id="743" r:id="rId10"/>
+    <p:sldId id="742" r:id="rId11"/>
   </p:sldIdLst>
   <p:sldSz cx="12192000" cy="6858000"/>
   <p:notesSz cx="6858000" cy="9144000"/>
@@ -1136,7 +1137,7 @@
           <a:p>
             <a:fld id="{7F220CB7-DCA5-4E5B-97F1-300CDD8D2AAB}" type="slidenum">
               <a:rPr lang="en-US" smtClean="0"/>
-              <a:t>3</a:t>
+              <a:t>2</a:t>
             </a:fld>
             <a:endParaRPr lang="en-US" dirty="0"/>
           </a:p>
@@ -8666,7 +8667,7 @@
 </p:sld>
 </file>
 
-<file path=ppt/slides/slide2.xml><?xml version="1.0" encoding="utf-8"?>
+<file path=ppt/slides/slide10.xml><?xml version="1.0" encoding="utf-8"?>
 <p:sld xmlns:a="http://schemas.openxmlformats.org/drawingml/2006/main" xmlns:r="http://schemas.openxmlformats.org/officeDocument/2006/relationships" xmlns:p="http://schemas.openxmlformats.org/presentationml/2006/main">
   <p:cSld>
     <p:spTree>
@@ -8685,377 +8686,54 @@
       </p:grpSpPr>
       <p:sp>
         <p:nvSpPr>
-          <p:cNvPr id="8" name="Rectangle 7">
+          <p:cNvPr id="2" name="Title 1">
             <a:extLst>
               <a:ext uri="{FF2B5EF4-FFF2-40B4-BE49-F238E27FC236}">
-                <a16:creationId xmlns:a16="http://schemas.microsoft.com/office/drawing/2014/main" id="{2F10420F-32EA-4759-B1A9-986EDF27F452}"/>
-              </a:ext>
-              <a:ext uri="{C183D7F6-B498-43B3-948B-1728B52AA6E4}">
-                <adec:decorative xmlns:adec="http://schemas.microsoft.com/office/drawing/2017/decorative" val="1"/>
+                <a16:creationId xmlns:a16="http://schemas.microsoft.com/office/drawing/2014/main" id="{6A22A7E4-5C91-4AE1-9A37-1DE12AC7695D}"/>
               </a:ext>
             </a:extLst>
           </p:cNvPr>
-          <p:cNvSpPr/>
-          <p:nvPr/>
+          <p:cNvSpPr>
+            <a:spLocks noGrp="1"/>
+          </p:cNvSpPr>
+          <p:nvPr>
+            <p:ph type="title"/>
+          </p:nvPr>
         </p:nvSpPr>
         <p:spPr>
           <a:xfrm>
-            <a:off x="0" y="0"/>
-            <a:ext cx="12192000" cy="6858000"/>
-          </a:xfrm>
-          <a:prstGeom prst="rect">
-            <a:avLst/>
-          </a:prstGeom>
-          <a:solidFill>
-            <a:schemeClr val="tx1">
-              <a:alpha val="75000"/>
-            </a:schemeClr>
-          </a:solidFill>
-          <a:ln>
-            <a:noFill/>
-          </a:ln>
-        </p:spPr>
-        <p:style>
-          <a:lnRef idx="2">
-            <a:schemeClr val="accent1">
-              <a:shade val="50000"/>
-            </a:schemeClr>
-          </a:lnRef>
-          <a:fillRef idx="1">
-            <a:schemeClr val="accent1"/>
-          </a:fillRef>
-          <a:effectRef idx="0">
-            <a:schemeClr val="accent1"/>
-          </a:effectRef>
-          <a:fontRef idx="minor">
-            <a:schemeClr val="lt1"/>
-          </a:fontRef>
-        </p:style>
+            <a:off x="838200" y="365125"/>
+            <a:ext cx="10515600" cy="5647748"/>
+          </a:xfrm>
+        </p:spPr>
         <p:txBody>
-          <a:bodyPr rtlCol="0" anchor="ctr"/>
-          <a:lstStyle/>
-          <a:p>
-            <a:pPr algn="ctr"/>
-            <a:endParaRPr lang="en-US" dirty="0"/>
-          </a:p>
-        </p:txBody>
-      </p:sp>
-      <p:sp>
-        <p:nvSpPr>
-          <p:cNvPr id="4" name="TextBox 3">
-            <a:extLst>
-              <a:ext uri="{FF2B5EF4-FFF2-40B4-BE49-F238E27FC236}">
-                <a16:creationId xmlns:a16="http://schemas.microsoft.com/office/drawing/2014/main" id="{8FB63A66-C91E-416C-B0B5-A4298180E154}"/>
-              </a:ext>
-            </a:extLst>
-          </p:cNvPr>
-          <p:cNvSpPr txBox="1"/>
-          <p:nvPr/>
-        </p:nvSpPr>
-        <p:spPr>
-          <a:xfrm>
-            <a:off x="6957476" y="2886741"/>
-            <a:ext cx="3623472" cy="486287"/>
-          </a:xfrm>
-          <a:prstGeom prst="rect">
-            <a:avLst/>
-          </a:prstGeom>
-          <a:noFill/>
-        </p:spPr>
-        <p:txBody>
-          <a:bodyPr wrap="square" rtlCol="0">
-            <a:spAutoFit/>
+          <a:bodyPr>
+            <a:normAutofit/>
           </a:bodyPr>
           <a:lstStyle/>
           <a:p>
-            <a:pPr>
-              <a:lnSpc>
-                <a:spcPct val="80000"/>
-              </a:lnSpc>
-            </a:pPr>
+            <a:pPr algn="ctr"/>
             <a:r>
-              <a:rPr lang="en-US" sz="3200" b="1" dirty="0">
-                <a:solidFill>
-                  <a:schemeClr val="accent1"/>
-                </a:solidFill>
-                <a:latin typeface="Lato Black" panose="020F0502020204030203" pitchFamily="34" charset="0"/>
-                <a:ea typeface="Lato Black" panose="020F0502020204030203" pitchFamily="34" charset="0"/>
-                <a:cs typeface="Lato Black" panose="020F0502020204030203" pitchFamily="34" charset="0"/>
-              </a:rPr>
-              <a:t>Mission</a:t>
+              <a:rPr lang="en-US" sz="11500" dirty="0"/>
+              <a:t>Questions?</a:t>
             </a:r>
           </a:p>
         </p:txBody>
       </p:sp>
-      <p:sp>
-        <p:nvSpPr>
-          <p:cNvPr id="5" name="Rectangle 4">
-            <a:extLst>
-              <a:ext uri="{FF2B5EF4-FFF2-40B4-BE49-F238E27FC236}">
-                <a16:creationId xmlns:a16="http://schemas.microsoft.com/office/drawing/2014/main" id="{BD30D1AC-96B4-4AE4-8389-B6B62B4DC9FC}"/>
-              </a:ext>
-            </a:extLst>
-          </p:cNvPr>
-          <p:cNvSpPr/>
-          <p:nvPr/>
-        </p:nvSpPr>
-        <p:spPr>
-          <a:xfrm>
-            <a:off x="6957476" y="3638354"/>
-            <a:ext cx="3961291" cy="843949"/>
-          </a:xfrm>
-          <a:prstGeom prst="rect">
-            <a:avLst/>
-          </a:prstGeom>
-        </p:spPr>
-        <p:txBody>
-          <a:bodyPr wrap="square">
-            <a:spAutoFit/>
-          </a:bodyPr>
-          <a:lstStyle/>
-          <a:p>
-            <a:pPr algn="just">
-              <a:lnSpc>
-                <a:spcPct val="120000"/>
-              </a:lnSpc>
-            </a:pPr>
-            <a:r>
-              <a:rPr lang="en-US" sz="1400" b="1" dirty="0" err="1">
-                <a:solidFill>
-                  <a:schemeClr val="accent1"/>
-                </a:solidFill>
-                <a:latin typeface="Lato" panose="020F0502020204030203" pitchFamily="34" charset="0"/>
-                <a:ea typeface="Lato" panose="020F0502020204030203" pitchFamily="34" charset="0"/>
-                <a:cs typeface="Lato" panose="020F0502020204030203" pitchFamily="34" charset="0"/>
-              </a:rPr>
-              <a:t>Giter</a:t>
-            </a:r>
-            <a:r>
-              <a:rPr lang="en-US" sz="1400" b="1" dirty="0">
-                <a:solidFill>
-                  <a:schemeClr val="accent1"/>
-                </a:solidFill>
-                <a:latin typeface="Lato" panose="020F0502020204030203" pitchFamily="34" charset="0"/>
-                <a:ea typeface="Lato" panose="020F0502020204030203" pitchFamily="34" charset="0"/>
-                <a:cs typeface="Lato" panose="020F0502020204030203" pitchFamily="34" charset="0"/>
-              </a:rPr>
-              <a:t> Dun </a:t>
-            </a:r>
-            <a:r>
-              <a:rPr lang="en-US" sz="1400" dirty="0">
-                <a:solidFill>
-                  <a:schemeClr val="bg1"/>
-                </a:solidFill>
-                <a:latin typeface="Lato" panose="020F0502020204030203" pitchFamily="34" charset="0"/>
-                <a:ea typeface="Lato" panose="020F0502020204030203" pitchFamily="34" charset="0"/>
-                <a:cs typeface="Lato" panose="020F0502020204030203" pitchFamily="34" charset="0"/>
-              </a:rPr>
-              <a:t>analyzes startup / early-stage company datasets to identify shared traits and characteristics across the companies.</a:t>
-            </a:r>
-          </a:p>
-        </p:txBody>
-      </p:sp>
-      <p:pic>
-        <p:nvPicPr>
-          <p:cNvPr id="7" name="Picture 6">
-            <a:extLst>
-              <a:ext uri="{FF2B5EF4-FFF2-40B4-BE49-F238E27FC236}">
-                <a16:creationId xmlns:a16="http://schemas.microsoft.com/office/drawing/2014/main" id="{8402F3A6-D4E9-4D66-86DF-1C07BA872196}"/>
-              </a:ext>
-            </a:extLst>
-          </p:cNvPr>
-          <p:cNvPicPr>
-            <a:picLocks noChangeAspect="1"/>
-          </p:cNvPicPr>
-          <p:nvPr/>
-        </p:nvPicPr>
-        <p:blipFill>
-          <a:blip r:embed="rId2"/>
-          <a:stretch>
-            <a:fillRect/>
-          </a:stretch>
-        </p:blipFill>
-        <p:spPr>
-          <a:xfrm>
-            <a:off x="466898" y="2488275"/>
-            <a:ext cx="3843251" cy="3843251"/>
-          </a:xfrm>
-          <a:prstGeom prst="rect">
-            <a:avLst/>
-          </a:prstGeom>
-        </p:spPr>
-      </p:pic>
     </p:spTree>
     <p:extLst>
       <p:ext uri="{BB962C8B-B14F-4D97-AF65-F5344CB8AC3E}">
-        <p14:creationId xmlns:p14="http://schemas.microsoft.com/office/powerpoint/2010/main" val="1234639270"/>
+        <p14:creationId xmlns:p14="http://schemas.microsoft.com/office/powerpoint/2010/main" val="1512139714"/>
       </p:ext>
     </p:extLst>
   </p:cSld>
   <p:clrMapOvr>
     <a:masterClrMapping/>
   </p:clrMapOvr>
-  <p:timing>
-    <p:tnLst>
-      <p:par>
-        <p:cTn id="1" dur="indefinite" restart="never" nodeType="tmRoot">
-          <p:childTnLst>
-            <p:seq concurrent="1" nextAc="seek">
-              <p:cTn id="2" dur="indefinite" nodeType="mainSeq">
-                <p:childTnLst>
-                  <p:par>
-                    <p:cTn id="3" fill="hold">
-                      <p:stCondLst>
-                        <p:cond delay="indefinite"/>
-                        <p:cond evt="onBegin" delay="0">
-                          <p:tn val="2"/>
-                        </p:cond>
-                      </p:stCondLst>
-                      <p:childTnLst>
-                        <p:par>
-                          <p:cTn id="4" fill="hold">
-                            <p:stCondLst>
-                              <p:cond delay="0"/>
-                            </p:stCondLst>
-                            <p:childTnLst>
-                              <p:par>
-                                <p:cTn id="5" presetID="12" presetClass="entr" presetSubtype="8" fill="hold" grpId="0" nodeType="withEffect">
-                                  <p:stCondLst>
-                                    <p:cond delay="0"/>
-                                  </p:stCondLst>
-                                  <p:childTnLst>
-                                    <p:set>
-                                      <p:cBhvr>
-                                        <p:cTn id="6" dur="1" fill="hold">
-                                          <p:stCondLst>
-                                            <p:cond delay="0"/>
-                                          </p:stCondLst>
-                                        </p:cTn>
-                                        <p:tgtEl>
-                                          <p:spTgt spid="4"/>
-                                        </p:tgtEl>
-                                        <p:attrNameLst>
-                                          <p:attrName>style.visibility</p:attrName>
-                                        </p:attrNameLst>
-                                      </p:cBhvr>
-                                      <p:to>
-                                        <p:strVal val="visible"/>
-                                      </p:to>
-                                    </p:set>
-                                    <p:anim calcmode="lin" valueType="num">
-                                      <p:cBhvr additive="base">
-                                        <p:cTn id="7" dur="500"/>
-                                        <p:tgtEl>
-                                          <p:spTgt spid="4"/>
-                                        </p:tgtEl>
-                                        <p:attrNameLst>
-                                          <p:attrName>ppt_x</p:attrName>
-                                        </p:attrNameLst>
-                                      </p:cBhvr>
-                                      <p:tavLst>
-                                        <p:tav tm="0">
-                                          <p:val>
-                                            <p:strVal val="#ppt_x-#ppt_w*1.125000"/>
-                                          </p:val>
-                                        </p:tav>
-                                        <p:tav tm="100000">
-                                          <p:val>
-                                            <p:strVal val="#ppt_x"/>
-                                          </p:val>
-                                        </p:tav>
-                                      </p:tavLst>
-                                    </p:anim>
-                                    <p:animEffect transition="in" filter="wipe(right)">
-                                      <p:cBhvr>
-                                        <p:cTn id="8" dur="500"/>
-                                        <p:tgtEl>
-                                          <p:spTgt spid="4"/>
-                                        </p:tgtEl>
-                                      </p:cBhvr>
-                                    </p:animEffect>
-                                  </p:childTnLst>
-                                </p:cTn>
-                              </p:par>
-                            </p:childTnLst>
-                          </p:cTn>
-                        </p:par>
-                        <p:par>
-                          <p:cTn id="9" fill="hold">
-                            <p:stCondLst>
-                              <p:cond delay="500"/>
-                            </p:stCondLst>
-                            <p:childTnLst>
-                              <p:par>
-                                <p:cTn id="10" presetID="10" presetClass="entr" presetSubtype="0" fill="hold" grpId="0" nodeType="afterEffect">
-                                  <p:stCondLst>
-                                    <p:cond delay="0"/>
-                                  </p:stCondLst>
-                                  <p:childTnLst>
-                                    <p:set>
-                                      <p:cBhvr>
-                                        <p:cTn id="11" dur="1" fill="hold">
-                                          <p:stCondLst>
-                                            <p:cond delay="0"/>
-                                          </p:stCondLst>
-                                        </p:cTn>
-                                        <p:tgtEl>
-                                          <p:spTgt spid="5"/>
-                                        </p:tgtEl>
-                                        <p:attrNameLst>
-                                          <p:attrName>style.visibility</p:attrName>
-                                        </p:attrNameLst>
-                                      </p:cBhvr>
-                                      <p:to>
-                                        <p:strVal val="visible"/>
-                                      </p:to>
-                                    </p:set>
-                                    <p:animEffect transition="in" filter="fade">
-                                      <p:cBhvr>
-                                        <p:cTn id="12" dur="750"/>
-                                        <p:tgtEl>
-                                          <p:spTgt spid="5"/>
-                                        </p:tgtEl>
-                                      </p:cBhvr>
-                                    </p:animEffect>
-                                  </p:childTnLst>
-                                </p:cTn>
-                              </p:par>
-                            </p:childTnLst>
-                          </p:cTn>
-                        </p:par>
-                      </p:childTnLst>
-                    </p:cTn>
-                  </p:par>
-                </p:childTnLst>
-              </p:cTn>
-              <p:prevCondLst>
-                <p:cond evt="onPrev" delay="0">
-                  <p:tgtEl>
-                    <p:sldTgt/>
-                  </p:tgtEl>
-                </p:cond>
-              </p:prevCondLst>
-              <p:nextCondLst>
-                <p:cond evt="onNext" delay="0">
-                  <p:tgtEl>
-                    <p:sldTgt/>
-                  </p:tgtEl>
-                </p:cond>
-              </p:nextCondLst>
-            </p:seq>
-          </p:childTnLst>
-        </p:cTn>
-      </p:par>
-    </p:tnLst>
-    <p:bldLst>
-      <p:bldP spid="4" grpId="0"/>
-      <p:bldP spid="5" grpId="0"/>
-    </p:bldLst>
-  </p:timing>
 </p:sld>
 </file>
 
-<file path=ppt/slides/slide3.xml><?xml version="1.0" encoding="utf-8"?>
+<file path=ppt/slides/slide2.xml><?xml version="1.0" encoding="utf-8"?>
 <p:sld xmlns:a="http://schemas.openxmlformats.org/drawingml/2006/main" xmlns:r="http://schemas.openxmlformats.org/officeDocument/2006/relationships" xmlns:p="http://schemas.openxmlformats.org/presentationml/2006/main">
   <p:cSld>
     <p:spTree>
@@ -10866,6 +10544,461 @@
 </p:sld>
 </file>
 
+<file path=ppt/slides/slide3.xml><?xml version="1.0" encoding="utf-8"?>
+<p:sld xmlns:a="http://schemas.openxmlformats.org/drawingml/2006/main" xmlns:r="http://schemas.openxmlformats.org/officeDocument/2006/relationships" xmlns:p="http://schemas.openxmlformats.org/presentationml/2006/main">
+  <p:cSld>
+    <p:spTree>
+      <p:nvGrpSpPr>
+        <p:cNvPr id="1" name=""/>
+        <p:cNvGrpSpPr/>
+        <p:nvPr/>
+      </p:nvGrpSpPr>
+      <p:grpSpPr>
+        <a:xfrm>
+          <a:off x="0" y="0"/>
+          <a:ext cx="0" cy="0"/>
+          <a:chOff x="0" y="0"/>
+          <a:chExt cx="0" cy="0"/>
+        </a:xfrm>
+      </p:grpSpPr>
+      <p:sp>
+        <p:nvSpPr>
+          <p:cNvPr id="8" name="Rectangle 7">
+            <a:extLst>
+              <a:ext uri="{FF2B5EF4-FFF2-40B4-BE49-F238E27FC236}">
+                <a16:creationId xmlns:a16="http://schemas.microsoft.com/office/drawing/2014/main" id="{2F10420F-32EA-4759-B1A9-986EDF27F452}"/>
+              </a:ext>
+              <a:ext uri="{C183D7F6-B498-43B3-948B-1728B52AA6E4}">
+                <adec:decorative xmlns:adec="http://schemas.microsoft.com/office/drawing/2017/decorative" val="1"/>
+              </a:ext>
+            </a:extLst>
+          </p:cNvPr>
+          <p:cNvSpPr/>
+          <p:nvPr/>
+        </p:nvSpPr>
+        <p:spPr>
+          <a:xfrm>
+            <a:off x="0" y="0"/>
+            <a:ext cx="12192000" cy="6858000"/>
+          </a:xfrm>
+          <a:prstGeom prst="rect">
+            <a:avLst/>
+          </a:prstGeom>
+          <a:solidFill>
+            <a:schemeClr val="tx1">
+              <a:alpha val="75000"/>
+            </a:schemeClr>
+          </a:solidFill>
+          <a:ln>
+            <a:noFill/>
+          </a:ln>
+        </p:spPr>
+        <p:style>
+          <a:lnRef idx="2">
+            <a:schemeClr val="accent1">
+              <a:shade val="50000"/>
+            </a:schemeClr>
+          </a:lnRef>
+          <a:fillRef idx="1">
+            <a:schemeClr val="accent1"/>
+          </a:fillRef>
+          <a:effectRef idx="0">
+            <a:schemeClr val="accent1"/>
+          </a:effectRef>
+          <a:fontRef idx="minor">
+            <a:schemeClr val="lt1"/>
+          </a:fontRef>
+        </p:style>
+        <p:txBody>
+          <a:bodyPr rtlCol="0" anchor="ctr"/>
+          <a:lstStyle/>
+          <a:p>
+            <a:pPr algn="ctr"/>
+            <a:endParaRPr lang="en-US" dirty="0"/>
+          </a:p>
+        </p:txBody>
+      </p:sp>
+      <p:sp>
+        <p:nvSpPr>
+          <p:cNvPr id="4" name="TextBox 3">
+            <a:extLst>
+              <a:ext uri="{FF2B5EF4-FFF2-40B4-BE49-F238E27FC236}">
+                <a16:creationId xmlns:a16="http://schemas.microsoft.com/office/drawing/2014/main" id="{8FB63A66-C91E-416C-B0B5-A4298180E154}"/>
+              </a:ext>
+            </a:extLst>
+          </p:cNvPr>
+          <p:cNvSpPr txBox="1"/>
+          <p:nvPr/>
+        </p:nvSpPr>
+        <p:spPr>
+          <a:xfrm>
+            <a:off x="6957476" y="2886741"/>
+            <a:ext cx="3623472" cy="486287"/>
+          </a:xfrm>
+          <a:prstGeom prst="rect">
+            <a:avLst/>
+          </a:prstGeom>
+          <a:noFill/>
+        </p:spPr>
+        <p:txBody>
+          <a:bodyPr wrap="square" rtlCol="0">
+            <a:spAutoFit/>
+          </a:bodyPr>
+          <a:lstStyle/>
+          <a:p>
+            <a:pPr>
+              <a:lnSpc>
+                <a:spcPct val="80000"/>
+              </a:lnSpc>
+            </a:pPr>
+            <a:r>
+              <a:rPr lang="en-US" sz="3200" b="1" dirty="0">
+                <a:solidFill>
+                  <a:schemeClr val="accent1"/>
+                </a:solidFill>
+                <a:latin typeface="Lato Black" panose="020F0502020204030203" pitchFamily="34" charset="0"/>
+                <a:ea typeface="Lato Black" panose="020F0502020204030203" pitchFamily="34" charset="0"/>
+                <a:cs typeface="Lato Black" panose="020F0502020204030203" pitchFamily="34" charset="0"/>
+              </a:rPr>
+              <a:t>Mission</a:t>
+            </a:r>
+          </a:p>
+        </p:txBody>
+      </p:sp>
+      <p:sp>
+        <p:nvSpPr>
+          <p:cNvPr id="5" name="Rectangle 4">
+            <a:extLst>
+              <a:ext uri="{FF2B5EF4-FFF2-40B4-BE49-F238E27FC236}">
+                <a16:creationId xmlns:a16="http://schemas.microsoft.com/office/drawing/2014/main" id="{BD30D1AC-96B4-4AE4-8389-B6B62B4DC9FC}"/>
+              </a:ext>
+            </a:extLst>
+          </p:cNvPr>
+          <p:cNvSpPr/>
+          <p:nvPr/>
+        </p:nvSpPr>
+        <p:spPr>
+          <a:xfrm>
+            <a:off x="6957476" y="3638354"/>
+            <a:ext cx="3961291" cy="2653675"/>
+          </a:xfrm>
+          <a:prstGeom prst="rect">
+            <a:avLst/>
+          </a:prstGeom>
+        </p:spPr>
+        <p:txBody>
+          <a:bodyPr wrap="square">
+            <a:spAutoFit/>
+          </a:bodyPr>
+          <a:lstStyle/>
+          <a:p>
+            <a:pPr algn="just">
+              <a:lnSpc>
+                <a:spcPct val="120000"/>
+              </a:lnSpc>
+            </a:pPr>
+            <a:r>
+              <a:rPr lang="en-US" sz="1400" b="1" dirty="0" err="1">
+                <a:solidFill>
+                  <a:schemeClr val="accent1"/>
+                </a:solidFill>
+                <a:latin typeface="Lato" panose="020F0502020204030203" pitchFamily="34" charset="0"/>
+                <a:ea typeface="Lato" panose="020F0502020204030203" pitchFamily="34" charset="0"/>
+                <a:cs typeface="Lato" panose="020F0502020204030203" pitchFamily="34" charset="0"/>
+              </a:rPr>
+              <a:t>Giter</a:t>
+            </a:r>
+            <a:r>
+              <a:rPr lang="en-US" sz="1400" b="1" dirty="0">
+                <a:solidFill>
+                  <a:schemeClr val="accent1"/>
+                </a:solidFill>
+                <a:latin typeface="Lato" panose="020F0502020204030203" pitchFamily="34" charset="0"/>
+                <a:ea typeface="Lato" panose="020F0502020204030203" pitchFamily="34" charset="0"/>
+                <a:cs typeface="Lato" panose="020F0502020204030203" pitchFamily="34" charset="0"/>
+              </a:rPr>
+              <a:t> Dun </a:t>
+            </a:r>
+            <a:r>
+              <a:rPr lang="en-US" sz="1400" dirty="0">
+                <a:solidFill>
+                  <a:schemeClr val="bg1"/>
+                </a:solidFill>
+                <a:latin typeface="Lato" panose="020F0502020204030203" pitchFamily="34" charset="0"/>
+                <a:ea typeface="Lato" panose="020F0502020204030203" pitchFamily="34" charset="0"/>
+                <a:cs typeface="Lato" panose="020F0502020204030203" pitchFamily="34" charset="0"/>
+              </a:rPr>
+              <a:t>analyzes startup / early-stage company datasets to identify shared traits and characteristics across the companies.</a:t>
+            </a:r>
+          </a:p>
+          <a:p>
+            <a:pPr algn="just">
+              <a:lnSpc>
+                <a:spcPct val="120000"/>
+              </a:lnSpc>
+            </a:pPr>
+            <a:endParaRPr lang="en-US" sz="1400" dirty="0">
+              <a:solidFill>
+                <a:schemeClr val="bg1"/>
+              </a:solidFill>
+              <a:latin typeface="Lato" panose="020F0502020204030203" pitchFamily="34" charset="0"/>
+              <a:ea typeface="Lato" panose="020F0502020204030203" pitchFamily="34" charset="0"/>
+              <a:cs typeface="Lato" panose="020F0502020204030203" pitchFamily="34" charset="0"/>
+            </a:endParaRPr>
+          </a:p>
+          <a:p>
+            <a:pPr algn="just">
+              <a:lnSpc>
+                <a:spcPct val="120000"/>
+              </a:lnSpc>
+            </a:pPr>
+            <a:endParaRPr lang="en-US" sz="1400" dirty="0">
+              <a:solidFill>
+                <a:schemeClr val="bg1"/>
+              </a:solidFill>
+              <a:latin typeface="Lato" panose="020F0502020204030203" pitchFamily="34" charset="0"/>
+              <a:ea typeface="Lato" panose="020F0502020204030203" pitchFamily="34" charset="0"/>
+              <a:cs typeface="Lato" panose="020F0502020204030203" pitchFamily="34" charset="0"/>
+            </a:endParaRPr>
+          </a:p>
+          <a:p>
+            <a:pPr algn="just">
+              <a:lnSpc>
+                <a:spcPct val="120000"/>
+              </a:lnSpc>
+            </a:pPr>
+            <a:r>
+              <a:rPr lang="en-US" sz="1400" dirty="0">
+                <a:solidFill>
+                  <a:srgbClr val="FF0000"/>
+                </a:solidFill>
+                <a:latin typeface="Lato" panose="020F0502020204030203" pitchFamily="34" charset="0"/>
+                <a:ea typeface="Lato" panose="020F0502020204030203" pitchFamily="34" charset="0"/>
+                <a:cs typeface="Lato" panose="020F0502020204030203" pitchFamily="34" charset="0"/>
+              </a:rPr>
+              <a:t>Describe the core message or hypothesis for your project.</a:t>
+            </a:r>
+          </a:p>
+          <a:p>
+            <a:pPr algn="just">
+              <a:lnSpc>
+                <a:spcPct val="120000"/>
+              </a:lnSpc>
+            </a:pPr>
+            <a:r>
+              <a:rPr lang="en-US" sz="1400" dirty="0">
+                <a:solidFill>
+                  <a:srgbClr val="FF0000"/>
+                </a:solidFill>
+                <a:latin typeface="Lato" panose="020F0502020204030203" pitchFamily="34" charset="0"/>
+                <a:ea typeface="Lato" panose="020F0502020204030203" pitchFamily="34" charset="0"/>
+                <a:cs typeface="Lato" panose="020F0502020204030203" pitchFamily="34" charset="0"/>
+              </a:rPr>
+              <a:t>Describe the questions you and your group found interesting, and what motivated you to answer them</a:t>
+            </a:r>
+          </a:p>
+        </p:txBody>
+      </p:sp>
+      <p:pic>
+        <p:nvPicPr>
+          <p:cNvPr id="7" name="Picture 6">
+            <a:extLst>
+              <a:ext uri="{FF2B5EF4-FFF2-40B4-BE49-F238E27FC236}">
+                <a16:creationId xmlns:a16="http://schemas.microsoft.com/office/drawing/2014/main" id="{8402F3A6-D4E9-4D66-86DF-1C07BA872196}"/>
+              </a:ext>
+            </a:extLst>
+          </p:cNvPr>
+          <p:cNvPicPr>
+            <a:picLocks noChangeAspect="1"/>
+          </p:cNvPicPr>
+          <p:nvPr/>
+        </p:nvPicPr>
+        <p:blipFill>
+          <a:blip r:embed="rId2"/>
+          <a:stretch>
+            <a:fillRect/>
+          </a:stretch>
+        </p:blipFill>
+        <p:spPr>
+          <a:xfrm>
+            <a:off x="466898" y="2488275"/>
+            <a:ext cx="3843251" cy="3843251"/>
+          </a:xfrm>
+          <a:prstGeom prst="rect">
+            <a:avLst/>
+          </a:prstGeom>
+        </p:spPr>
+      </p:pic>
+    </p:spTree>
+    <p:extLst>
+      <p:ext uri="{BB962C8B-B14F-4D97-AF65-F5344CB8AC3E}">
+        <p14:creationId xmlns:p14="http://schemas.microsoft.com/office/powerpoint/2010/main" val="1234639270"/>
+      </p:ext>
+    </p:extLst>
+  </p:cSld>
+  <p:clrMapOvr>
+    <a:masterClrMapping/>
+  </p:clrMapOvr>
+  <p:timing>
+    <p:tnLst>
+      <p:par>
+        <p:cTn id="1" dur="indefinite" restart="never" nodeType="tmRoot">
+          <p:childTnLst>
+            <p:seq concurrent="1" nextAc="seek">
+              <p:cTn id="2" dur="indefinite" nodeType="mainSeq">
+                <p:childTnLst>
+                  <p:par>
+                    <p:cTn id="3" fill="hold">
+                      <p:stCondLst>
+                        <p:cond delay="indefinite"/>
+                        <p:cond evt="onBegin" delay="0">
+                          <p:tn val="2"/>
+                        </p:cond>
+                      </p:stCondLst>
+                      <p:childTnLst>
+                        <p:par>
+                          <p:cTn id="4" fill="hold">
+                            <p:stCondLst>
+                              <p:cond delay="0"/>
+                            </p:stCondLst>
+                            <p:childTnLst>
+                              <p:par>
+                                <p:cTn id="5" presetID="12" presetClass="entr" presetSubtype="8" fill="hold" grpId="0" nodeType="withEffect">
+                                  <p:stCondLst>
+                                    <p:cond delay="0"/>
+                                  </p:stCondLst>
+                                  <p:childTnLst>
+                                    <p:set>
+                                      <p:cBhvr>
+                                        <p:cTn id="6" dur="1" fill="hold">
+                                          <p:stCondLst>
+                                            <p:cond delay="0"/>
+                                          </p:stCondLst>
+                                        </p:cTn>
+                                        <p:tgtEl>
+                                          <p:spTgt spid="4"/>
+                                        </p:tgtEl>
+                                        <p:attrNameLst>
+                                          <p:attrName>style.visibility</p:attrName>
+                                        </p:attrNameLst>
+                                      </p:cBhvr>
+                                      <p:to>
+                                        <p:strVal val="visible"/>
+                                      </p:to>
+                                    </p:set>
+                                    <p:anim calcmode="lin" valueType="num">
+                                      <p:cBhvr additive="base">
+                                        <p:cTn id="7" dur="500"/>
+                                        <p:tgtEl>
+                                          <p:spTgt spid="4"/>
+                                        </p:tgtEl>
+                                        <p:attrNameLst>
+                                          <p:attrName>ppt_x</p:attrName>
+                                        </p:attrNameLst>
+                                      </p:cBhvr>
+                                      <p:tavLst>
+                                        <p:tav tm="0">
+                                          <p:val>
+                                            <p:strVal val="#ppt_x-#ppt_w*1.125000"/>
+                                          </p:val>
+                                        </p:tav>
+                                        <p:tav tm="100000">
+                                          <p:val>
+                                            <p:strVal val="#ppt_x"/>
+                                          </p:val>
+                                        </p:tav>
+                                      </p:tavLst>
+                                    </p:anim>
+                                    <p:animEffect transition="in" filter="wipe(right)">
+                                      <p:cBhvr>
+                                        <p:cTn id="8" dur="500"/>
+                                        <p:tgtEl>
+                                          <p:spTgt spid="4"/>
+                                        </p:tgtEl>
+                                      </p:cBhvr>
+                                    </p:animEffect>
+                                  </p:childTnLst>
+                                </p:cTn>
+                              </p:par>
+                            </p:childTnLst>
+                          </p:cTn>
+                        </p:par>
+                        <p:par>
+                          <p:cTn id="9" fill="hold">
+                            <p:stCondLst>
+                              <p:cond delay="500"/>
+                            </p:stCondLst>
+                            <p:childTnLst>
+                              <p:par>
+                                <p:cTn id="10" presetID="10" presetClass="entr" presetSubtype="0" fill="hold" grpId="0" nodeType="afterEffect">
+                                  <p:stCondLst>
+                                    <p:cond delay="0"/>
+                                  </p:stCondLst>
+                                  <p:childTnLst>
+                                    <p:set>
+                                      <p:cBhvr>
+                                        <p:cTn id="11" dur="1" fill="hold">
+                                          <p:stCondLst>
+                                            <p:cond delay="0"/>
+                                          </p:stCondLst>
+                                        </p:cTn>
+                                        <p:tgtEl>
+                                          <p:spTgt spid="5"/>
+                                        </p:tgtEl>
+                                        <p:attrNameLst>
+                                          <p:attrName>style.visibility</p:attrName>
+                                        </p:attrNameLst>
+                                      </p:cBhvr>
+                                      <p:to>
+                                        <p:strVal val="visible"/>
+                                      </p:to>
+                                    </p:set>
+                                    <p:animEffect transition="in" filter="fade">
+                                      <p:cBhvr>
+                                        <p:cTn id="12" dur="750"/>
+                                        <p:tgtEl>
+                                          <p:spTgt spid="5"/>
+                                        </p:tgtEl>
+                                      </p:cBhvr>
+                                    </p:animEffect>
+                                  </p:childTnLst>
+                                </p:cTn>
+                              </p:par>
+                            </p:childTnLst>
+                          </p:cTn>
+                        </p:par>
+                      </p:childTnLst>
+                    </p:cTn>
+                  </p:par>
+                </p:childTnLst>
+              </p:cTn>
+              <p:prevCondLst>
+                <p:cond evt="onPrev" delay="0">
+                  <p:tgtEl>
+                    <p:sldTgt/>
+                  </p:tgtEl>
+                </p:cond>
+              </p:prevCondLst>
+              <p:nextCondLst>
+                <p:cond evt="onNext" delay="0">
+                  <p:tgtEl>
+                    <p:sldTgt/>
+                  </p:tgtEl>
+                </p:cond>
+              </p:nextCondLst>
+            </p:seq>
+          </p:childTnLst>
+        </p:cTn>
+      </p:par>
+    </p:tnLst>
+    <p:bldLst>
+      <p:bldP spid="4" grpId="0"/>
+      <p:bldP spid="5" grpId="0"/>
+    </p:bldLst>
+  </p:timing>
+</p:sld>
+</file>
+
 <file path=ppt/slides/slide4.xml><?xml version="1.0" encoding="utf-8"?>
 <p:sld xmlns:a="http://schemas.openxmlformats.org/drawingml/2006/main" xmlns:r="http://schemas.openxmlformats.org/officeDocument/2006/relationships" xmlns:p="http://schemas.openxmlformats.org/presentationml/2006/main">
   <p:cSld>
@@ -11087,7 +11220,7 @@
         <p:spPr>
           <a:xfrm>
             <a:off x="482138" y="1456163"/>
-            <a:ext cx="10972800" cy="1661993"/>
+            <a:ext cx="10972800" cy="2954655"/>
           </a:xfrm>
           <a:prstGeom prst="rect">
             <a:avLst/>
@@ -11113,7 +11246,7 @@
                 </a:solidFill>
                 <a:latin typeface="Lato" panose="020F0502020204030203"/>
               </a:rPr>
-              <a:t>We identified our main data set of investor data</a:t>
+              <a:t>We identified our main data set of startup investor data on Kaggle</a:t>
             </a:r>
           </a:p>
           <a:p>
@@ -11131,8 +11264,41 @@
                 </a:solidFill>
                 <a:latin typeface="Lato" panose="020F0502020204030203"/>
               </a:rPr>
-              <a:t>We then cleaned this data</a:t>
+              <a:t>We then reviewed the data to ensure it was useful</a:t>
             </a:r>
+          </a:p>
+          <a:p>
+            <a:pPr marL="742950" indent="-285750" fontAlgn="base">
+              <a:spcBef>
+                <a:spcPts val="1200"/>
+              </a:spcBef>
+              <a:buFont typeface="Arial" panose="020B0604020202020204" pitchFamily="34" charset="0"/>
+              <a:buChar char="•"/>
+            </a:pPr>
+            <a:r>
+              <a:rPr lang="en-US" dirty="0">
+                <a:solidFill>
+                  <a:srgbClr val="000000"/>
+                </a:solidFill>
+                <a:latin typeface="Lato" panose="020F0502020204030203"/>
+              </a:rPr>
+              <a:t>After we had some observations, we cleaned this data utilizing a combination of pandas and </a:t>
+            </a:r>
+            <a:r>
+              <a:rPr lang="en-US" dirty="0" err="1">
+                <a:solidFill>
+                  <a:srgbClr val="000000"/>
+                </a:solidFill>
+                <a:latin typeface="Lato" panose="020F0502020204030203"/>
+              </a:rPr>
+              <a:t>xls</a:t>
+            </a:r>
+            <a:endParaRPr lang="en-US" dirty="0">
+              <a:solidFill>
+                <a:srgbClr val="000000"/>
+              </a:solidFill>
+              <a:latin typeface="Lato" panose="020F0502020204030203"/>
+            </a:endParaRPr>
           </a:p>
           <a:p>
             <a:pPr marL="742950" indent="-285750" fontAlgn="base">
@@ -11188,6 +11354,129 @@
               <a:t>We then started to iterate on observations of the data</a:t>
             </a:r>
           </a:p>
+          <a:p>
+            <a:pPr marL="742950" indent="-285750" fontAlgn="base">
+              <a:spcBef>
+                <a:spcPts val="1200"/>
+              </a:spcBef>
+              <a:buFont typeface="Arial" panose="020B0604020202020204" pitchFamily="34" charset="0"/>
+              <a:buChar char="•"/>
+            </a:pPr>
+            <a:r>
+              <a:rPr lang="en-US" dirty="0">
+                <a:solidFill>
+                  <a:srgbClr val="000000"/>
+                </a:solidFill>
+                <a:latin typeface="Lato" panose="020F0502020204030203"/>
+              </a:rPr>
+              <a:t>We discussed patterns of the data within the group</a:t>
+            </a:r>
+          </a:p>
+          <a:p>
+            <a:pPr marL="742950" indent="-285750" fontAlgn="base">
+              <a:spcBef>
+                <a:spcPts val="1200"/>
+              </a:spcBef>
+              <a:buFont typeface="Arial" panose="020B0604020202020204" pitchFamily="34" charset="0"/>
+              <a:buChar char="•"/>
+            </a:pPr>
+            <a:r>
+              <a:rPr lang="en-US" dirty="0">
+                <a:solidFill>
+                  <a:srgbClr val="000000"/>
+                </a:solidFill>
+                <a:latin typeface="Lato" panose="020F0502020204030203"/>
+              </a:rPr>
+              <a:t>We then decided which metrics to focus on and create meaningful visualizations of the data</a:t>
+            </a:r>
+          </a:p>
+        </p:txBody>
+      </p:sp>
+      <p:sp>
+        <p:nvSpPr>
+          <p:cNvPr id="4" name="Rectangle 3">
+            <a:extLst>
+              <a:ext uri="{FF2B5EF4-FFF2-40B4-BE49-F238E27FC236}">
+                <a16:creationId xmlns:a16="http://schemas.microsoft.com/office/drawing/2014/main" id="{934F80C8-F285-4816-B22D-BE73DEDE9420}"/>
+              </a:ext>
+            </a:extLst>
+          </p:cNvPr>
+          <p:cNvSpPr/>
+          <p:nvPr/>
+        </p:nvSpPr>
+        <p:spPr>
+          <a:xfrm>
+            <a:off x="2515986" y="5211864"/>
+            <a:ext cx="6096000" cy="1477328"/>
+          </a:xfrm>
+          <a:prstGeom prst="rect">
+            <a:avLst/>
+          </a:prstGeom>
+        </p:spPr>
+        <p:txBody>
+          <a:bodyPr>
+            <a:spAutoFit/>
+          </a:bodyPr>
+          <a:lstStyle/>
+          <a:p>
+            <a:r>
+              <a:rPr lang="en-US" dirty="0">
+                <a:solidFill>
+                  <a:srgbClr val="FF0000"/>
+                </a:solidFill>
+              </a:rPr>
+              <a:t>* [ ] Describe the data exploration and cleanup process (accompanied by your </a:t>
+            </a:r>
+            <a:r>
+              <a:rPr lang="en-US" dirty="0" err="1">
+                <a:solidFill>
+                  <a:srgbClr val="FF0000"/>
+                </a:solidFill>
+              </a:rPr>
+              <a:t>Jupyter</a:t>
+            </a:r>
+            <a:r>
+              <a:rPr lang="en-US" dirty="0">
+                <a:solidFill>
+                  <a:srgbClr val="FF0000"/>
+                </a:solidFill>
+              </a:rPr>
+              <a:t> Notebook)</a:t>
+            </a:r>
+          </a:p>
+          <a:p>
+            <a:endParaRPr lang="en-US" dirty="0">
+              <a:solidFill>
+                <a:srgbClr val="FF0000"/>
+              </a:solidFill>
+            </a:endParaRPr>
+          </a:p>
+          <a:p>
+            <a:r>
+              <a:rPr lang="en-US" dirty="0">
+                <a:solidFill>
+                  <a:srgbClr val="FF0000"/>
+                </a:solidFill>
+              </a:rPr>
+              <a:t>* [ ] Describe the analysis process (accompanied by your </a:t>
+            </a:r>
+            <a:r>
+              <a:rPr lang="en-US" dirty="0" err="1">
+                <a:solidFill>
+                  <a:srgbClr val="FF0000"/>
+                </a:solidFill>
+              </a:rPr>
+              <a:t>Jupyter</a:t>
+            </a:r>
+            <a:r>
+              <a:rPr lang="en-US" dirty="0">
+                <a:solidFill>
+                  <a:srgbClr val="FF0000"/>
+                </a:solidFill>
+              </a:rPr>
+              <a:t> Notebook)</a:t>
+            </a:r>
+          </a:p>
         </p:txBody>
       </p:sp>
     </p:spTree>
@@ -11287,7 +11576,7 @@
                 </a:solidFill>
                 <a:latin typeface="Lato" panose="020F0502020204030203"/>
               </a:rPr>
-              <a:t>We have observed strong representations at the costs for funding of startups, let by San Francisco and New York City.</a:t>
+              <a:t>We have observed strong representations at the coasts for funding of startups, led by San Francisco and New York City.</a:t>
             </a:r>
           </a:p>
           <a:p>
@@ -14893,6 +15182,44 @@
           </a:graphicData>
         </a:graphic>
       </p:graphicFrame>
+      <p:sp>
+        <p:nvSpPr>
+          <p:cNvPr id="3" name="Rectangle 2">
+            <a:extLst>
+              <a:ext uri="{FF2B5EF4-FFF2-40B4-BE49-F238E27FC236}">
+                <a16:creationId xmlns:a16="http://schemas.microsoft.com/office/drawing/2014/main" id="{C8B64127-E294-457C-A6BA-DFEE57C43E42}"/>
+              </a:ext>
+            </a:extLst>
+          </p:cNvPr>
+          <p:cNvSpPr/>
+          <p:nvPr/>
+        </p:nvSpPr>
+        <p:spPr>
+          <a:xfrm>
+            <a:off x="2407030" y="3859767"/>
+            <a:ext cx="4451860" cy="369332"/>
+          </a:xfrm>
+          <a:prstGeom prst="rect">
+            <a:avLst/>
+          </a:prstGeom>
+        </p:spPr>
+        <p:txBody>
+          <a:bodyPr wrap="none">
+            <a:spAutoFit/>
+          </a:bodyPr>
+          <a:lstStyle/>
+          <a:p>
+            <a:r>
+              <a:rPr lang="en-US" dirty="0">
+                <a:solidFill>
+                  <a:srgbClr val="FF0000"/>
+                </a:solidFill>
+              </a:rPr>
+              <a:t>This should include a numerical summary</a:t>
+            </a:r>
+          </a:p>
+        </p:txBody>
+      </p:sp>
     </p:spTree>
     <p:extLst>
       <p:ext uri="{BB962C8B-B14F-4D97-AF65-F5344CB8AC3E}">
@@ -15392,7 +15719,7 @@
           <p:cNvPr id="2" name="Title 1">
             <a:extLst>
               <a:ext uri="{FF2B5EF4-FFF2-40B4-BE49-F238E27FC236}">
-                <a16:creationId xmlns:a16="http://schemas.microsoft.com/office/drawing/2014/main" id="{6A22A7E4-5C91-4AE1-9A37-1DE12AC7695D}"/>
+                <a16:creationId xmlns:a16="http://schemas.microsoft.com/office/drawing/2014/main" id="{CF8AAA4F-9F78-4F95-9666-13ECFEE59A8C}"/>
               </a:ext>
             </a:extLst>
           </p:cNvPr>
@@ -15405,20 +15732,112 @@
         </p:nvSpPr>
         <p:spPr>
           <a:xfrm>
-            <a:off x="838200" y="365125"/>
-            <a:ext cx="10515600" cy="5647748"/>
+            <a:off x="372687" y="2886652"/>
+            <a:ext cx="10515600" cy="1325563"/>
           </a:xfrm>
         </p:spPr>
         <p:txBody>
           <a:bodyPr>
+            <a:normAutofit fontScale="90000"/>
+          </a:bodyPr>
+          <a:lstStyle/>
+          <a:p>
+            <a:r>
+              <a:rPr lang="en-US">
+                <a:solidFill>
+                  <a:srgbClr val="FF0000"/>
+                </a:solidFill>
+              </a:rPr>
+              <a:t>  </a:t>
+            </a:r>
+            <a:r>
+              <a:rPr lang="en-US" dirty="0">
+                <a:solidFill>
+                  <a:srgbClr val="FF0000"/>
+                </a:solidFill>
+              </a:rPr>
+              <a:t>* Discuss any difficulties that arose, and how you dealt with them</a:t>
+            </a:r>
+            <a:br>
+              <a:rPr lang="en-US" dirty="0">
+                <a:solidFill>
+                  <a:srgbClr val="FF0000"/>
+                </a:solidFill>
+              </a:rPr>
+            </a:br>
+            <a:r>
+              <a:rPr lang="en-US" dirty="0">
+                <a:solidFill>
+                  <a:srgbClr val="FF0000"/>
+                </a:solidFill>
+              </a:rPr>
+              <a:t>  * Discuss any additional questions that came up, but which you didn't have time to answer: What would you research next, if you had two more weeks?</a:t>
+            </a:r>
+            <a:br>
+              <a:rPr lang="en-US" dirty="0">
+                <a:solidFill>
+                  <a:srgbClr val="FF0000"/>
+                </a:solidFill>
+              </a:rPr>
+            </a:br>
+            <a:endParaRPr lang="en-US" dirty="0">
+              <a:solidFill>
+                <a:srgbClr val="FF0000"/>
+              </a:solidFill>
+            </a:endParaRPr>
+          </a:p>
+        </p:txBody>
+      </p:sp>
+      <p:sp>
+        <p:nvSpPr>
+          <p:cNvPr id="3" name="Title 1">
+            <a:extLst>
+              <a:ext uri="{FF2B5EF4-FFF2-40B4-BE49-F238E27FC236}">
+                <a16:creationId xmlns:a16="http://schemas.microsoft.com/office/drawing/2014/main" id="{1992E939-D41B-4FB7-8EB3-C8BE06C24D0F}"/>
+              </a:ext>
+            </a:extLst>
+          </p:cNvPr>
+          <p:cNvSpPr txBox="1">
+            <a:spLocks/>
+          </p:cNvSpPr>
+          <p:nvPr/>
+        </p:nvSpPr>
+        <p:spPr>
+          <a:xfrm>
+            <a:off x="838200" y="365125"/>
+            <a:ext cx="10515600" cy="1325563"/>
+          </a:xfrm>
+          <a:prstGeom prst="rect">
+            <a:avLst/>
+          </a:prstGeom>
+        </p:spPr>
+        <p:txBody>
+          <a:bodyPr vert="horz" lIns="91440" tIns="45720" rIns="91440" bIns="45720" rtlCol="0" anchor="ctr">
             <a:normAutofit/>
           </a:bodyPr>
-          <a:lstStyle/>
-          <a:p>
-            <a:pPr algn="ctr"/>
+          <a:lstStyle>
+            <a:lvl1pPr algn="l" defTabSz="914400" rtl="0" eaLnBrk="1" latinLnBrk="0" hangingPunct="1">
+              <a:lnSpc>
+                <a:spcPct val="90000"/>
+              </a:lnSpc>
+              <a:spcBef>
+                <a:spcPct val="0"/>
+              </a:spcBef>
+              <a:buNone/>
+              <a:defRPr sz="3600" kern="1200">
+                <a:solidFill>
+                  <a:schemeClr val="tx1"/>
+                </a:solidFill>
+                <a:latin typeface="+mj-lt"/>
+                <a:ea typeface="+mj-ea"/>
+                <a:cs typeface="+mj-cs"/>
+              </a:defRPr>
+            </a:lvl1pPr>
+          </a:lstStyle>
+          <a:p>
             <a:r>
-              <a:rPr lang="en-US" sz="11500" dirty="0"/>
-              <a:t>Questions?</a:t>
+              <a:rPr lang="en-US" dirty="0"/>
+              <a:t>Post Mortem</a:t>
             </a:r>
           </a:p>
         </p:txBody>
@@ -15426,7 +15845,7 @@
     </p:spTree>
     <p:extLst>
       <p:ext uri="{BB962C8B-B14F-4D97-AF65-F5344CB8AC3E}">
-        <p14:creationId xmlns:p14="http://schemas.microsoft.com/office/powerpoint/2010/main" val="1512139714"/>
+        <p14:creationId xmlns:p14="http://schemas.microsoft.com/office/powerpoint/2010/main" val="1042443609"/>
       </p:ext>
     </p:extLst>
   </p:cSld>

</xml_diff>

<commit_message>
Updated presentation and cleaned up omar starter code
</commit_message>
<xml_diff>
--- a/Presentation/GiterDun Presentation.pptx
+++ b/Presentation/GiterDun Presentation.pptx
@@ -5,7 +5,7 @@
     <p:sldMasterId id="2147483648" r:id="rId1"/>
   </p:sldMasterIdLst>
   <p:notesMasterIdLst>
-    <p:notesMasterId r:id="rId12"/>
+    <p:notesMasterId r:id="rId15"/>
   </p:notesMasterIdLst>
   <p:sldIdLst>
     <p:sldId id="258" r:id="rId2"/>
@@ -16,8 +16,11 @@
     <p:sldId id="735" r:id="rId7"/>
     <p:sldId id="740" r:id="rId8"/>
     <p:sldId id="741" r:id="rId9"/>
-    <p:sldId id="743" r:id="rId10"/>
-    <p:sldId id="742" r:id="rId11"/>
+    <p:sldId id="745" r:id="rId10"/>
+    <p:sldId id="746" r:id="rId11"/>
+    <p:sldId id="744" r:id="rId12"/>
+    <p:sldId id="743" r:id="rId13"/>
+    <p:sldId id="742" r:id="rId14"/>
   </p:sldIdLst>
   <p:sldSz cx="12192000" cy="6858000"/>
   <p:notesSz cx="6858000" cy="9144000"/>
@@ -805,7 +808,7 @@
           <a:p>
             <a:fld id="{69685EF1-E703-46DB-B8E6-B1636C21AD63}" type="datetimeFigureOut">
               <a:rPr lang="en-US" smtClean="0"/>
-              <a:t>9/9/2019</a:t>
+              <a:t>9/10/2019</a:t>
             </a:fld>
             <a:endParaRPr lang="en-US"/>
           </a:p>
@@ -1430,7 +1433,7 @@
           <a:p>
             <a:fld id="{78ABE3C1-DBE1-495D-B57B-2849774B866A}" type="datetimeFigureOut">
               <a:rPr lang="en-US" dirty="0"/>
-              <a:t>9/9/2019</a:t>
+              <a:t>9/10/2019</a:t>
             </a:fld>
             <a:endParaRPr lang="en-US" dirty="0"/>
           </a:p>
@@ -1839,7 +1842,7 @@
           <a:p>
             <a:fld id="{446C117F-5CCF-4837-BE5F-2B92066CAFAF}" type="datetimeFigureOut">
               <a:rPr lang="en-US" dirty="0"/>
-              <a:t>9/9/2019</a:t>
+              <a:t>9/10/2019</a:t>
             </a:fld>
             <a:endParaRPr lang="en-US" dirty="0"/>
           </a:p>
@@ -2170,7 +2173,7 @@
           <a:p>
             <a:fld id="{84EB90BD-B6CE-46B7-997F-7313B992CCDC}" type="datetimeFigureOut">
               <a:rPr lang="en-US" dirty="0"/>
-              <a:t>9/9/2019</a:t>
+              <a:t>9/10/2019</a:t>
             </a:fld>
             <a:endParaRPr lang="en-US" dirty="0"/>
           </a:p>
@@ -2570,7 +2573,7 @@
           <a:p>
             <a:fld id="{CDB9D11F-B188-461D-B23F-39381795C052}" type="datetimeFigureOut">
               <a:rPr lang="en-US" dirty="0"/>
-              <a:t>9/9/2019</a:t>
+              <a:t>9/10/2019</a:t>
             </a:fld>
             <a:endParaRPr lang="en-US" dirty="0"/>
           </a:p>
@@ -3133,7 +3136,7 @@
           <a:p>
             <a:fld id="{52E6D8D9-55A2-4063-B0F3-121F44549695}" type="datetimeFigureOut">
               <a:rPr lang="en-US" dirty="0"/>
-              <a:t>9/9/2019</a:t>
+              <a:t>9/10/2019</a:t>
             </a:fld>
             <a:endParaRPr lang="en-US" dirty="0"/>
           </a:p>
@@ -3809,7 +3812,7 @@
           <a:p>
             <a:fld id="{D4B24536-994D-4021-A283-9F449C0DB509}" type="datetimeFigureOut">
               <a:rPr lang="en-US" dirty="0"/>
-              <a:t>9/9/2019</a:t>
+              <a:t>9/10/2019</a:t>
             </a:fld>
             <a:endParaRPr lang="en-US" dirty="0"/>
           </a:p>
@@ -4717,7 +4720,7 @@
           <a:p>
             <a:fld id="{3CBBBB78-C96F-47B7-AB17-D852CA960AC9}" type="datetimeFigureOut">
               <a:rPr lang="en-US" dirty="0"/>
-              <a:t>9/9/2019</a:t>
+              <a:t>9/10/2019</a:t>
             </a:fld>
             <a:endParaRPr lang="en-US" dirty="0"/>
           </a:p>
@@ -5025,7 +5028,7 @@
           <a:p>
             <a:fld id="{1FA3F48C-C7C6-4055-9F49-3777875E72AE}" type="datetimeFigureOut">
               <a:rPr lang="en-US" dirty="0"/>
-              <a:t>9/9/2019</a:t>
+              <a:t>9/10/2019</a:t>
             </a:fld>
             <a:endParaRPr lang="en-US" dirty="0"/>
           </a:p>
@@ -5284,7 +5287,7 @@
           <a:p>
             <a:fld id="{6178E61D-D431-422C-9764-11DAFE33AB63}" type="datetimeFigureOut">
               <a:rPr lang="en-US" dirty="0"/>
-              <a:t>9/9/2019</a:t>
+              <a:t>9/10/2019</a:t>
             </a:fld>
             <a:endParaRPr lang="en-US" dirty="0"/>
           </a:p>
@@ -5785,7 +5788,7 @@
           <a:p>
             <a:fld id="{12DE42F4-6EEF-4EF7-8ED4-2208F0F89A08}" type="datetimeFigureOut">
               <a:rPr lang="en-US" dirty="0"/>
-              <a:t>9/9/2019</a:t>
+              <a:t>9/10/2019</a:t>
             </a:fld>
             <a:endParaRPr lang="en-US" dirty="0"/>
           </a:p>
@@ -6305,7 +6308,7 @@
           <a:p>
             <a:fld id="{4E5A6C69-6797-4E8A-BF37-F2C3751466E9}" type="datetimeFigureOut">
               <a:rPr lang="en-US" dirty="0"/>
-              <a:t>9/9/2019</a:t>
+              <a:t>9/10/2019</a:t>
             </a:fld>
             <a:endParaRPr lang="en-US" dirty="0"/>
           </a:p>
@@ -6806,7 +6809,7 @@
           <a:p>
             <a:fld id="{D82014A1-A632-4878-A0D3-F52BA7563730}" type="datetimeFigureOut">
               <a:rPr lang="en-US" dirty="0"/>
-              <a:t>9/9/2019</a:t>
+              <a:t>9/10/2019</a:t>
             </a:fld>
             <a:endParaRPr lang="en-US" dirty="0"/>
           </a:p>
@@ -7058,7 +7061,7 @@
           <a:p>
             <a:fld id="{CE99F462-093F-4566-844B-4C71F2739DA5}" type="datetimeFigureOut">
               <a:rPr lang="en-US" dirty="0"/>
-              <a:t>9/9/2019</a:t>
+              <a:t>9/10/2019</a:t>
             </a:fld>
             <a:endParaRPr lang="en-US" dirty="0"/>
           </a:p>
@@ -7216,7 +7219,7 @@
           <a:p>
             <a:fld id="{3D24A7AC-904D-4781-85BA-7D10C17ED021}" type="datetimeFigureOut">
               <a:rPr lang="en-US" dirty="0"/>
-              <a:t>9/9/2019</a:t>
+              <a:t>9/10/2019</a:t>
             </a:fld>
             <a:endParaRPr lang="en-US" dirty="0"/>
           </a:p>
@@ -7601,7 +7604,7 @@
           <a:p>
             <a:fld id="{E331444B-B92B-4E27-8C94-BB93EAF5CB18}" type="datetimeFigureOut">
               <a:rPr lang="en-US" dirty="0"/>
-              <a:t>9/9/2019</a:t>
+              <a:t>9/10/2019</a:t>
             </a:fld>
             <a:endParaRPr lang="en-US" dirty="0"/>
           </a:p>
@@ -8005,7 +8008,7 @@
           <a:p>
             <a:fld id="{363EFA5E-FA76-400D-B3DC-F0BA90E6D107}" type="datetimeFigureOut">
               <a:rPr lang="en-US" dirty="0"/>
-              <a:t>9/9/2019</a:t>
+              <a:t>9/10/2019</a:t>
             </a:fld>
             <a:endParaRPr lang="en-US" dirty="0"/>
           </a:p>
@@ -8244,7 +8247,7 @@
           <a:p>
             <a:fld id="{9D6E9DEC-419B-4CC5-A080-3B06BD5A8291}" type="datetimeFigureOut">
               <a:rPr lang="en-US" dirty="0"/>
-              <a:t>9/9/2019</a:t>
+              <a:t>9/10/2019</a:t>
             </a:fld>
             <a:endParaRPr lang="en-US" dirty="0"/>
           </a:p>
@@ -8668,6 +8671,562 @@
 </file>
 
 <file path=ppt/slides/slide10.xml><?xml version="1.0" encoding="utf-8"?>
+<p:sld xmlns:a="http://schemas.openxmlformats.org/drawingml/2006/main" xmlns:r="http://schemas.openxmlformats.org/officeDocument/2006/relationships" xmlns:p="http://schemas.openxmlformats.org/presentationml/2006/main">
+  <p:cSld>
+    <p:spTree>
+      <p:nvGrpSpPr>
+        <p:cNvPr id="1" name=""/>
+        <p:cNvGrpSpPr/>
+        <p:nvPr/>
+      </p:nvGrpSpPr>
+      <p:grpSpPr>
+        <a:xfrm>
+          <a:off x="0" y="0"/>
+          <a:ext cx="0" cy="0"/>
+          <a:chOff x="0" y="0"/>
+          <a:chExt cx="0" cy="0"/>
+        </a:xfrm>
+      </p:grpSpPr>
+      <p:sp>
+        <p:nvSpPr>
+          <p:cNvPr id="2" name="Title 1">
+            <a:extLst>
+              <a:ext uri="{FF2B5EF4-FFF2-40B4-BE49-F238E27FC236}">
+                <a16:creationId xmlns:a16="http://schemas.microsoft.com/office/drawing/2014/main" id="{9D097168-CD0C-48AD-BED7-BABCA133BE7B}"/>
+              </a:ext>
+            </a:extLst>
+          </p:cNvPr>
+          <p:cNvSpPr>
+            <a:spLocks noGrp="1"/>
+          </p:cNvSpPr>
+          <p:nvPr>
+            <p:ph type="title"/>
+          </p:nvPr>
+        </p:nvSpPr>
+        <p:spPr/>
+        <p:txBody>
+          <a:bodyPr/>
+          <a:lstStyle/>
+          <a:p>
+            <a:r>
+              <a:rPr lang="en-US" dirty="0"/>
+              <a:t>Acquisitions: Acquirers</a:t>
+            </a:r>
+          </a:p>
+        </p:txBody>
+      </p:sp>
+      <p:sp>
+        <p:nvSpPr>
+          <p:cNvPr id="3" name="Rectangle 2">
+            <a:extLst>
+              <a:ext uri="{FF2B5EF4-FFF2-40B4-BE49-F238E27FC236}">
+                <a16:creationId xmlns:a16="http://schemas.microsoft.com/office/drawing/2014/main" id="{DF4C2726-AD90-4930-B63E-4160E1ED79C8}"/>
+              </a:ext>
+            </a:extLst>
+          </p:cNvPr>
+          <p:cNvSpPr/>
+          <p:nvPr/>
+        </p:nvSpPr>
+        <p:spPr>
+          <a:xfrm>
+            <a:off x="9039497" y="0"/>
+            <a:ext cx="3152503" cy="1325563"/>
+          </a:xfrm>
+          <a:prstGeom prst="rect">
+            <a:avLst/>
+          </a:prstGeom>
+          <a:solidFill>
+            <a:srgbClr val="00B050"/>
+          </a:solidFill>
+        </p:spPr>
+        <p:style>
+          <a:lnRef idx="2">
+            <a:schemeClr val="accent1">
+              <a:shade val="50000"/>
+            </a:schemeClr>
+          </a:lnRef>
+          <a:fillRef idx="1">
+            <a:schemeClr val="accent1"/>
+          </a:fillRef>
+          <a:effectRef idx="0">
+            <a:schemeClr val="accent1"/>
+          </a:effectRef>
+          <a:fontRef idx="minor">
+            <a:schemeClr val="lt1"/>
+          </a:fontRef>
+        </p:style>
+        <p:txBody>
+          <a:bodyPr rtlCol="0" anchor="ctr"/>
+          <a:lstStyle/>
+          <a:p>
+            <a:pPr algn="ctr"/>
+            <a:r>
+              <a:rPr lang="en-US" dirty="0"/>
+              <a:t>OE</a:t>
+            </a:r>
+          </a:p>
+        </p:txBody>
+      </p:sp>
+      <p:pic>
+        <p:nvPicPr>
+          <p:cNvPr id="5" name="Picture 4">
+            <a:extLst>
+              <a:ext uri="{FF2B5EF4-FFF2-40B4-BE49-F238E27FC236}">
+                <a16:creationId xmlns:a16="http://schemas.microsoft.com/office/drawing/2014/main" id="{D120AAFF-F5E4-44D8-8DD3-7CB3F9A84C5E}"/>
+              </a:ext>
+            </a:extLst>
+          </p:cNvPr>
+          <p:cNvPicPr>
+            <a:picLocks noChangeAspect="1"/>
+          </p:cNvPicPr>
+          <p:nvPr/>
+        </p:nvPicPr>
+        <p:blipFill>
+          <a:blip r:embed="rId2"/>
+          <a:stretch>
+            <a:fillRect/>
+          </a:stretch>
+        </p:blipFill>
+        <p:spPr>
+          <a:xfrm>
+            <a:off x="838200" y="3429000"/>
+            <a:ext cx="5202087" cy="3033864"/>
+          </a:xfrm>
+          <a:prstGeom prst="rect">
+            <a:avLst/>
+          </a:prstGeom>
+        </p:spPr>
+      </p:pic>
+      <p:pic>
+        <p:nvPicPr>
+          <p:cNvPr id="6" name="Picture 5">
+            <a:extLst>
+              <a:ext uri="{FF2B5EF4-FFF2-40B4-BE49-F238E27FC236}">
+                <a16:creationId xmlns:a16="http://schemas.microsoft.com/office/drawing/2014/main" id="{A2639039-598D-4A17-91E6-8D47805BD9E1}"/>
+              </a:ext>
+            </a:extLst>
+          </p:cNvPr>
+          <p:cNvPicPr>
+            <a:picLocks noChangeAspect="1"/>
+          </p:cNvPicPr>
+          <p:nvPr/>
+        </p:nvPicPr>
+        <p:blipFill>
+          <a:blip r:embed="rId3"/>
+          <a:stretch>
+            <a:fillRect/>
+          </a:stretch>
+        </p:blipFill>
+        <p:spPr>
+          <a:xfrm>
+            <a:off x="6151715" y="3429000"/>
+            <a:ext cx="5202087" cy="3046342"/>
+          </a:xfrm>
+          <a:prstGeom prst="rect">
+            <a:avLst/>
+          </a:prstGeom>
+        </p:spPr>
+      </p:pic>
+      <p:sp>
+        <p:nvSpPr>
+          <p:cNvPr id="8" name="TextBox 7">
+            <a:extLst>
+              <a:ext uri="{FF2B5EF4-FFF2-40B4-BE49-F238E27FC236}">
+                <a16:creationId xmlns:a16="http://schemas.microsoft.com/office/drawing/2014/main" id="{2B3E99C1-F854-41AD-82FF-C2E5F1350D80}"/>
+              </a:ext>
+            </a:extLst>
+          </p:cNvPr>
+          <p:cNvSpPr txBox="1"/>
+          <p:nvPr/>
+        </p:nvSpPr>
+        <p:spPr>
+          <a:xfrm>
+            <a:off x="838200" y="1690688"/>
+            <a:ext cx="10515600" cy="1754326"/>
+          </a:xfrm>
+          <a:prstGeom prst="rect">
+            <a:avLst/>
+          </a:prstGeom>
+          <a:noFill/>
+        </p:spPr>
+        <p:txBody>
+          <a:bodyPr wrap="square" rtlCol="0">
+            <a:spAutoFit/>
+          </a:bodyPr>
+          <a:lstStyle/>
+          <a:p>
+            <a:r>
+              <a:rPr lang="en-US" dirty="0"/>
+              <a:t>There were a total of 14 (~3% of all acquirers) serial acquirers (acquisitions &gt;=7), which accounted for 30% ($101 B) of total acquisition spending ($334 B). </a:t>
+            </a:r>
+          </a:p>
+          <a:p>
+            <a:endParaRPr lang="en-US" dirty="0"/>
+          </a:p>
+          <a:p>
+            <a:r>
+              <a:rPr lang="en-US" dirty="0"/>
+              <a:t>The serial acquirers are heavily in the technology industry. While Google had the most acquisitions (23 total), Facebook (9 total) and Hewlett-Packard (7 total) were standouts for most money spent and highest average acquisition price paid.</a:t>
+            </a:r>
+          </a:p>
+        </p:txBody>
+      </p:sp>
+    </p:spTree>
+    <p:extLst>
+      <p:ext uri="{BB962C8B-B14F-4D97-AF65-F5344CB8AC3E}">
+        <p14:creationId xmlns:p14="http://schemas.microsoft.com/office/powerpoint/2010/main" val="2717415444"/>
+      </p:ext>
+    </p:extLst>
+  </p:cSld>
+  <p:clrMapOvr>
+    <a:masterClrMapping/>
+  </p:clrMapOvr>
+</p:sld>
+</file>
+
+<file path=ppt/slides/slide11.xml><?xml version="1.0" encoding="utf-8"?>
+<p:sld xmlns:a="http://schemas.openxmlformats.org/drawingml/2006/main" xmlns:r="http://schemas.openxmlformats.org/officeDocument/2006/relationships" xmlns:p="http://schemas.openxmlformats.org/presentationml/2006/main">
+  <p:cSld>
+    <p:spTree>
+      <p:nvGrpSpPr>
+        <p:cNvPr id="1" name=""/>
+        <p:cNvGrpSpPr/>
+        <p:nvPr/>
+      </p:nvGrpSpPr>
+      <p:grpSpPr>
+        <a:xfrm>
+          <a:off x="0" y="0"/>
+          <a:ext cx="0" cy="0"/>
+          <a:chOff x="0" y="0"/>
+          <a:chExt cx="0" cy="0"/>
+        </a:xfrm>
+      </p:grpSpPr>
+      <p:sp>
+        <p:nvSpPr>
+          <p:cNvPr id="2" name="Title 1">
+            <a:extLst>
+              <a:ext uri="{FF2B5EF4-FFF2-40B4-BE49-F238E27FC236}">
+                <a16:creationId xmlns:a16="http://schemas.microsoft.com/office/drawing/2014/main" id="{A7AF86DD-350D-4F96-A206-9540CC77B108}"/>
+              </a:ext>
+            </a:extLst>
+          </p:cNvPr>
+          <p:cNvSpPr>
+            <a:spLocks noGrp="1"/>
+          </p:cNvSpPr>
+          <p:nvPr>
+            <p:ph type="title"/>
+          </p:nvPr>
+        </p:nvSpPr>
+        <p:spPr/>
+        <p:txBody>
+          <a:bodyPr/>
+          <a:lstStyle/>
+          <a:p>
+            <a:r>
+              <a:rPr lang="en-US" dirty="0"/>
+              <a:t>Funding Rounds </a:t>
+            </a:r>
+          </a:p>
+        </p:txBody>
+      </p:sp>
+      <p:pic>
+        <p:nvPicPr>
+          <p:cNvPr id="3" name="Picture 2">
+            <a:extLst>
+              <a:ext uri="{FF2B5EF4-FFF2-40B4-BE49-F238E27FC236}">
+                <a16:creationId xmlns:a16="http://schemas.microsoft.com/office/drawing/2014/main" id="{64F385EA-F17C-4EA6-84C9-3C612994C34C}"/>
+              </a:ext>
+            </a:extLst>
+          </p:cNvPr>
+          <p:cNvPicPr>
+            <a:picLocks noChangeAspect="1"/>
+          </p:cNvPicPr>
+          <p:nvPr/>
+        </p:nvPicPr>
+        <p:blipFill>
+          <a:blip r:embed="rId2"/>
+          <a:stretch>
+            <a:fillRect/>
+          </a:stretch>
+        </p:blipFill>
+        <p:spPr>
+          <a:xfrm>
+            <a:off x="838200" y="1690688"/>
+            <a:ext cx="6874143" cy="4462349"/>
+          </a:xfrm>
+          <a:prstGeom prst="rect">
+            <a:avLst/>
+          </a:prstGeom>
+        </p:spPr>
+      </p:pic>
+      <p:sp>
+        <p:nvSpPr>
+          <p:cNvPr id="10" name="Rectangle 9">
+            <a:extLst>
+              <a:ext uri="{FF2B5EF4-FFF2-40B4-BE49-F238E27FC236}">
+                <a16:creationId xmlns:a16="http://schemas.microsoft.com/office/drawing/2014/main" id="{B26D3CCC-822D-4EDF-8B35-E7691BE02773}"/>
+              </a:ext>
+            </a:extLst>
+          </p:cNvPr>
+          <p:cNvSpPr/>
+          <p:nvPr/>
+        </p:nvSpPr>
+        <p:spPr>
+          <a:xfrm>
+            <a:off x="9039497" y="0"/>
+            <a:ext cx="3152503" cy="1325563"/>
+          </a:xfrm>
+          <a:prstGeom prst="rect">
+            <a:avLst/>
+          </a:prstGeom>
+          <a:solidFill>
+            <a:srgbClr val="00B050"/>
+          </a:solidFill>
+        </p:spPr>
+        <p:style>
+          <a:lnRef idx="2">
+            <a:schemeClr val="accent1">
+              <a:shade val="50000"/>
+            </a:schemeClr>
+          </a:lnRef>
+          <a:fillRef idx="1">
+            <a:schemeClr val="accent1"/>
+          </a:fillRef>
+          <a:effectRef idx="0">
+            <a:schemeClr val="accent1"/>
+          </a:effectRef>
+          <a:fontRef idx="minor">
+            <a:schemeClr val="lt1"/>
+          </a:fontRef>
+        </p:style>
+        <p:txBody>
+          <a:bodyPr rtlCol="0" anchor="ctr"/>
+          <a:lstStyle/>
+          <a:p>
+            <a:pPr algn="ctr"/>
+            <a:r>
+              <a:rPr lang="en-US" dirty="0"/>
+              <a:t>OE</a:t>
+            </a:r>
+          </a:p>
+        </p:txBody>
+      </p:sp>
+      <p:sp>
+        <p:nvSpPr>
+          <p:cNvPr id="11" name="TextBox 10">
+            <a:extLst>
+              <a:ext uri="{FF2B5EF4-FFF2-40B4-BE49-F238E27FC236}">
+                <a16:creationId xmlns:a16="http://schemas.microsoft.com/office/drawing/2014/main" id="{48187AB0-BB6E-4D73-855E-EBE641E649AC}"/>
+              </a:ext>
+            </a:extLst>
+          </p:cNvPr>
+          <p:cNvSpPr txBox="1"/>
+          <p:nvPr/>
+        </p:nvSpPr>
+        <p:spPr>
+          <a:xfrm>
+            <a:off x="8022143" y="1690688"/>
+            <a:ext cx="3331657" cy="3970318"/>
+          </a:xfrm>
+          <a:prstGeom prst="rect">
+            <a:avLst/>
+          </a:prstGeom>
+          <a:noFill/>
+        </p:spPr>
+        <p:txBody>
+          <a:bodyPr wrap="square" rtlCol="0">
+            <a:spAutoFit/>
+          </a:bodyPr>
+          <a:lstStyle/>
+          <a:p>
+            <a:r>
+              <a:rPr lang="en-US" dirty="0"/>
+              <a:t>Companies in the data set received $29.6 million in total funding, over an average of 2.6 funding rounds.</a:t>
+            </a:r>
+          </a:p>
+          <a:p>
+            <a:endParaRPr lang="en-US" dirty="0"/>
+          </a:p>
+          <a:p>
+            <a:r>
+              <a:rPr lang="en-US" dirty="0"/>
+              <a:t>Limitations of the data set prevented us from drawing any supported conclusions about round-specific funding and the relationship of # of funding rounds to total funding raised – both of which would be worth further exploration and analysis.</a:t>
+            </a:r>
+          </a:p>
+        </p:txBody>
+      </p:sp>
+    </p:spTree>
+    <p:extLst>
+      <p:ext uri="{BB962C8B-B14F-4D97-AF65-F5344CB8AC3E}">
+        <p14:creationId xmlns:p14="http://schemas.microsoft.com/office/powerpoint/2010/main" val="2255130314"/>
+      </p:ext>
+    </p:extLst>
+  </p:cSld>
+  <p:clrMapOvr>
+    <a:masterClrMapping/>
+  </p:clrMapOvr>
+</p:sld>
+</file>
+
+<file path=ppt/slides/slide12.xml><?xml version="1.0" encoding="utf-8"?>
+<p:sld xmlns:a="http://schemas.openxmlformats.org/drawingml/2006/main" xmlns:r="http://schemas.openxmlformats.org/officeDocument/2006/relationships" xmlns:p="http://schemas.openxmlformats.org/presentationml/2006/main">
+  <p:cSld>
+    <p:spTree>
+      <p:nvGrpSpPr>
+        <p:cNvPr id="1" name=""/>
+        <p:cNvGrpSpPr/>
+        <p:nvPr/>
+      </p:nvGrpSpPr>
+      <p:grpSpPr>
+        <a:xfrm>
+          <a:off x="0" y="0"/>
+          <a:ext cx="0" cy="0"/>
+          <a:chOff x="0" y="0"/>
+          <a:chExt cx="0" cy="0"/>
+        </a:xfrm>
+      </p:grpSpPr>
+      <p:sp>
+        <p:nvSpPr>
+          <p:cNvPr id="2" name="Title 1">
+            <a:extLst>
+              <a:ext uri="{FF2B5EF4-FFF2-40B4-BE49-F238E27FC236}">
+                <a16:creationId xmlns:a16="http://schemas.microsoft.com/office/drawing/2014/main" id="{CF8AAA4F-9F78-4F95-9666-13ECFEE59A8C}"/>
+              </a:ext>
+            </a:extLst>
+          </p:cNvPr>
+          <p:cNvSpPr>
+            <a:spLocks noGrp="1"/>
+          </p:cNvSpPr>
+          <p:nvPr>
+            <p:ph type="title"/>
+          </p:nvPr>
+        </p:nvSpPr>
+        <p:spPr>
+          <a:xfrm>
+            <a:off x="372687" y="2886652"/>
+            <a:ext cx="10515600" cy="1325563"/>
+          </a:xfrm>
+        </p:spPr>
+        <p:txBody>
+          <a:bodyPr>
+            <a:normAutofit fontScale="90000"/>
+          </a:bodyPr>
+          <a:lstStyle/>
+          <a:p>
+            <a:r>
+              <a:rPr lang="en-US">
+                <a:solidFill>
+                  <a:srgbClr val="FF0000"/>
+                </a:solidFill>
+              </a:rPr>
+              <a:t>  </a:t>
+            </a:r>
+            <a:r>
+              <a:rPr lang="en-US" dirty="0">
+                <a:solidFill>
+                  <a:srgbClr val="FF0000"/>
+                </a:solidFill>
+              </a:rPr>
+              <a:t>* Discuss any difficulties that arose, and how you dealt with them</a:t>
+            </a:r>
+            <a:br>
+              <a:rPr lang="en-US" dirty="0">
+                <a:solidFill>
+                  <a:srgbClr val="FF0000"/>
+                </a:solidFill>
+              </a:rPr>
+            </a:br>
+            <a:r>
+              <a:rPr lang="en-US" dirty="0">
+                <a:solidFill>
+                  <a:srgbClr val="FF0000"/>
+                </a:solidFill>
+              </a:rPr>
+              <a:t>  * Discuss any additional questions that came up, but which you didn't have time to answer: What would you research next, if you had two more weeks?</a:t>
+            </a:r>
+            <a:br>
+              <a:rPr lang="en-US" dirty="0">
+                <a:solidFill>
+                  <a:srgbClr val="FF0000"/>
+                </a:solidFill>
+              </a:rPr>
+            </a:br>
+            <a:endParaRPr lang="en-US" dirty="0">
+              <a:solidFill>
+                <a:srgbClr val="FF0000"/>
+              </a:solidFill>
+            </a:endParaRPr>
+          </a:p>
+        </p:txBody>
+      </p:sp>
+      <p:sp>
+        <p:nvSpPr>
+          <p:cNvPr id="3" name="Title 1">
+            <a:extLst>
+              <a:ext uri="{FF2B5EF4-FFF2-40B4-BE49-F238E27FC236}">
+                <a16:creationId xmlns:a16="http://schemas.microsoft.com/office/drawing/2014/main" id="{1992E939-D41B-4FB7-8EB3-C8BE06C24D0F}"/>
+              </a:ext>
+            </a:extLst>
+          </p:cNvPr>
+          <p:cNvSpPr txBox="1">
+            <a:spLocks/>
+          </p:cNvSpPr>
+          <p:nvPr/>
+        </p:nvSpPr>
+        <p:spPr>
+          <a:xfrm>
+            <a:off x="838200" y="365125"/>
+            <a:ext cx="10515600" cy="1325563"/>
+          </a:xfrm>
+          <a:prstGeom prst="rect">
+            <a:avLst/>
+          </a:prstGeom>
+        </p:spPr>
+        <p:txBody>
+          <a:bodyPr vert="horz" lIns="91440" tIns="45720" rIns="91440" bIns="45720" rtlCol="0" anchor="ctr">
+            <a:normAutofit/>
+          </a:bodyPr>
+          <a:lstStyle>
+            <a:lvl1pPr algn="l" defTabSz="914400" rtl="0" eaLnBrk="1" latinLnBrk="0" hangingPunct="1">
+              <a:lnSpc>
+                <a:spcPct val="90000"/>
+              </a:lnSpc>
+              <a:spcBef>
+                <a:spcPct val="0"/>
+              </a:spcBef>
+              <a:buNone/>
+              <a:defRPr sz="3600" kern="1200">
+                <a:solidFill>
+                  <a:schemeClr val="tx1"/>
+                </a:solidFill>
+                <a:latin typeface="+mj-lt"/>
+                <a:ea typeface="+mj-ea"/>
+                <a:cs typeface="+mj-cs"/>
+              </a:defRPr>
+            </a:lvl1pPr>
+          </a:lstStyle>
+          <a:p>
+            <a:r>
+              <a:rPr lang="en-US" dirty="0"/>
+              <a:t>Post Mortem</a:t>
+            </a:r>
+          </a:p>
+        </p:txBody>
+      </p:sp>
+    </p:spTree>
+    <p:extLst>
+      <p:ext uri="{BB962C8B-B14F-4D97-AF65-F5344CB8AC3E}">
+        <p14:creationId xmlns:p14="http://schemas.microsoft.com/office/powerpoint/2010/main" val="1042443609"/>
+      </p:ext>
+    </p:extLst>
+  </p:cSld>
+  <p:clrMapOvr>
+    <a:masterClrMapping/>
+  </p:clrMapOvr>
+</p:sld>
+</file>
+
+<file path=ppt/slides/slide13.xml><?xml version="1.0" encoding="utf-8"?>
 <p:sld xmlns:a="http://schemas.openxmlformats.org/drawingml/2006/main" xmlns:r="http://schemas.openxmlformats.org/officeDocument/2006/relationships" xmlns:p="http://schemas.openxmlformats.org/presentationml/2006/main">
   <p:cSld>
     <p:spTree>
@@ -15719,7 +16278,7 @@
           <p:cNvPr id="2" name="Title 1">
             <a:extLst>
               <a:ext uri="{FF2B5EF4-FFF2-40B4-BE49-F238E27FC236}">
-                <a16:creationId xmlns:a16="http://schemas.microsoft.com/office/drawing/2014/main" id="{CF8AAA4F-9F78-4F95-9666-13ECFEE59A8C}"/>
+                <a16:creationId xmlns:a16="http://schemas.microsoft.com/office/drawing/2014/main" id="{9D097168-CD0C-48AD-BED7-BABCA133BE7B}"/>
               </a:ext>
             </a:extLst>
           </p:cNvPr>
@@ -15730,122 +16289,650 @@
             <p:ph type="title"/>
           </p:nvPr>
         </p:nvSpPr>
-        <p:spPr>
-          <a:xfrm>
-            <a:off x="372687" y="2886652"/>
-            <a:ext cx="10515600" cy="1325563"/>
-          </a:xfrm>
-        </p:spPr>
+        <p:spPr/>
         <p:txBody>
-          <a:bodyPr>
-            <a:normAutofit fontScale="90000"/>
-          </a:bodyPr>
+          <a:bodyPr/>
           <a:lstStyle/>
           <a:p>
             <a:r>
-              <a:rPr lang="en-US">
-                <a:solidFill>
-                  <a:srgbClr val="FF0000"/>
-                </a:solidFill>
-              </a:rPr>
-              <a:t>  </a:t>
+              <a:rPr lang="en-US" dirty="0"/>
+              <a:t>Acquisitions</a:t>
             </a:r>
-            <a:r>
-              <a:rPr lang="en-US" dirty="0">
-                <a:solidFill>
-                  <a:srgbClr val="FF0000"/>
-                </a:solidFill>
-              </a:rPr>
-              <a:t>* Discuss any difficulties that arose, and how you dealt with them</a:t>
-            </a:r>
-            <a:br>
-              <a:rPr lang="en-US" dirty="0">
-                <a:solidFill>
-                  <a:srgbClr val="FF0000"/>
-                </a:solidFill>
-              </a:rPr>
-            </a:br>
-            <a:r>
-              <a:rPr lang="en-US" dirty="0">
-                <a:solidFill>
-                  <a:srgbClr val="FF0000"/>
-                </a:solidFill>
-              </a:rPr>
-              <a:t>  * Discuss any additional questions that came up, but which you didn't have time to answer: What would you research next, if you had two more weeks?</a:t>
-            </a:r>
-            <a:br>
-              <a:rPr lang="en-US" dirty="0">
-                <a:solidFill>
-                  <a:srgbClr val="FF0000"/>
-                </a:solidFill>
-              </a:rPr>
-            </a:br>
-            <a:endParaRPr lang="en-US" dirty="0">
-              <a:solidFill>
-                <a:srgbClr val="FF0000"/>
-              </a:solidFill>
-            </a:endParaRPr>
           </a:p>
         </p:txBody>
       </p:sp>
       <p:sp>
         <p:nvSpPr>
-          <p:cNvPr id="3" name="Title 1">
+          <p:cNvPr id="3" name="Rectangle 2">
             <a:extLst>
               <a:ext uri="{FF2B5EF4-FFF2-40B4-BE49-F238E27FC236}">
-                <a16:creationId xmlns:a16="http://schemas.microsoft.com/office/drawing/2014/main" id="{1992E939-D41B-4FB7-8EB3-C8BE06C24D0F}"/>
+                <a16:creationId xmlns:a16="http://schemas.microsoft.com/office/drawing/2014/main" id="{DF4C2726-AD90-4930-B63E-4160E1ED79C8}"/>
               </a:ext>
             </a:extLst>
           </p:cNvPr>
-          <p:cNvSpPr txBox="1">
-            <a:spLocks/>
-          </p:cNvSpPr>
+          <p:cNvSpPr/>
           <p:nvPr/>
         </p:nvSpPr>
         <p:spPr>
           <a:xfrm>
-            <a:off x="838200" y="365125"/>
-            <a:ext cx="10515600" cy="1325563"/>
+            <a:off x="9039497" y="0"/>
+            <a:ext cx="3152503" cy="1325563"/>
           </a:xfrm>
           <a:prstGeom prst="rect">
             <a:avLst/>
           </a:prstGeom>
-        </p:spPr>
+          <a:solidFill>
+            <a:srgbClr val="00B050"/>
+          </a:solidFill>
+        </p:spPr>
+        <p:style>
+          <a:lnRef idx="2">
+            <a:schemeClr val="accent1">
+              <a:shade val="50000"/>
+            </a:schemeClr>
+          </a:lnRef>
+          <a:fillRef idx="1">
+            <a:schemeClr val="accent1"/>
+          </a:fillRef>
+          <a:effectRef idx="0">
+            <a:schemeClr val="accent1"/>
+          </a:effectRef>
+          <a:fontRef idx="minor">
+            <a:schemeClr val="lt1"/>
+          </a:fontRef>
+        </p:style>
         <p:txBody>
-          <a:bodyPr vert="horz" lIns="91440" tIns="45720" rIns="91440" bIns="45720" rtlCol="0" anchor="ctr">
-            <a:normAutofit/>
+          <a:bodyPr rtlCol="0" anchor="ctr"/>
+          <a:lstStyle/>
+          <a:p>
+            <a:pPr algn="ctr"/>
+            <a:r>
+              <a:rPr lang="en-US" dirty="0"/>
+              <a:t>OE</a:t>
+            </a:r>
+          </a:p>
+        </p:txBody>
+      </p:sp>
+      <p:sp>
+        <p:nvSpPr>
+          <p:cNvPr id="17" name="TextBox 16">
+            <a:extLst>
+              <a:ext uri="{FF2B5EF4-FFF2-40B4-BE49-F238E27FC236}">
+                <a16:creationId xmlns:a16="http://schemas.microsoft.com/office/drawing/2014/main" id="{2B7E2EF9-74B6-4C35-B919-01DB152D3CDD}"/>
+              </a:ext>
+            </a:extLst>
+          </p:cNvPr>
+          <p:cNvSpPr txBox="1"/>
+          <p:nvPr/>
+        </p:nvSpPr>
+        <p:spPr>
+          <a:xfrm>
+            <a:off x="838199" y="1690688"/>
+            <a:ext cx="2593605" cy="5078313"/>
+          </a:xfrm>
+          <a:prstGeom prst="rect">
+            <a:avLst/>
+          </a:prstGeom>
+          <a:noFill/>
+        </p:spPr>
+        <p:txBody>
+          <a:bodyPr wrap="square" rtlCol="0">
+            <a:spAutoFit/>
           </a:bodyPr>
-          <a:lstStyle>
-            <a:lvl1pPr algn="l" defTabSz="914400" rtl="0" eaLnBrk="1" latinLnBrk="0" hangingPunct="1">
-              <a:lnSpc>
-                <a:spcPct val="90000"/>
-              </a:lnSpc>
-              <a:spcBef>
-                <a:spcPct val="0"/>
-              </a:spcBef>
-              <a:buNone/>
-              <a:defRPr sz="3600" kern="1200">
+          <a:lstStyle/>
+          <a:p>
+            <a:r>
+              <a:rPr lang="en-US" dirty="0"/>
+              <a:t>There were a total of 801 (5.9%) firms acquired by 494 firms (acquirers) for a total of $334 B.</a:t>
+            </a:r>
+          </a:p>
+          <a:p>
+            <a:endParaRPr lang="en-US" dirty="0"/>
+          </a:p>
+          <a:p>
+            <a:r>
+              <a:rPr lang="en-US" dirty="0"/>
+              <a:t>The average acquisition price for the acquired firms was $339 million (skewed by larger acquisitions).</a:t>
+            </a:r>
+          </a:p>
+          <a:p>
+            <a:endParaRPr lang="en-US" dirty="0"/>
+          </a:p>
+          <a:p>
+            <a:r>
+              <a:rPr lang="en-US" dirty="0"/>
+              <a:t>Serial acquirers, firms that acquired 7 or more companies, spent less on average than the non-serial acquirers.</a:t>
+            </a:r>
+          </a:p>
+        </p:txBody>
+      </p:sp>
+      <p:grpSp>
+        <p:nvGrpSpPr>
+          <p:cNvPr id="20" name="Group 19">
+            <a:extLst>
+              <a:ext uri="{FF2B5EF4-FFF2-40B4-BE49-F238E27FC236}">
+                <a16:creationId xmlns:a16="http://schemas.microsoft.com/office/drawing/2014/main" id="{6642894E-9707-4229-8B3E-6BDF6BBC7B84}"/>
+              </a:ext>
+            </a:extLst>
+          </p:cNvPr>
+          <p:cNvGrpSpPr/>
+          <p:nvPr/>
+        </p:nvGrpSpPr>
+        <p:grpSpPr>
+          <a:xfrm>
+            <a:off x="3411590" y="1679698"/>
+            <a:ext cx="8044545" cy="5002590"/>
+            <a:chOff x="3320149" y="1562131"/>
+            <a:chExt cx="8044545" cy="5002590"/>
+          </a:xfrm>
+        </p:grpSpPr>
+        <p:grpSp>
+          <p:nvGrpSpPr>
+            <p:cNvPr id="18" name="Group 17">
+              <a:extLst>
+                <a:ext uri="{FF2B5EF4-FFF2-40B4-BE49-F238E27FC236}">
+                  <a16:creationId xmlns:a16="http://schemas.microsoft.com/office/drawing/2014/main" id="{AA7E009B-43A3-4197-9605-AB6CAA75E2AE}"/>
+                </a:ext>
+              </a:extLst>
+            </p:cNvPr>
+            <p:cNvGrpSpPr/>
+            <p:nvPr/>
+          </p:nvGrpSpPr>
+          <p:grpSpPr>
+            <a:xfrm>
+              <a:off x="3320149" y="1562131"/>
+              <a:ext cx="8044545" cy="5002590"/>
+              <a:chOff x="3320149" y="1562131"/>
+              <a:chExt cx="8044545" cy="5002590"/>
+            </a:xfrm>
+          </p:grpSpPr>
+          <p:pic>
+            <p:nvPicPr>
+              <p:cNvPr id="4" name="Picture 3">
+                <a:extLst>
+                  <a:ext uri="{FF2B5EF4-FFF2-40B4-BE49-F238E27FC236}">
+                    <a16:creationId xmlns:a16="http://schemas.microsoft.com/office/drawing/2014/main" id="{12C4E24F-6285-4AF1-B646-0BE5FF23B9C7}"/>
+                  </a:ext>
+                </a:extLst>
+              </p:cNvPr>
+              <p:cNvPicPr>
+                <a:picLocks noChangeAspect="1"/>
+              </p:cNvPicPr>
+              <p:nvPr/>
+            </p:nvPicPr>
+            <p:blipFill>
+              <a:blip r:embed="rId2"/>
+              <a:stretch>
+                <a:fillRect/>
+              </a:stretch>
+            </p:blipFill>
+            <p:spPr>
+              <a:xfrm>
+                <a:off x="3320149" y="1562131"/>
+                <a:ext cx="8044545" cy="5002590"/>
+              </a:xfrm>
+              <a:prstGeom prst="rect">
+                <a:avLst/>
+              </a:prstGeom>
+            </p:spPr>
+          </p:pic>
+          <p:pic>
+            <p:nvPicPr>
+              <p:cNvPr id="5" name="Picture 4">
+                <a:extLst>
+                  <a:ext uri="{FF2B5EF4-FFF2-40B4-BE49-F238E27FC236}">
+                    <a16:creationId xmlns:a16="http://schemas.microsoft.com/office/drawing/2014/main" id="{60AFDE01-B47C-4B0E-A97A-6B2C5B41622C}"/>
+                  </a:ext>
+                </a:extLst>
+              </p:cNvPr>
+              <p:cNvPicPr>
+                <a:picLocks noChangeAspect="1"/>
+              </p:cNvPicPr>
+              <p:nvPr/>
+            </p:nvPicPr>
+            <p:blipFill>
+              <a:blip r:embed="rId3"/>
+              <a:stretch>
+                <a:fillRect/>
+              </a:stretch>
+            </p:blipFill>
+            <p:spPr>
+              <a:xfrm>
+                <a:off x="6728932" y="1982379"/>
+                <a:ext cx="3825845" cy="2220856"/>
+              </a:xfrm>
+              <a:prstGeom prst="rect">
+                <a:avLst/>
+              </a:prstGeom>
+            </p:spPr>
+          </p:pic>
+          <p:cxnSp>
+            <p:nvCxnSpPr>
+              <p:cNvPr id="7" name="Straight Connector 6">
+                <a:extLst>
+                  <a:ext uri="{FF2B5EF4-FFF2-40B4-BE49-F238E27FC236}">
+                    <a16:creationId xmlns:a16="http://schemas.microsoft.com/office/drawing/2014/main" id="{EE357C3B-253A-4914-A19F-605EB2AE4F79}"/>
+                  </a:ext>
+                </a:extLst>
+              </p:cNvPr>
+              <p:cNvCxnSpPr/>
+              <p:nvPr/>
+            </p:nvCxnSpPr>
+            <p:spPr>
+              <a:xfrm>
+                <a:off x="6082937" y="1965765"/>
+                <a:ext cx="0" cy="3840871"/>
+              </a:xfrm>
+              <a:prstGeom prst="line">
+                <a:avLst/>
+              </a:prstGeom>
+              <a:ln>
+                <a:solidFill>
+                  <a:schemeClr val="tx2">
+                    <a:lumMod val="50000"/>
+                  </a:schemeClr>
+                </a:solidFill>
+                <a:prstDash val="dash"/>
+              </a:ln>
+            </p:spPr>
+            <p:style>
+              <a:lnRef idx="1">
+                <a:schemeClr val="dk1"/>
+              </a:lnRef>
+              <a:fillRef idx="0">
+                <a:schemeClr val="dk1"/>
+              </a:fillRef>
+              <a:effectRef idx="0">
+                <a:schemeClr val="dk1"/>
+              </a:effectRef>
+              <a:fontRef idx="minor">
+                <a:schemeClr val="tx1"/>
+              </a:fontRef>
+            </p:style>
+          </p:cxnSp>
+          <p:sp>
+            <p:nvSpPr>
+              <p:cNvPr id="8" name="TextBox 7">
+                <a:extLst>
+                  <a:ext uri="{FF2B5EF4-FFF2-40B4-BE49-F238E27FC236}">
+                    <a16:creationId xmlns:a16="http://schemas.microsoft.com/office/drawing/2014/main" id="{9B7370F5-ACB3-4189-BC7A-B8D06CE6A969}"/>
+                  </a:ext>
+                </a:extLst>
+              </p:cNvPr>
+              <p:cNvSpPr txBox="1"/>
+              <p:nvPr/>
+            </p:nvSpPr>
+            <p:spPr>
+              <a:xfrm>
+                <a:off x="6082937" y="2055813"/>
+                <a:ext cx="538930" cy="261610"/>
+              </a:xfrm>
+              <a:prstGeom prst="rect">
+                <a:avLst/>
+              </a:prstGeom>
+              <a:noFill/>
+            </p:spPr>
+            <p:txBody>
+              <a:bodyPr wrap="none" rtlCol="0">
+                <a:spAutoFit/>
+              </a:bodyPr>
+              <a:lstStyle/>
+              <a:p>
+                <a:r>
+                  <a:rPr lang="en-US" sz="1100" dirty="0">
+                    <a:solidFill>
+                      <a:schemeClr val="tx2">
+                        <a:lumMod val="50000"/>
+                      </a:schemeClr>
+                    </a:solidFill>
+                  </a:rPr>
+                  <a:t>Serial</a:t>
+                </a:r>
+              </a:p>
+            </p:txBody>
+          </p:sp>
+          <p:sp>
+            <p:nvSpPr>
+              <p:cNvPr id="9" name="TextBox 8">
+                <a:extLst>
+                  <a:ext uri="{FF2B5EF4-FFF2-40B4-BE49-F238E27FC236}">
+                    <a16:creationId xmlns:a16="http://schemas.microsoft.com/office/drawing/2014/main" id="{7BD33127-A509-46D1-94A7-2ABA760879DA}"/>
+                  </a:ext>
+                </a:extLst>
+              </p:cNvPr>
+              <p:cNvSpPr txBox="1"/>
+              <p:nvPr/>
+            </p:nvSpPr>
+            <p:spPr>
+              <a:xfrm>
+                <a:off x="5230498" y="2055813"/>
+                <a:ext cx="822661" cy="261610"/>
+              </a:xfrm>
+              <a:prstGeom prst="rect">
+                <a:avLst/>
+              </a:prstGeom>
+              <a:noFill/>
+            </p:spPr>
+            <p:txBody>
+              <a:bodyPr wrap="none" rtlCol="0">
+                <a:spAutoFit/>
+              </a:bodyPr>
+              <a:lstStyle/>
+              <a:p>
+                <a:r>
+                  <a:rPr lang="en-US" sz="1100" dirty="0">
+                    <a:solidFill>
+                      <a:schemeClr val="tx2">
+                        <a:lumMod val="50000"/>
+                      </a:schemeClr>
+                    </a:solidFill>
+                  </a:rPr>
+                  <a:t>Non-serial</a:t>
+                </a:r>
+              </a:p>
+            </p:txBody>
+          </p:sp>
+          <p:cxnSp>
+            <p:nvCxnSpPr>
+              <p:cNvPr id="11" name="Straight Arrow Connector 10">
+                <a:extLst>
+                  <a:ext uri="{FF2B5EF4-FFF2-40B4-BE49-F238E27FC236}">
+                    <a16:creationId xmlns:a16="http://schemas.microsoft.com/office/drawing/2014/main" id="{C2FA4961-B7D8-4F1C-8377-4E95E3941635}"/>
+                  </a:ext>
+                </a:extLst>
+              </p:cNvPr>
+              <p:cNvCxnSpPr/>
+              <p:nvPr/>
+            </p:nvCxnSpPr>
+            <p:spPr>
+              <a:xfrm>
+                <a:off x="6174378" y="2356611"/>
+                <a:ext cx="339634" cy="0"/>
+              </a:xfrm>
+              <a:prstGeom prst="straightConnector1">
+                <a:avLst/>
+              </a:prstGeom>
+              <a:ln>
+                <a:solidFill>
+                  <a:schemeClr val="tx2">
+                    <a:lumMod val="50000"/>
+                  </a:schemeClr>
+                </a:solidFill>
+                <a:tailEnd type="triangle"/>
+              </a:ln>
+            </p:spPr>
+            <p:style>
+              <a:lnRef idx="1">
+                <a:schemeClr val="dk1"/>
+              </a:lnRef>
+              <a:fillRef idx="0">
+                <a:schemeClr val="dk1"/>
+              </a:fillRef>
+              <a:effectRef idx="0">
+                <a:schemeClr val="dk1"/>
+              </a:effectRef>
+              <a:fontRef idx="minor">
+                <a:schemeClr val="tx1"/>
+              </a:fontRef>
+            </p:style>
+          </p:cxnSp>
+          <p:cxnSp>
+            <p:nvCxnSpPr>
+              <p:cNvPr id="12" name="Straight Arrow Connector 11">
+                <a:extLst>
+                  <a:ext uri="{FF2B5EF4-FFF2-40B4-BE49-F238E27FC236}">
+                    <a16:creationId xmlns:a16="http://schemas.microsoft.com/office/drawing/2014/main" id="{F6AC0C1D-1ABB-4649-960B-D4902B15776F}"/>
+                  </a:ext>
+                </a:extLst>
+              </p:cNvPr>
+              <p:cNvCxnSpPr>
+                <a:cxnSpLocks/>
+              </p:cNvCxnSpPr>
+              <p:nvPr/>
+            </p:nvCxnSpPr>
+            <p:spPr>
+              <a:xfrm flipH="1">
+                <a:off x="5621384" y="2357553"/>
+                <a:ext cx="339634" cy="0"/>
+              </a:xfrm>
+              <a:prstGeom prst="straightConnector1">
+                <a:avLst/>
+              </a:prstGeom>
+              <a:ln>
+                <a:solidFill>
+                  <a:schemeClr val="tx2">
+                    <a:lumMod val="50000"/>
+                  </a:schemeClr>
+                </a:solidFill>
+                <a:tailEnd type="triangle"/>
+              </a:ln>
+            </p:spPr>
+            <p:style>
+              <a:lnRef idx="1">
+                <a:schemeClr val="dk1"/>
+              </a:lnRef>
+              <a:fillRef idx="0">
+                <a:schemeClr val="dk1"/>
+              </a:fillRef>
+              <a:effectRef idx="0">
+                <a:schemeClr val="dk1"/>
+              </a:effectRef>
+              <a:fontRef idx="minor">
+                <a:schemeClr val="tx1"/>
+              </a:fontRef>
+            </p:style>
+          </p:cxnSp>
+          <p:cxnSp>
+            <p:nvCxnSpPr>
+              <p:cNvPr id="13" name="Straight Connector 12">
+                <a:extLst>
+                  <a:ext uri="{FF2B5EF4-FFF2-40B4-BE49-F238E27FC236}">
+                    <a16:creationId xmlns:a16="http://schemas.microsoft.com/office/drawing/2014/main" id="{35A6D4FF-23D5-460A-A69F-E186451F92A6}"/>
+                  </a:ext>
+                </a:extLst>
+              </p:cNvPr>
+              <p:cNvCxnSpPr>
+                <a:cxnSpLocks/>
+              </p:cNvCxnSpPr>
+              <p:nvPr/>
+            </p:nvCxnSpPr>
+            <p:spPr>
+              <a:xfrm rot="5400000">
+                <a:off x="10872664" y="4523671"/>
+                <a:ext cx="0" cy="519020"/>
+              </a:xfrm>
+              <a:prstGeom prst="line">
+                <a:avLst/>
+              </a:prstGeom>
+              <a:ln>
                 <a:solidFill>
                   <a:schemeClr val="tx1"/>
                 </a:solidFill>
-                <a:latin typeface="+mj-lt"/>
-                <a:ea typeface="+mj-ea"/>
-                <a:cs typeface="+mj-cs"/>
-              </a:defRPr>
-            </a:lvl1pPr>
-          </a:lstStyle>
-          <a:p>
-            <a:r>
-              <a:rPr lang="en-US" dirty="0"/>
-              <a:t>Post Mortem</a:t>
-            </a:r>
-          </a:p>
-        </p:txBody>
-      </p:sp>
+                <a:prstDash val="dash"/>
+              </a:ln>
+            </p:spPr>
+            <p:style>
+              <a:lnRef idx="1">
+                <a:schemeClr val="dk1"/>
+              </a:lnRef>
+              <a:fillRef idx="0">
+                <a:schemeClr val="dk1"/>
+              </a:fillRef>
+              <a:effectRef idx="0">
+                <a:schemeClr val="dk1"/>
+              </a:effectRef>
+              <a:fontRef idx="minor">
+                <a:schemeClr val="tx1"/>
+              </a:fontRef>
+            </p:style>
+          </p:cxnSp>
+          <p:sp>
+            <p:nvSpPr>
+              <p:cNvPr id="14" name="TextBox 13">
+                <a:extLst>
+                  <a:ext uri="{FF2B5EF4-FFF2-40B4-BE49-F238E27FC236}">
+                    <a16:creationId xmlns:a16="http://schemas.microsoft.com/office/drawing/2014/main" id="{06357B47-A1DD-45D4-BA9B-957ABF813B06}"/>
+                  </a:ext>
+                </a:extLst>
+              </p:cNvPr>
+              <p:cNvSpPr txBox="1"/>
+              <p:nvPr/>
+            </p:nvSpPr>
+            <p:spPr>
+              <a:xfrm>
+                <a:off x="10599089" y="4501730"/>
+                <a:ext cx="538930" cy="261610"/>
+              </a:xfrm>
+              <a:prstGeom prst="rect">
+                <a:avLst/>
+              </a:prstGeom>
+              <a:noFill/>
+            </p:spPr>
+            <p:txBody>
+              <a:bodyPr wrap="none" rtlCol="0">
+                <a:spAutoFit/>
+              </a:bodyPr>
+              <a:lstStyle/>
+              <a:p>
+                <a:r>
+                  <a:rPr lang="en-US" sz="1100" dirty="0"/>
+                  <a:t>Serial</a:t>
+                </a:r>
+              </a:p>
+            </p:txBody>
+          </p:sp>
+          <p:cxnSp>
+            <p:nvCxnSpPr>
+              <p:cNvPr id="15" name="Straight Arrow Connector 14">
+                <a:extLst>
+                  <a:ext uri="{FF2B5EF4-FFF2-40B4-BE49-F238E27FC236}">
+                    <a16:creationId xmlns:a16="http://schemas.microsoft.com/office/drawing/2014/main" id="{BE23825C-6CB2-4BC0-97C7-935A606FFB7C}"/>
+                  </a:ext>
+                </a:extLst>
+              </p:cNvPr>
+              <p:cNvCxnSpPr>
+                <a:cxnSpLocks/>
+              </p:cNvCxnSpPr>
+              <p:nvPr/>
+            </p:nvCxnSpPr>
+            <p:spPr>
+              <a:xfrm rot="16200000" flipV="1">
+                <a:off x="10750048" y="4403125"/>
+                <a:ext cx="210886" cy="0"/>
+              </a:xfrm>
+              <a:prstGeom prst="straightConnector1">
+                <a:avLst/>
+              </a:prstGeom>
+              <a:ln>
+                <a:solidFill>
+                  <a:schemeClr val="tx1"/>
+                </a:solidFill>
+                <a:tailEnd type="triangle"/>
+              </a:ln>
+            </p:spPr>
+            <p:style>
+              <a:lnRef idx="1">
+                <a:schemeClr val="dk1"/>
+              </a:lnRef>
+              <a:fillRef idx="0">
+                <a:schemeClr val="dk1"/>
+              </a:fillRef>
+              <a:effectRef idx="0">
+                <a:schemeClr val="dk1"/>
+              </a:effectRef>
+              <a:fontRef idx="minor">
+                <a:schemeClr val="tx1"/>
+              </a:fontRef>
+            </p:style>
+          </p:cxnSp>
+          <p:sp>
+            <p:nvSpPr>
+              <p:cNvPr id="16" name="TextBox 15">
+                <a:extLst>
+                  <a:ext uri="{FF2B5EF4-FFF2-40B4-BE49-F238E27FC236}">
+                    <a16:creationId xmlns:a16="http://schemas.microsoft.com/office/drawing/2014/main" id="{EE94667C-98D6-40D1-AFA6-17B02CE68D3C}"/>
+                  </a:ext>
+                </a:extLst>
+              </p:cNvPr>
+              <p:cNvSpPr txBox="1"/>
+              <p:nvPr/>
+            </p:nvSpPr>
+            <p:spPr>
+              <a:xfrm>
+                <a:off x="10586026" y="2391764"/>
+                <a:ext cx="554960" cy="261610"/>
+              </a:xfrm>
+              <a:prstGeom prst="rect">
+                <a:avLst/>
+              </a:prstGeom>
+              <a:noFill/>
+            </p:spPr>
+            <p:txBody>
+              <a:bodyPr wrap="none" rtlCol="0">
+                <a:spAutoFit/>
+              </a:bodyPr>
+              <a:lstStyle/>
+              <a:p>
+                <a:r>
+                  <a:rPr lang="en-US" sz="1100" dirty="0">
+                    <a:solidFill>
+                      <a:schemeClr val="tx2">
+                        <a:lumMod val="50000"/>
+                      </a:schemeClr>
+                    </a:solidFill>
+                  </a:rPr>
+                  <a:t>Count</a:t>
+                </a:r>
+              </a:p>
+            </p:txBody>
+          </p:sp>
+        </p:grpSp>
+        <p:sp>
+          <p:nvSpPr>
+            <p:cNvPr id="19" name="TextBox 18">
+              <a:extLst>
+                <a:ext uri="{FF2B5EF4-FFF2-40B4-BE49-F238E27FC236}">
+                  <a16:creationId xmlns:a16="http://schemas.microsoft.com/office/drawing/2014/main" id="{25F2BA94-572B-448C-80ED-34DB3DDC0D14}"/>
+                </a:ext>
+              </a:extLst>
+            </p:cNvPr>
+            <p:cNvSpPr txBox="1"/>
+            <p:nvPr/>
+          </p:nvSpPr>
+          <p:spPr>
+            <a:xfrm>
+              <a:off x="8991658" y="6131918"/>
+              <a:ext cx="2362142" cy="369332"/>
+            </a:xfrm>
+            <a:prstGeom prst="rect">
+              <a:avLst/>
+            </a:prstGeom>
+            <a:noFill/>
+          </p:spPr>
+          <p:txBody>
+            <a:bodyPr wrap="square" rtlCol="0">
+              <a:spAutoFit/>
+            </a:bodyPr>
+            <a:lstStyle/>
+            <a:p>
+              <a:r>
+                <a:rPr lang="en-US" sz="900" dirty="0">
+                  <a:solidFill>
+                    <a:schemeClr val="tx2">
+                      <a:lumMod val="50000"/>
+                    </a:schemeClr>
+                  </a:solidFill>
+                </a:rPr>
+                <a:t>* Bubble size reflects the total spending on acquisitions by each acquirer</a:t>
+              </a:r>
+            </a:p>
+          </p:txBody>
+        </p:sp>
+      </p:grpSp>
     </p:spTree>
     <p:extLst>
       <p:ext uri="{BB962C8B-B14F-4D97-AF65-F5344CB8AC3E}">
-        <p14:creationId xmlns:p14="http://schemas.microsoft.com/office/powerpoint/2010/main" val="1042443609"/>
+        <p14:creationId xmlns:p14="http://schemas.microsoft.com/office/powerpoint/2010/main" val="1602480384"/>
       </p:ext>
     </p:extLst>
   </p:cSld>

</xml_diff>

<commit_message>
Updating master presentation and removing indv ppt
</commit_message>
<xml_diff>
--- a/Presentation/GiterDun Presentation.pptx
+++ b/Presentation/GiterDun Presentation.pptx
@@ -814,7 +814,7 @@
           <a:p>
             <a:fld id="{69685EF1-E703-46DB-B8E6-B1636C21AD63}" type="datetimeFigureOut">
               <a:rPr lang="en-US" smtClean="0"/>
-              <a:t>9/10/2019</a:t>
+              <a:t>9/11/2019</a:t>
             </a:fld>
             <a:endParaRPr lang="en-US"/>
           </a:p>
@@ -1397,7 +1397,7 @@
           <a:p>
             <a:r>
               <a:rPr lang="en-US" dirty="0"/>
-              <a:t>Macro view of where the companies and funding are</a:t>
+              <a:t>Macro view of where the companies and funding are. This is a good visual of where are the companies, and where is the funding?</a:t>
             </a:r>
           </a:p>
         </p:txBody>
@@ -1481,6 +1481,40 @@
         <p:txBody>
           <a:bodyPr/>
           <a:lstStyle/>
+          <a:p>
+            <a:r>
+              <a:rPr lang="en-US" dirty="0"/>
+              <a:t>Diving deeper into the details, we plotted the data in a heatmap to see if we can see any trends. At the macro level, 2 categories: Technology and Software are apparent across most of the cities. When we zoom in, by filtering out category funding of under $1B, we can see these trends more clearly. NY and </a:t>
+            </a:r>
+            <a:r>
+              <a:rPr lang="en-US" dirty="0" err="1"/>
+              <a:t>SanFran</a:t>
+            </a:r>
+            <a:r>
+              <a:rPr lang="en-US" dirty="0"/>
+              <a:t> are also very popular across all categories. </a:t>
+            </a:r>
+          </a:p>
+          <a:p>
+            <a:r>
+              <a:rPr lang="en-US" dirty="0"/>
+              <a:t>Marketing/Software in NY</a:t>
+            </a:r>
+          </a:p>
+          <a:p>
+            <a:r>
+              <a:rPr lang="en-US" dirty="0"/>
+              <a:t>Finance/Software/Transportation in San Fran. Finance was interesting, but is in-line with the </a:t>
+            </a:r>
+            <a:r>
+              <a:rPr lang="en-US" dirty="0" err="1"/>
+              <a:t>fintechs</a:t>
+            </a:r>
+            <a:r>
+              <a:rPr lang="en-US" dirty="0"/>
+              <a:t> coming out of silicon valley.</a:t>
+            </a:r>
+          </a:p>
           <a:p>
             <a:r>
               <a:rPr lang="en-US" dirty="0"/>
@@ -9270,8 +9304,8 @@
         </p:nvSpPr>
         <p:spPr>
           <a:xfrm>
-            <a:off x="105295" y="1"/>
-            <a:ext cx="11953701" cy="725978"/>
+            <a:off x="0" y="1"/>
+            <a:ext cx="11953701" cy="635070"/>
           </a:xfrm>
         </p:spPr>
         <p:txBody>
@@ -9582,7 +9616,12 @@
             <p:ph type="title"/>
           </p:nvPr>
         </p:nvSpPr>
-        <p:spPr/>
+        <p:spPr>
+          <a:xfrm>
+            <a:off x="35575" y="15501"/>
+            <a:ext cx="11318225" cy="777875"/>
+          </a:xfrm>
+        </p:spPr>
         <p:txBody>
           <a:bodyPr/>
           <a:lstStyle/>
@@ -9933,16 +9972,20 @@
         </p:nvSpPr>
         <p:spPr>
           <a:xfrm>
-            <a:off x="243963" y="196321"/>
-            <a:ext cx="10666084" cy="677022"/>
-          </a:xfrm>
-        </p:spPr>
-        <p:txBody>
-          <a:bodyPr/>
+            <a:off x="0" y="18035"/>
+            <a:ext cx="10666084" cy="536544"/>
+          </a:xfrm>
+        </p:spPr>
+        <p:txBody>
+          <a:bodyPr>
+            <a:noAutofit/>
+          </a:bodyPr>
           <a:lstStyle/>
           <a:p>
             <a:r>
-              <a:rPr lang="en-US" dirty="0"/>
+              <a:rPr lang="en-US" dirty="0">
+                <a:latin typeface="Lato" panose="020F0502020204030203"/>
+              </a:rPr>
               <a:t>Company Status by Category</a:t>
             </a:r>
           </a:p>
@@ -9962,7 +10005,7 @@
         </p:nvGrpSpPr>
         <p:grpSpPr>
           <a:xfrm>
-            <a:off x="4281069" y="873343"/>
+            <a:off x="4240728" y="873343"/>
             <a:ext cx="7666968" cy="5111313"/>
             <a:chOff x="2262516" y="1690688"/>
             <a:chExt cx="7666968" cy="5111313"/>
@@ -10525,6 +10568,51 @@
           </a:p>
         </p:txBody>
       </p:sp>
+      <p:sp>
+        <p:nvSpPr>
+          <p:cNvPr id="21" name="TextBox 20">
+            <a:extLst>
+              <a:ext uri="{FF2B5EF4-FFF2-40B4-BE49-F238E27FC236}">
+                <a16:creationId xmlns:a16="http://schemas.microsoft.com/office/drawing/2014/main" id="{52597D3B-E998-42AF-9AF5-6A605ADBB32A}"/>
+              </a:ext>
+            </a:extLst>
+          </p:cNvPr>
+          <p:cNvSpPr txBox="1"/>
+          <p:nvPr/>
+        </p:nvSpPr>
+        <p:spPr>
+          <a:xfrm>
+            <a:off x="198800" y="1332376"/>
+            <a:ext cx="3378118" cy="646331"/>
+          </a:xfrm>
+          <a:prstGeom prst="rect">
+            <a:avLst/>
+          </a:prstGeom>
+          <a:noFill/>
+        </p:spPr>
+        <p:txBody>
+          <a:bodyPr wrap="square" rtlCol="0">
+            <a:spAutoFit/>
+          </a:bodyPr>
+          <a:lstStyle/>
+          <a:p>
+            <a:endParaRPr lang="en-US" dirty="0">
+              <a:solidFill>
+                <a:srgbClr val="FF0000"/>
+              </a:solidFill>
+              <a:latin typeface="Lato" panose="020F0502020204030203"/>
+            </a:endParaRPr>
+          </a:p>
+          <a:p>
+            <a:r>
+              <a:rPr lang="en-US" dirty="0">
+                <a:latin typeface="Lato" panose="020F0502020204030203"/>
+              </a:rPr>
+              <a:t>We have observed ….</a:t>
+            </a:r>
+          </a:p>
+        </p:txBody>
+      </p:sp>
     </p:spTree>
     <p:extLst>
       <p:ext uri="{BB962C8B-B14F-4D97-AF65-F5344CB8AC3E}">
@@ -10571,7 +10659,12 @@
             <p:ph type="title"/>
           </p:nvPr>
         </p:nvSpPr>
-        <p:spPr/>
+        <p:spPr>
+          <a:xfrm>
+            <a:off x="0" y="0"/>
+            <a:ext cx="10515600" cy="646331"/>
+          </a:xfrm>
+        </p:spPr>
         <p:txBody>
           <a:bodyPr/>
           <a:lstStyle/>
@@ -10886,8 +10979,8 @@
         </p:nvSpPr>
         <p:spPr>
           <a:xfrm>
-            <a:off x="838200" y="82855"/>
-            <a:ext cx="10515600" cy="1325563"/>
+            <a:off x="0" y="31922"/>
+            <a:ext cx="10515600" cy="687772"/>
           </a:xfrm>
         </p:spPr>
         <p:txBody>
@@ -11707,7 +11800,12 @@
             <p:ph type="title"/>
           </p:nvPr>
         </p:nvSpPr>
-        <p:spPr/>
+        <p:spPr>
+          <a:xfrm>
+            <a:off x="0" y="0"/>
+            <a:ext cx="10515600" cy="677022"/>
+          </a:xfrm>
+        </p:spPr>
         <p:txBody>
           <a:bodyPr/>
           <a:lstStyle/>
@@ -12049,8 +12147,8 @@
         </p:nvSpPr>
         <p:spPr>
           <a:xfrm>
-            <a:off x="838200" y="365125"/>
-            <a:ext cx="10515600" cy="1325563"/>
+            <a:off x="35575" y="0"/>
+            <a:ext cx="10423996" cy="683746"/>
           </a:xfrm>
           <a:prstGeom prst="rect">
             <a:avLst/>
@@ -12104,7 +12202,7 @@
         <p:spPr>
           <a:xfrm>
             <a:off x="360218" y="1506022"/>
-            <a:ext cx="10993582" cy="2215991"/>
+            <a:ext cx="10993582" cy="3139321"/>
           </a:xfrm>
           <a:prstGeom prst="rect">
             <a:avLst/>
@@ -12124,7 +12222,7 @@
               <a:buChar char="•"/>
             </a:pPr>
             <a:r>
-              <a:rPr lang="en-US" dirty="0">
+              <a:rPr lang="en-US" sz="2400" dirty="0">
                 <a:solidFill>
                   <a:srgbClr val="000000"/>
                 </a:solidFill>
@@ -12142,7 +12240,7 @@
               <a:buChar char="•"/>
             </a:pPr>
             <a:r>
-              <a:rPr lang="en-US" dirty="0">
+              <a:rPr lang="en-US" sz="2400" dirty="0">
                 <a:solidFill>
                   <a:srgbClr val="000000"/>
                 </a:solidFill>
@@ -12160,7 +12258,7 @@
               <a:buChar char="•"/>
             </a:pPr>
             <a:r>
-              <a:rPr lang="en-US" dirty="0">
+              <a:rPr lang="en-US" sz="2400" dirty="0">
                 <a:solidFill>
                   <a:srgbClr val="000000"/>
                 </a:solidFill>
@@ -12168,7 +12266,7 @@
               </a:rPr>
               <a:t>Git.</a:t>
             </a:r>
-            <a:endParaRPr lang="en-US" dirty="0">
+            <a:endParaRPr lang="en-US" sz="2400" dirty="0">
               <a:solidFill>
                 <a:srgbClr val="FF0000"/>
               </a:solidFill>
@@ -12181,7 +12279,7 @@
                 <a:spcPts val="1200"/>
               </a:spcBef>
             </a:pPr>
-            <a:endParaRPr lang="en-US" dirty="0">
+            <a:endParaRPr lang="en-US" sz="2400" dirty="0">
               <a:solidFill>
                 <a:srgbClr val="000000"/>
               </a:solidFill>
@@ -12650,11 +12748,13 @@
         </p:nvSpPr>
         <p:spPr/>
         <p:txBody>
-          <a:bodyPr/>
+          <a:bodyPr>
+            <a:normAutofit/>
+          </a:bodyPr>
           <a:lstStyle/>
           <a:p>
             <a:r>
-              <a:rPr lang="en-US" dirty="0">
+              <a:rPr lang="en-US" sz="3600" dirty="0">
                 <a:latin typeface="Lato" panose="020F0502020204030203"/>
               </a:rPr>
               <a:t>Appendix</a:t>
@@ -12708,9 +12808,16 @@
             <p:ph type="title"/>
           </p:nvPr>
         </p:nvSpPr>
-        <p:spPr/>
-        <p:txBody>
-          <a:bodyPr/>
+        <p:spPr>
+          <a:xfrm>
+            <a:off x="0" y="0"/>
+            <a:ext cx="10515600" cy="555999"/>
+          </a:xfrm>
+        </p:spPr>
+        <p:txBody>
+          <a:bodyPr>
+            <a:noAutofit/>
+          </a:bodyPr>
           <a:lstStyle/>
           <a:p>
             <a:r>
@@ -15561,7 +15668,12 @@
             <p:ph type="title"/>
           </p:nvPr>
         </p:nvSpPr>
-        <p:spPr/>
+        <p:spPr>
+          <a:xfrm>
+            <a:off x="0" y="0"/>
+            <a:ext cx="10515600" cy="656851"/>
+          </a:xfrm>
+        </p:spPr>
         <p:txBody>
           <a:bodyPr/>
           <a:lstStyle/>
@@ -15589,8 +15701,8 @@
         </p:nvSpPr>
         <p:spPr>
           <a:xfrm>
-            <a:off x="426721" y="1456163"/>
-            <a:ext cx="10695708" cy="5078313"/>
+            <a:off x="379656" y="911557"/>
+            <a:ext cx="10695708" cy="5632311"/>
           </a:xfrm>
           <a:prstGeom prst="rect">
             <a:avLst/>
@@ -15607,7 +15719,7 @@
               <a:buAutoNum type="arabicPeriod"/>
             </a:pPr>
             <a:r>
-              <a:rPr lang="en-US" dirty="0">
+              <a:rPr lang="en-US" sz="2400" dirty="0">
                 <a:solidFill>
                   <a:schemeClr val="bg1"/>
                 </a:solidFill>
@@ -15622,7 +15734,7 @@
               <a:buAutoNum type="arabicPeriod"/>
             </a:pPr>
             <a:r>
-              <a:rPr lang="en-US" dirty="0">
+              <a:rPr lang="en-US" sz="2400" dirty="0">
                 <a:solidFill>
                   <a:schemeClr val="bg1"/>
                 </a:solidFill>
@@ -15637,7 +15749,7 @@
               <a:buAutoNum type="arabicPeriod"/>
             </a:pPr>
             <a:r>
-              <a:rPr lang="en-US" dirty="0">
+              <a:rPr lang="en-US" sz="2400" dirty="0">
                 <a:solidFill>
                   <a:schemeClr val="bg1"/>
                 </a:solidFill>
@@ -15652,7 +15764,7 @@
               <a:buAutoNum type="alphaLcPeriod"/>
             </a:pPr>
             <a:r>
-              <a:rPr lang="en-US" dirty="0">
+              <a:rPr lang="en-US" sz="2400" dirty="0">
                 <a:solidFill>
                   <a:schemeClr val="bg1"/>
                 </a:solidFill>
@@ -15667,7 +15779,7 @@
               <a:buAutoNum type="alphaLcPeriod"/>
             </a:pPr>
             <a:r>
-              <a:rPr lang="en-US" dirty="0">
+              <a:rPr lang="en-US" sz="2400" dirty="0">
                 <a:solidFill>
                   <a:schemeClr val="bg1"/>
                 </a:solidFill>
@@ -15682,7 +15794,7 @@
               <a:buAutoNum type="alphaLcPeriod"/>
             </a:pPr>
             <a:r>
-              <a:rPr lang="en-US" dirty="0">
+              <a:rPr lang="en-US" sz="2400" dirty="0">
                 <a:solidFill>
                   <a:schemeClr val="bg1"/>
                 </a:solidFill>
@@ -15697,7 +15809,7 @@
               <a:buAutoNum type="alphaLcPeriod"/>
             </a:pPr>
             <a:r>
-              <a:rPr lang="en-US" dirty="0">
+              <a:rPr lang="en-US" sz="2400" dirty="0">
                 <a:solidFill>
                   <a:schemeClr val="bg1"/>
                 </a:solidFill>
@@ -15712,7 +15824,7 @@
               <a:buAutoNum type="alphaLcPeriod"/>
             </a:pPr>
             <a:r>
-              <a:rPr lang="en-US" dirty="0">
+              <a:rPr lang="en-US" sz="2400" dirty="0">
                 <a:solidFill>
                   <a:schemeClr val="bg1"/>
                 </a:solidFill>
@@ -15727,7 +15839,7 @@
               <a:buAutoNum type="alphaLcPeriod"/>
             </a:pPr>
             <a:r>
-              <a:rPr lang="en-US" dirty="0">
+              <a:rPr lang="en-US" sz="2400" dirty="0">
                 <a:solidFill>
                   <a:schemeClr val="bg1"/>
                 </a:solidFill>
@@ -15742,7 +15854,7 @@
               <a:buAutoNum type="alphaLcPeriod"/>
             </a:pPr>
             <a:r>
-              <a:rPr lang="en-US" dirty="0">
+              <a:rPr lang="en-US" sz="2400" dirty="0">
                 <a:solidFill>
                   <a:schemeClr val="bg1"/>
                 </a:solidFill>
@@ -15757,7 +15869,7 @@
               <a:buAutoNum type="alphaLcPeriod"/>
             </a:pPr>
             <a:r>
-              <a:rPr lang="en-US" dirty="0">
+              <a:rPr lang="en-US" sz="2400" dirty="0">
                 <a:solidFill>
                   <a:schemeClr val="bg1"/>
                 </a:solidFill>
@@ -15772,7 +15884,7 @@
               <a:buAutoNum type="alphaLcPeriod"/>
             </a:pPr>
             <a:r>
-              <a:rPr lang="en-US" dirty="0">
+              <a:rPr lang="en-US" sz="2400" dirty="0">
                 <a:solidFill>
                   <a:schemeClr val="bg1"/>
                 </a:solidFill>
@@ -15787,7 +15899,7 @@
               <a:buAutoNum type="arabicPeriod"/>
             </a:pPr>
             <a:r>
-              <a:rPr lang="en-US" dirty="0">
+              <a:rPr lang="en-US" sz="2400" dirty="0">
                 <a:solidFill>
                   <a:schemeClr val="bg1"/>
                 </a:solidFill>
@@ -15802,7 +15914,7 @@
               <a:buAutoNum type="arabicPeriod"/>
             </a:pPr>
             <a:r>
-              <a:rPr lang="en-US" dirty="0">
+              <a:rPr lang="en-US" sz="2400" dirty="0">
                 <a:solidFill>
                   <a:schemeClr val="bg1"/>
                 </a:solidFill>
@@ -15817,7 +15929,7 @@
               <a:buAutoNum type="arabicPeriod"/>
             </a:pPr>
             <a:r>
-              <a:rPr lang="en-US" dirty="0">
+              <a:rPr lang="en-US" sz="2400" dirty="0">
                 <a:solidFill>
                   <a:schemeClr val="bg1"/>
                 </a:solidFill>
@@ -15825,42 +15937,6 @@
               </a:rPr>
               <a:t>Appendix</a:t>
             </a:r>
-          </a:p>
-          <a:p>
-            <a:pPr marL="800100" lvl="1" indent="-342900" fontAlgn="base">
-              <a:buFont typeface="+mj-lt"/>
-              <a:buAutoNum type="alphaLcPeriod"/>
-            </a:pPr>
-            <a:endParaRPr lang="en-US" dirty="0">
-              <a:solidFill>
-                <a:schemeClr val="bg1"/>
-              </a:solidFill>
-              <a:latin typeface="Lato" panose="020F0502020204030203"/>
-            </a:endParaRPr>
-          </a:p>
-          <a:p>
-            <a:pPr marL="800100" lvl="1" indent="-342900" fontAlgn="base">
-              <a:buFont typeface="+mj-lt"/>
-              <a:buAutoNum type="alphaLcPeriod"/>
-            </a:pPr>
-            <a:endParaRPr lang="en-US" dirty="0">
-              <a:solidFill>
-                <a:schemeClr val="bg1"/>
-              </a:solidFill>
-              <a:latin typeface="Lato" panose="020F0502020204030203"/>
-            </a:endParaRPr>
-          </a:p>
-          <a:p>
-            <a:pPr marL="800100" lvl="1" indent="-342900" fontAlgn="base">
-              <a:buFont typeface="+mj-lt"/>
-              <a:buAutoNum type="alphaLcPeriod"/>
-            </a:pPr>
-            <a:endParaRPr lang="en-US" dirty="0">
-              <a:solidFill>
-                <a:schemeClr val="bg1"/>
-              </a:solidFill>
-              <a:latin typeface="Lato" panose="020F0502020204030203"/>
-            </a:endParaRPr>
           </a:p>
         </p:txBody>
       </p:sp>
@@ -16084,8 +16160,8 @@
         </p:nvSpPr>
         <p:spPr>
           <a:xfrm>
-            <a:off x="838200" y="365125"/>
-            <a:ext cx="10515600" cy="1325563"/>
+            <a:off x="0" y="0"/>
+            <a:ext cx="10515600" cy="697193"/>
           </a:xfrm>
         </p:spPr>
         <p:txBody>
@@ -16116,7 +16192,7 @@
         <p:spPr>
           <a:xfrm>
             <a:off x="20165" y="1469611"/>
-            <a:ext cx="11672047" cy="3170099"/>
+            <a:ext cx="11672047" cy="4708981"/>
           </a:xfrm>
           <a:prstGeom prst="rect">
             <a:avLst/>
@@ -16136,7 +16212,7 @@
               <a:buChar char="•"/>
             </a:pPr>
             <a:r>
-              <a:rPr lang="en-US" sz="2000" dirty="0">
+              <a:rPr lang="en-US" sz="2400" dirty="0">
                 <a:solidFill>
                   <a:srgbClr val="000000"/>
                 </a:solidFill>
@@ -16154,7 +16230,7 @@
               <a:buChar char="•"/>
             </a:pPr>
             <a:r>
-              <a:rPr lang="en-US" sz="2000" dirty="0">
+              <a:rPr lang="en-US" sz="2400" dirty="0">
                 <a:solidFill>
                   <a:srgbClr val="000000"/>
                 </a:solidFill>
@@ -16172,7 +16248,7 @@
               <a:buChar char="•"/>
             </a:pPr>
             <a:r>
-              <a:rPr lang="en-US" sz="2000" dirty="0">
+              <a:rPr lang="en-US" sz="2400" dirty="0">
                 <a:solidFill>
                   <a:srgbClr val="000000"/>
                 </a:solidFill>
@@ -16181,7 +16257,7 @@
               <a:t>After we had some observations, we cleaned this data utilizing a combination of pandas and </a:t>
             </a:r>
             <a:r>
-              <a:rPr lang="en-US" sz="2000" dirty="0" err="1">
+              <a:rPr lang="en-US" sz="2400" dirty="0" err="1">
                 <a:solidFill>
                   <a:srgbClr val="000000"/>
                 </a:solidFill>
@@ -16189,7 +16265,7 @@
               </a:rPr>
               <a:t>xls</a:t>
             </a:r>
-            <a:endParaRPr lang="en-US" sz="2000" dirty="0">
+            <a:endParaRPr lang="en-US" sz="2400" dirty="0">
               <a:solidFill>
                 <a:srgbClr val="000000"/>
               </a:solidFill>
@@ -16205,7 +16281,7 @@
               <a:buChar char="•"/>
             </a:pPr>
             <a:r>
-              <a:rPr lang="en-US" sz="2000" dirty="0">
+              <a:rPr lang="en-US" sz="2400" dirty="0">
                 <a:solidFill>
                   <a:srgbClr val="000000"/>
                 </a:solidFill>
@@ -16214,7 +16290,7 @@
               <a:t>We then pulled in weather data from weather </a:t>
             </a:r>
             <a:r>
-              <a:rPr lang="en-US" sz="2000" dirty="0" err="1">
+              <a:rPr lang="en-US" sz="2400" dirty="0" err="1">
                 <a:solidFill>
                   <a:srgbClr val="000000"/>
                 </a:solidFill>
@@ -16223,7 +16299,7 @@
               <a:t>api</a:t>
             </a:r>
             <a:r>
-              <a:rPr lang="en-US" sz="2000" dirty="0">
+              <a:rPr lang="en-US" sz="2400" dirty="0">
                 <a:solidFill>
                   <a:srgbClr val="000000"/>
                 </a:solidFill>
@@ -16241,7 +16317,7 @@
               <a:buChar char="•"/>
             </a:pPr>
             <a:r>
-              <a:rPr lang="en-US" sz="2000" dirty="0">
+              <a:rPr lang="en-US" sz="2400" dirty="0">
                 <a:solidFill>
                   <a:srgbClr val="000000"/>
                 </a:solidFill>
@@ -16259,7 +16335,7 @@
               <a:buChar char="•"/>
             </a:pPr>
             <a:r>
-              <a:rPr lang="en-US" sz="2000" dirty="0">
+              <a:rPr lang="en-US" sz="2400" dirty="0">
                 <a:solidFill>
                   <a:srgbClr val="000000"/>
                 </a:solidFill>
@@ -16277,7 +16353,7 @@
               <a:buChar char="•"/>
             </a:pPr>
             <a:r>
-              <a:rPr lang="en-US" sz="2000" dirty="0">
+              <a:rPr lang="en-US" sz="2400" dirty="0">
                 <a:solidFill>
                   <a:srgbClr val="000000"/>
                 </a:solidFill>
@@ -16506,7 +16582,12 @@
             <p:ph type="title"/>
           </p:nvPr>
         </p:nvSpPr>
-        <p:spPr/>
+        <p:spPr>
+          <a:xfrm>
+            <a:off x="0" y="0"/>
+            <a:ext cx="10515600" cy="724087"/>
+          </a:xfrm>
+        </p:spPr>
         <p:txBody>
           <a:bodyPr/>
           <a:lstStyle/>
@@ -16532,8 +16613,8 @@
         </p:nvSpPr>
         <p:spPr>
           <a:xfrm>
-            <a:off x="100853" y="1506022"/>
-            <a:ext cx="11860305" cy="4862870"/>
+            <a:off x="0" y="537833"/>
+            <a:ext cx="12080221" cy="6401753"/>
           </a:xfrm>
           <a:prstGeom prst="rect">
             <a:avLst/>
@@ -16553,7 +16634,7 @@
               <a:buChar char="•"/>
             </a:pPr>
             <a:r>
-              <a:rPr lang="en-US" sz="2000" dirty="0">
+              <a:rPr lang="en-US" sz="2400" dirty="0">
                 <a:solidFill>
                   <a:srgbClr val="000000"/>
                 </a:solidFill>
@@ -16571,7 +16652,7 @@
               <a:buChar char="•"/>
             </a:pPr>
             <a:r>
-              <a:rPr lang="en-US" sz="2000" dirty="0">
+              <a:rPr lang="en-US" sz="2400" dirty="0">
                 <a:solidFill>
                   <a:srgbClr val="000000"/>
                 </a:solidFill>
@@ -16589,7 +16670,7 @@
               <a:buChar char="•"/>
             </a:pPr>
             <a:r>
-              <a:rPr lang="en-US" sz="2000" dirty="0">
+              <a:rPr lang="en-US" sz="2400" dirty="0">
                 <a:solidFill>
                   <a:srgbClr val="000000"/>
                 </a:solidFill>
@@ -16607,7 +16688,7 @@
               <a:buChar char="•"/>
             </a:pPr>
             <a:r>
-              <a:rPr lang="en-US" sz="2000" dirty="0">
+              <a:rPr lang="en-US" sz="2400" dirty="0">
                 <a:solidFill>
                   <a:srgbClr val="000000"/>
                 </a:solidFill>
@@ -16625,7 +16706,7 @@
               <a:buChar char="•"/>
             </a:pPr>
             <a:r>
-              <a:rPr lang="en-US" sz="2000" dirty="0">
+              <a:rPr lang="en-US" sz="2400" dirty="0">
                 <a:solidFill>
                   <a:srgbClr val="000000"/>
                 </a:solidFill>
@@ -16643,7 +16724,7 @@
               <a:buChar char="•"/>
             </a:pPr>
             <a:r>
-              <a:rPr lang="en-US" sz="2000" dirty="0">
+              <a:rPr lang="en-US" sz="2400" dirty="0">
                 <a:solidFill>
                   <a:srgbClr val="000000"/>
                 </a:solidFill>
@@ -16874,8 +16955,8 @@
         </p:nvSpPr>
         <p:spPr>
           <a:xfrm>
-            <a:off x="105295" y="1"/>
-            <a:ext cx="11953701" cy="725978"/>
+            <a:off x="0" y="6125"/>
+            <a:ext cx="11953701" cy="631670"/>
           </a:xfrm>
         </p:spPr>
         <p:txBody>
@@ -16967,7 +17048,7 @@
         </p:nvSpPr>
         <p:spPr>
           <a:xfrm>
-            <a:off x="205047" y="1363287"/>
+            <a:off x="124361" y="1363287"/>
             <a:ext cx="3096206" cy="2031325"/>
           </a:xfrm>
           <a:prstGeom prst="rect">
@@ -17159,6 +17240,88 @@
             <a:endParaRPr lang="en-US" sz="1000" dirty="0">
               <a:latin typeface="Lato" panose="020F0502020204030203"/>
             </a:endParaRPr>
+          </a:p>
+        </p:txBody>
+      </p:sp>
+      <p:sp>
+        <p:nvSpPr>
+          <p:cNvPr id="6" name="TextBox 5">
+            <a:extLst>
+              <a:ext uri="{FF2B5EF4-FFF2-40B4-BE49-F238E27FC236}">
+                <a16:creationId xmlns:a16="http://schemas.microsoft.com/office/drawing/2014/main" id="{783CF480-9F0E-46C0-9670-D6296C32FCE4}"/>
+              </a:ext>
+            </a:extLst>
+          </p:cNvPr>
+          <p:cNvSpPr txBox="1"/>
+          <p:nvPr/>
+        </p:nvSpPr>
+        <p:spPr>
+          <a:xfrm>
+            <a:off x="4941794" y="681758"/>
+            <a:ext cx="4740088" cy="369332"/>
+          </a:xfrm>
+          <a:prstGeom prst="rect">
+            <a:avLst/>
+          </a:prstGeom>
+          <a:noFill/>
+        </p:spPr>
+        <p:txBody>
+          <a:bodyPr wrap="square" rtlCol="0">
+            <a:spAutoFit/>
+          </a:bodyPr>
+          <a:lstStyle/>
+          <a:p>
+            <a:pPr algn="ctr"/>
+            <a:r>
+              <a:rPr lang="en-US" b="1" dirty="0">
+                <a:solidFill>
+                  <a:schemeClr val="bg1"/>
+                </a:solidFill>
+                <a:latin typeface="Lato" panose="020F0502020204030203"/>
+              </a:rPr>
+              <a:t>Count of companies by city</a:t>
+            </a:r>
+          </a:p>
+        </p:txBody>
+      </p:sp>
+      <p:sp>
+        <p:nvSpPr>
+          <p:cNvPr id="9" name="TextBox 8">
+            <a:extLst>
+              <a:ext uri="{FF2B5EF4-FFF2-40B4-BE49-F238E27FC236}">
+                <a16:creationId xmlns:a16="http://schemas.microsoft.com/office/drawing/2014/main" id="{B81B5936-C51A-4F49-8530-5A8FEB874253}"/>
+              </a:ext>
+            </a:extLst>
+          </p:cNvPr>
+          <p:cNvSpPr txBox="1"/>
+          <p:nvPr/>
+        </p:nvSpPr>
+        <p:spPr>
+          <a:xfrm>
+            <a:off x="4941794" y="3703928"/>
+            <a:ext cx="4740088" cy="369332"/>
+          </a:xfrm>
+          <a:prstGeom prst="rect">
+            <a:avLst/>
+          </a:prstGeom>
+          <a:noFill/>
+        </p:spPr>
+        <p:txBody>
+          <a:bodyPr wrap="square" rtlCol="0">
+            <a:spAutoFit/>
+          </a:bodyPr>
+          <a:lstStyle/>
+          <a:p>
+            <a:pPr algn="ctr"/>
+            <a:r>
+              <a:rPr lang="en-US" b="1" dirty="0">
+                <a:solidFill>
+                  <a:schemeClr val="bg1"/>
+                </a:solidFill>
+                <a:latin typeface="Lato" panose="020F0502020204030203"/>
+              </a:rPr>
+              <a:t>Total funding by city</a:t>
+            </a:r>
           </a:p>
         </p:txBody>
       </p:sp>
@@ -17240,8 +17403,8 @@
         </p:nvSpPr>
         <p:spPr>
           <a:xfrm>
-            <a:off x="105295" y="1"/>
-            <a:ext cx="11953701" cy="725978"/>
+            <a:off x="0" y="0"/>
+            <a:ext cx="11953701" cy="652181"/>
           </a:xfrm>
         </p:spPr>
         <p:txBody>
@@ -17251,7 +17414,9 @@
           <a:lstStyle/>
           <a:p>
             <a:r>
-              <a:rPr lang="en-US" dirty="0"/>
+              <a:rPr lang="en-US" dirty="0">
+                <a:latin typeface="Lato" panose="020F0502020204030203"/>
+              </a:rPr>
               <a:t>Total Funding by Category by City</a:t>
             </a:r>
           </a:p>
@@ -17688,8 +17853,8 @@
         </p:nvSpPr>
         <p:spPr>
           <a:xfrm>
-            <a:off x="105295" y="1"/>
-            <a:ext cx="11953701" cy="725978"/>
+            <a:off x="0" y="0"/>
+            <a:ext cx="11953701" cy="591670"/>
           </a:xfrm>
         </p:spPr>
         <p:txBody>

</xml_diff>

<commit_message>
updated charles slides in pptx
</commit_message>
<xml_diff>
--- a/Presentation/GiterDun Presentation.pptx
+++ b/Presentation/GiterDun Presentation.pptx
@@ -1692,13 +1692,8 @@
           <a:p>
             <a:r>
               <a:rPr lang="en-US" dirty="0"/>
-              <a:t>Focus is by state and micro of city. City proves NYC and San Fran as biggest cities </a:t>
-            </a:r>
-            <a:r>
-              <a:rPr lang="en-US"/>
-              <a:t>for investments</a:t>
-            </a:r>
-            <a:endParaRPr lang="en-US" dirty="0"/>
+              <a:t>Focus is by state and micro of city. City proves NYC and San Fran as biggest cities for investments</a:t>
+            </a:r>
           </a:p>
         </p:txBody>
       </p:sp>
@@ -9627,11 +9622,26 @@
           <a:lstStyle/>
           <a:p>
             <a:r>
+              <a:rPr lang="en-US" dirty="0" smtClean="0">
+                <a:latin typeface="Lato" panose="020F0502020204030203"/>
+              </a:rPr>
+              <a:t>Investors: </a:t>
+            </a:r>
+            <a:r>
               <a:rPr lang="en-US" dirty="0">
                 <a:latin typeface="Lato" panose="020F0502020204030203"/>
               </a:rPr>
-              <a:t>Plot of Investors by State</a:t>
-            </a:r>
+              <a:t>by </a:t>
+            </a:r>
+            <a:r>
+              <a:rPr lang="en-US" dirty="0" smtClean="0">
+                <a:latin typeface="Lato" panose="020F0502020204030203"/>
+              </a:rPr>
+              <a:t>State &amp; City</a:t>
+            </a:r>
+            <a:endParaRPr lang="en-US" dirty="0">
+              <a:latin typeface="Lato" panose="020F0502020204030203"/>
+            </a:endParaRPr>
           </a:p>
         </p:txBody>
       </p:sp>
@@ -9699,8 +9709,8 @@
         </p:blipFill>
         <p:spPr>
           <a:xfrm>
-            <a:off x="8269959" y="289111"/>
-            <a:ext cx="3862564" cy="2215294"/>
+            <a:off x="7729870" y="154354"/>
+            <a:ext cx="4402653" cy="2525051"/>
           </a:xfrm>
           <a:prstGeom prst="rect">
             <a:avLst/>
@@ -9722,7 +9732,7 @@
         <p:spPr>
           <a:xfrm>
             <a:off x="198800" y="1332376"/>
-            <a:ext cx="3378118" cy="646331"/>
+            <a:ext cx="3378118" cy="4524315"/>
           </a:xfrm>
           <a:prstGeom prst="rect">
             <a:avLst/>
@@ -9735,20 +9745,63 @@
           </a:bodyPr>
           <a:lstStyle/>
           <a:p>
-            <a:endParaRPr lang="en-US" dirty="0">
-              <a:solidFill>
-                <a:srgbClr val="FF0000"/>
-              </a:solidFill>
-              <a:latin typeface="Lato" panose="020F0502020204030203"/>
-            </a:endParaRPr>
-          </a:p>
-          <a:p>
+            <a:r>
+              <a:rPr lang="en-US" dirty="0" smtClean="0">
+                <a:latin typeface="Lato" panose="020F0502020204030203"/>
+              </a:rPr>
+              <a:t>We </a:t>
+            </a:r>
             <a:r>
               <a:rPr lang="en-US" dirty="0">
                 <a:latin typeface="Lato" panose="020F0502020204030203"/>
               </a:rPr>
-              <a:t>We have observed ….</a:t>
-            </a:r>
+              <a:t>have observed </a:t>
+            </a:r>
+            <a:r>
+              <a:rPr lang="en-US" dirty="0" smtClean="0">
+                <a:latin typeface="Lato" panose="020F0502020204030203"/>
+              </a:rPr>
+              <a:t>that the California had the top number of investors of any other state with roughly 50% of total investors </a:t>
+            </a:r>
+          </a:p>
+          <a:p>
+            <a:endParaRPr lang="en-US" dirty="0" smtClean="0">
+              <a:latin typeface="Lato" panose="020F0502020204030203"/>
+            </a:endParaRPr>
+          </a:p>
+          <a:p>
+            <a:endParaRPr lang="en-US" dirty="0" smtClean="0">
+              <a:latin typeface="Lato" panose="020F0502020204030203"/>
+            </a:endParaRPr>
+          </a:p>
+          <a:p>
+            <a:r>
+              <a:rPr lang="en-US" dirty="0" smtClean="0">
+                <a:latin typeface="Lato" panose="020F0502020204030203"/>
+              </a:rPr>
+              <a:t>While San Francisco has the highest number of investors by city (24%), NYC has the highest percentage of total investors in respect to its state (91%)</a:t>
+            </a:r>
+          </a:p>
+          <a:p>
+            <a:endParaRPr lang="en-US" dirty="0">
+              <a:latin typeface="Lato" panose="020F0502020204030203"/>
+            </a:endParaRPr>
+          </a:p>
+          <a:p>
+            <a:endParaRPr lang="en-US" dirty="0" smtClean="0">
+              <a:latin typeface="Lato" panose="020F0502020204030203"/>
+            </a:endParaRPr>
+          </a:p>
+          <a:p>
+            <a:r>
+              <a:rPr lang="en-US" dirty="0" smtClean="0">
+                <a:latin typeface="Lato" panose="020F0502020204030203"/>
+              </a:rPr>
+              <a:t>Both figures point to high concentration on investors at costal states and cities </a:t>
+            </a:r>
+            <a:endParaRPr lang="en-US" dirty="0">
+              <a:latin typeface="Lato" panose="020F0502020204030203"/>
+            </a:endParaRPr>
           </a:p>
         </p:txBody>
       </p:sp>
@@ -10583,7 +10636,7 @@
         <p:spPr>
           <a:xfrm>
             <a:off x="198800" y="1332376"/>
-            <a:ext cx="3378118" cy="646331"/>
+            <a:ext cx="3378118" cy="2585323"/>
           </a:xfrm>
           <a:prstGeom prst="rect">
             <a:avLst/>
@@ -10597,19 +10650,58 @@
           <a:lstStyle/>
           <a:p>
             <a:endParaRPr lang="en-US" dirty="0">
-              <a:solidFill>
-                <a:srgbClr val="FF0000"/>
-              </a:solidFill>
               <a:latin typeface="Lato" panose="020F0502020204030203"/>
             </a:endParaRPr>
           </a:p>
           <a:p>
+            <a:r>
+              <a:rPr lang="en-US" dirty="0" smtClean="0">
+                <a:latin typeface="Lato" panose="020F0502020204030203"/>
+              </a:rPr>
+              <a:t>We </a:t>
+            </a:r>
             <a:r>
               <a:rPr lang="en-US" dirty="0">
                 <a:latin typeface="Lato" panose="020F0502020204030203"/>
               </a:rPr>
-              <a:t>We have observed ….</a:t>
-            </a:r>
+              <a:t>have observed </a:t>
+            </a:r>
+            <a:r>
+              <a:rPr lang="en-US" dirty="0" smtClean="0">
+                <a:latin typeface="Lato" panose="020F0502020204030203"/>
+              </a:rPr>
+              <a:t>that the largest category across the board is software showing its prevalence </a:t>
+            </a:r>
+            <a:r>
+              <a:rPr lang="en-US" dirty="0" smtClean="0">
+                <a:latin typeface="Lato" panose="020F0502020204030203"/>
+              </a:rPr>
+              <a:t>within the start-up space</a:t>
+            </a:r>
+            <a:endParaRPr lang="en-US" dirty="0" smtClean="0">
+              <a:latin typeface="Lato" panose="020F0502020204030203"/>
+            </a:endParaRPr>
+          </a:p>
+          <a:p>
+            <a:endParaRPr lang="en-US" dirty="0">
+              <a:latin typeface="Lato" panose="020F0502020204030203"/>
+            </a:endParaRPr>
+          </a:p>
+          <a:p>
+            <a:endParaRPr lang="en-US" dirty="0" smtClean="0">
+              <a:latin typeface="Lato" panose="020F0502020204030203"/>
+            </a:endParaRPr>
+          </a:p>
+          <a:p>
+            <a:r>
+              <a:rPr lang="en-US" dirty="0" smtClean="0">
+                <a:latin typeface="Lato" panose="020F0502020204030203"/>
+              </a:rPr>
+              <a:t>Technology was the largest category to be taken public (IPO) </a:t>
+            </a:r>
+            <a:endParaRPr lang="en-US" dirty="0">
+              <a:latin typeface="Lato" panose="020F0502020204030203"/>
+            </a:endParaRPr>
           </a:p>
         </p:txBody>
       </p:sp>
@@ -10678,42 +10770,6 @@
           </a:p>
         </p:txBody>
       </p:sp>
-      <p:pic>
-        <p:nvPicPr>
-          <p:cNvPr id="4" name="Picture 3" descr="A screenshot of a cell phone&#10;&#10;Description automatically generated">
-            <a:extLst>
-              <a:ext uri="{FF2B5EF4-FFF2-40B4-BE49-F238E27FC236}">
-                <a16:creationId xmlns:a16="http://schemas.microsoft.com/office/drawing/2014/main" id="{CC92D95B-51E7-49C2-AC9A-0BC20A167C4A}"/>
-              </a:ext>
-            </a:extLst>
-          </p:cNvPr>
-          <p:cNvPicPr>
-            <a:picLocks noChangeAspect="1"/>
-          </p:cNvPicPr>
-          <p:nvPr/>
-        </p:nvPicPr>
-        <p:blipFill>
-          <a:blip r:embed="rId2">
-            <a:extLst>
-              <a:ext uri="{28A0092B-C50C-407E-A947-70E740481C1C}">
-                <a14:useLocalDpi xmlns:a14="http://schemas.microsoft.com/office/drawing/2010/main" val="0"/>
-              </a:ext>
-            </a:extLst>
-          </a:blip>
-          <a:stretch>
-            <a:fillRect/>
-          </a:stretch>
-        </p:blipFill>
-        <p:spPr>
-          <a:xfrm>
-            <a:off x="2064123" y="2511974"/>
-            <a:ext cx="8226954" cy="4163037"/>
-          </a:xfrm>
-          <a:prstGeom prst="rect">
-            <a:avLst/>
-          </a:prstGeom>
-        </p:spPr>
-      </p:pic>
       <p:sp>
         <p:nvSpPr>
           <p:cNvPr id="6" name="TextBox 5">
@@ -10729,7 +10785,7 @@
         <p:spPr>
           <a:xfrm>
             <a:off x="232417" y="1454999"/>
-            <a:ext cx="3378118" cy="646331"/>
+            <a:ext cx="3378118" cy="1754326"/>
           </a:xfrm>
           <a:prstGeom prst="rect">
             <a:avLst/>
@@ -10751,14 +10807,285 @@
           </a:p>
           <a:p>
             <a:r>
-              <a:rPr lang="en-US" dirty="0">
+              <a:rPr lang="en-US" dirty="0" smtClean="0">
                 <a:latin typeface="Lato" panose="020F0502020204030203"/>
               </a:rPr>
-              <a:t>We have observed ….</a:t>
-            </a:r>
-          </a:p>
-        </p:txBody>
-      </p:sp>
+              <a:t> In comparing all operating types by respective size it becomes apparent that the company status of operating makes the largest percentage (82%) of the data set </a:t>
+            </a:r>
+            <a:endParaRPr lang="en-US" dirty="0">
+              <a:latin typeface="Lato" panose="020F0502020204030203"/>
+            </a:endParaRPr>
+          </a:p>
+        </p:txBody>
+      </p:sp>
+      <p:sp>
+        <p:nvSpPr>
+          <p:cNvPr id="8" name="Slide Number Placeholder 1">
+            <a:extLst>
+              <a:ext uri="{FF2B5EF4-FFF2-40B4-BE49-F238E27FC236}">
+                <a16:creationId xmlns:a16="http://schemas.microsoft.com/office/drawing/2014/main" id="{850E0256-220C-4987-BBB7-D5A71359B269}"/>
+              </a:ext>
+            </a:extLst>
+          </p:cNvPr>
+          <p:cNvSpPr txBox="1">
+            <a:spLocks/>
+          </p:cNvSpPr>
+          <p:nvPr/>
+        </p:nvSpPr>
+        <p:spPr>
+          <a:xfrm>
+            <a:off x="35575" y="6516546"/>
+            <a:ext cx="414697" cy="361010"/>
+          </a:xfrm>
+          <a:prstGeom prst="rect">
+            <a:avLst/>
+          </a:prstGeom>
+        </p:spPr>
+        <p:txBody>
+          <a:bodyPr/>
+          <a:lstStyle>
+            <a:defPPr>
+              <a:defRPr lang="en-US"/>
+            </a:defPPr>
+            <a:lvl1pPr marL="0" algn="l" defTabSz="457200" rtl="0" eaLnBrk="1" latinLnBrk="0" hangingPunct="1">
+              <a:defRPr sz="1800" kern="1200">
+                <a:solidFill>
+                  <a:schemeClr val="tx1"/>
+                </a:solidFill>
+                <a:latin typeface="+mn-lt"/>
+                <a:ea typeface="+mn-ea"/>
+                <a:cs typeface="+mn-cs"/>
+              </a:defRPr>
+            </a:lvl1pPr>
+            <a:lvl2pPr marL="457200" algn="l" defTabSz="457200" rtl="0" eaLnBrk="1" latinLnBrk="0" hangingPunct="1">
+              <a:defRPr sz="1800" kern="1200">
+                <a:solidFill>
+                  <a:schemeClr val="tx1"/>
+                </a:solidFill>
+                <a:latin typeface="+mn-lt"/>
+                <a:ea typeface="+mn-ea"/>
+                <a:cs typeface="+mn-cs"/>
+              </a:defRPr>
+            </a:lvl2pPr>
+            <a:lvl3pPr marL="914400" algn="l" defTabSz="457200" rtl="0" eaLnBrk="1" latinLnBrk="0" hangingPunct="1">
+              <a:defRPr sz="1800" kern="1200">
+                <a:solidFill>
+                  <a:schemeClr val="tx1"/>
+                </a:solidFill>
+                <a:latin typeface="+mn-lt"/>
+                <a:ea typeface="+mn-ea"/>
+                <a:cs typeface="+mn-cs"/>
+              </a:defRPr>
+            </a:lvl3pPr>
+            <a:lvl4pPr marL="1371600" algn="l" defTabSz="457200" rtl="0" eaLnBrk="1" latinLnBrk="0" hangingPunct="1">
+              <a:defRPr sz="1800" kern="1200">
+                <a:solidFill>
+                  <a:schemeClr val="tx1"/>
+                </a:solidFill>
+                <a:latin typeface="+mn-lt"/>
+                <a:ea typeface="+mn-ea"/>
+                <a:cs typeface="+mn-cs"/>
+              </a:defRPr>
+            </a:lvl4pPr>
+            <a:lvl5pPr marL="1828800" algn="l" defTabSz="457200" rtl="0" eaLnBrk="1" latinLnBrk="0" hangingPunct="1">
+              <a:defRPr sz="1800" kern="1200">
+                <a:solidFill>
+                  <a:schemeClr val="tx1"/>
+                </a:solidFill>
+                <a:latin typeface="+mn-lt"/>
+                <a:ea typeface="+mn-ea"/>
+                <a:cs typeface="+mn-cs"/>
+              </a:defRPr>
+            </a:lvl5pPr>
+            <a:lvl6pPr marL="2286000" algn="l" defTabSz="457200" rtl="0" eaLnBrk="1" latinLnBrk="0" hangingPunct="1">
+              <a:defRPr sz="1800" kern="1200">
+                <a:solidFill>
+                  <a:schemeClr val="tx1"/>
+                </a:solidFill>
+                <a:latin typeface="+mn-lt"/>
+                <a:ea typeface="+mn-ea"/>
+                <a:cs typeface="+mn-cs"/>
+              </a:defRPr>
+            </a:lvl6pPr>
+            <a:lvl7pPr marL="2743200" algn="l" defTabSz="457200" rtl="0" eaLnBrk="1" latinLnBrk="0" hangingPunct="1">
+              <a:defRPr sz="1800" kern="1200">
+                <a:solidFill>
+                  <a:schemeClr val="tx1"/>
+                </a:solidFill>
+                <a:latin typeface="+mn-lt"/>
+                <a:ea typeface="+mn-ea"/>
+                <a:cs typeface="+mn-cs"/>
+              </a:defRPr>
+            </a:lvl7pPr>
+            <a:lvl8pPr marL="3200400" algn="l" defTabSz="457200" rtl="0" eaLnBrk="1" latinLnBrk="0" hangingPunct="1">
+              <a:defRPr sz="1800" kern="1200">
+                <a:solidFill>
+                  <a:schemeClr val="tx1"/>
+                </a:solidFill>
+                <a:latin typeface="+mn-lt"/>
+                <a:ea typeface="+mn-ea"/>
+                <a:cs typeface="+mn-cs"/>
+              </a:defRPr>
+            </a:lvl8pPr>
+            <a:lvl9pPr marL="3657600" algn="l" defTabSz="457200" rtl="0" eaLnBrk="1" latinLnBrk="0" hangingPunct="1">
+              <a:defRPr sz="1800" kern="1200">
+                <a:solidFill>
+                  <a:schemeClr val="tx1"/>
+                </a:solidFill>
+                <a:latin typeface="+mn-lt"/>
+                <a:ea typeface="+mn-ea"/>
+                <a:cs typeface="+mn-cs"/>
+              </a:defRPr>
+            </a:lvl9pPr>
+          </a:lstStyle>
+          <a:p>
+            <a:fld id="{6D22F896-40B5-4ADD-8801-0D06FADFA095}" type="slidenum">
+              <a:rPr lang="en-US" sz="1000" smtClean="0">
+                <a:latin typeface="Lato" panose="020F0502020204030203"/>
+              </a:rPr>
+              <a:pPr/>
+              <a:t>13</a:t>
+            </a:fld>
+            <a:endParaRPr lang="en-US" sz="1000" dirty="0">
+              <a:latin typeface="Lato" panose="020F0502020204030203"/>
+            </a:endParaRPr>
+          </a:p>
+        </p:txBody>
+      </p:sp>
+      <p:grpSp>
+        <p:nvGrpSpPr>
+          <p:cNvPr id="11" name="Group 10"/>
+          <p:cNvGrpSpPr/>
+          <p:nvPr/>
+        </p:nvGrpSpPr>
+        <p:grpSpPr>
+          <a:xfrm>
+            <a:off x="4293220" y="1048215"/>
+            <a:ext cx="7798152" cy="5683869"/>
+            <a:chOff x="4192859" y="1778164"/>
+            <a:chExt cx="6816482" cy="4955449"/>
+          </a:xfrm>
+        </p:grpSpPr>
+        <p:grpSp>
+          <p:nvGrpSpPr>
+            <p:cNvPr id="9" name="Group 8"/>
+            <p:cNvGrpSpPr/>
+            <p:nvPr/>
+          </p:nvGrpSpPr>
+          <p:grpSpPr>
+            <a:xfrm>
+              <a:off x="4192859" y="1787799"/>
+              <a:ext cx="6816482" cy="4945814"/>
+              <a:chOff x="4192859" y="1787799"/>
+              <a:chExt cx="6816482" cy="4945814"/>
+            </a:xfrm>
+          </p:grpSpPr>
+          <p:pic>
+            <p:nvPicPr>
+              <p:cNvPr id="4" name="Picture 3" descr="A screenshot of a cell phone&#10;&#10;Description automatically generated">
+                <a:extLst>
+                  <a:ext uri="{FF2B5EF4-FFF2-40B4-BE49-F238E27FC236}">
+                    <a16:creationId xmlns:a16="http://schemas.microsoft.com/office/drawing/2014/main" id="{CC92D95B-51E7-49C2-AC9A-0BC20A167C4A}"/>
+                  </a:ext>
+                </a:extLst>
+              </p:cNvPr>
+              <p:cNvPicPr>
+                <a:picLocks noChangeAspect="1"/>
+              </p:cNvPicPr>
+              <p:nvPr/>
+            </p:nvPicPr>
+            <p:blipFill rotWithShape="1">
+              <a:blip r:embed="rId2">
+                <a:extLst>
+                  <a:ext uri="{28A0092B-C50C-407E-A947-70E740481C1C}">
+                    <a14:useLocalDpi xmlns:a14="http://schemas.microsoft.com/office/drawing/2010/main" val="0"/>
+                  </a:ext>
+                </a:extLst>
+              </a:blip>
+              <a:srcRect l="83420" b="7154"/>
+              <a:stretch/>
+            </p:blipFill>
+            <p:spPr>
+              <a:xfrm>
+                <a:off x="9263967" y="1787799"/>
+                <a:ext cx="1745374" cy="4945814"/>
+              </a:xfrm>
+              <a:prstGeom prst="rect">
+                <a:avLst/>
+              </a:prstGeom>
+            </p:spPr>
+          </p:pic>
+          <p:pic>
+            <p:nvPicPr>
+              <p:cNvPr id="3" name="Picture 2"/>
+              <p:cNvPicPr>
+                <a:picLocks noChangeAspect="1"/>
+              </p:cNvPicPr>
+              <p:nvPr/>
+            </p:nvPicPr>
+            <p:blipFill rotWithShape="1">
+              <a:blip r:embed="rId3"/>
+              <a:srcRect l="11323" r="56699"/>
+              <a:stretch/>
+            </p:blipFill>
+            <p:spPr>
+              <a:xfrm>
+                <a:off x="4192859" y="1787799"/>
+                <a:ext cx="3366890" cy="4944285"/>
+              </a:xfrm>
+              <a:prstGeom prst="rect">
+                <a:avLst/>
+              </a:prstGeom>
+            </p:spPr>
+          </p:pic>
+          <p:pic>
+            <p:nvPicPr>
+              <p:cNvPr id="5" name="Picture 4"/>
+              <p:cNvPicPr>
+                <a:picLocks noChangeAspect="1"/>
+              </p:cNvPicPr>
+              <p:nvPr/>
+            </p:nvPicPr>
+            <p:blipFill rotWithShape="1">
+              <a:blip r:embed="rId4"/>
+              <a:srcRect r="62326"/>
+              <a:stretch/>
+            </p:blipFill>
+            <p:spPr>
+              <a:xfrm>
+                <a:off x="7559749" y="1787799"/>
+                <a:ext cx="1704218" cy="4944285"/>
+              </a:xfrm>
+              <a:prstGeom prst="rect">
+                <a:avLst/>
+              </a:prstGeom>
+            </p:spPr>
+          </p:pic>
+        </p:grpSp>
+        <p:pic>
+          <p:nvPicPr>
+            <p:cNvPr id="10" name="Picture 9"/>
+            <p:cNvPicPr>
+              <a:picLocks noChangeAspect="1"/>
+            </p:cNvPicPr>
+            <p:nvPr/>
+          </p:nvPicPr>
+          <p:blipFill rotWithShape="1">
+            <a:blip r:embed="rId5"/>
+            <a:srcRect r="15087" b="88553"/>
+            <a:stretch/>
+          </p:blipFill>
+          <p:spPr>
+            <a:xfrm>
+              <a:off x="4192859" y="1778164"/>
+              <a:ext cx="6802243" cy="566647"/>
+            </a:xfrm>
+            <a:prstGeom prst="rect">
+              <a:avLst/>
+            </a:prstGeom>
+          </p:spPr>
+        </p:pic>
+      </p:grpSp>
       <p:pic>
         <p:nvPicPr>
           <p:cNvPr id="7" name="Picture 6">
@@ -10774,7 +11101,7 @@
           <p:nvPr/>
         </p:nvPicPr>
         <p:blipFill>
-          <a:blip r:embed="rId3">
+          <a:blip r:embed="rId6">
             <a:duotone>
               <a:schemeClr val="accent1">
                 <a:shade val="45000"/>
@@ -10797,140 +11124,6 @@
           </a:prstGeom>
         </p:spPr>
       </p:pic>
-      <p:sp>
-        <p:nvSpPr>
-          <p:cNvPr id="8" name="Slide Number Placeholder 1">
-            <a:extLst>
-              <a:ext uri="{FF2B5EF4-FFF2-40B4-BE49-F238E27FC236}">
-                <a16:creationId xmlns:a16="http://schemas.microsoft.com/office/drawing/2014/main" id="{850E0256-220C-4987-BBB7-D5A71359B269}"/>
-              </a:ext>
-            </a:extLst>
-          </p:cNvPr>
-          <p:cNvSpPr txBox="1">
-            <a:spLocks/>
-          </p:cNvSpPr>
-          <p:nvPr/>
-        </p:nvSpPr>
-        <p:spPr>
-          <a:xfrm>
-            <a:off x="35575" y="6516546"/>
-            <a:ext cx="414697" cy="361010"/>
-          </a:xfrm>
-          <a:prstGeom prst="rect">
-            <a:avLst/>
-          </a:prstGeom>
-        </p:spPr>
-        <p:txBody>
-          <a:bodyPr/>
-          <a:lstStyle>
-            <a:defPPr>
-              <a:defRPr lang="en-US"/>
-            </a:defPPr>
-            <a:lvl1pPr marL="0" algn="l" defTabSz="457200" rtl="0" eaLnBrk="1" latinLnBrk="0" hangingPunct="1">
-              <a:defRPr sz="1800" kern="1200">
-                <a:solidFill>
-                  <a:schemeClr val="tx1"/>
-                </a:solidFill>
-                <a:latin typeface="+mn-lt"/>
-                <a:ea typeface="+mn-ea"/>
-                <a:cs typeface="+mn-cs"/>
-              </a:defRPr>
-            </a:lvl1pPr>
-            <a:lvl2pPr marL="457200" algn="l" defTabSz="457200" rtl="0" eaLnBrk="1" latinLnBrk="0" hangingPunct="1">
-              <a:defRPr sz="1800" kern="1200">
-                <a:solidFill>
-                  <a:schemeClr val="tx1"/>
-                </a:solidFill>
-                <a:latin typeface="+mn-lt"/>
-                <a:ea typeface="+mn-ea"/>
-                <a:cs typeface="+mn-cs"/>
-              </a:defRPr>
-            </a:lvl2pPr>
-            <a:lvl3pPr marL="914400" algn="l" defTabSz="457200" rtl="0" eaLnBrk="1" latinLnBrk="0" hangingPunct="1">
-              <a:defRPr sz="1800" kern="1200">
-                <a:solidFill>
-                  <a:schemeClr val="tx1"/>
-                </a:solidFill>
-                <a:latin typeface="+mn-lt"/>
-                <a:ea typeface="+mn-ea"/>
-                <a:cs typeface="+mn-cs"/>
-              </a:defRPr>
-            </a:lvl3pPr>
-            <a:lvl4pPr marL="1371600" algn="l" defTabSz="457200" rtl="0" eaLnBrk="1" latinLnBrk="0" hangingPunct="1">
-              <a:defRPr sz="1800" kern="1200">
-                <a:solidFill>
-                  <a:schemeClr val="tx1"/>
-                </a:solidFill>
-                <a:latin typeface="+mn-lt"/>
-                <a:ea typeface="+mn-ea"/>
-                <a:cs typeface="+mn-cs"/>
-              </a:defRPr>
-            </a:lvl4pPr>
-            <a:lvl5pPr marL="1828800" algn="l" defTabSz="457200" rtl="0" eaLnBrk="1" latinLnBrk="0" hangingPunct="1">
-              <a:defRPr sz="1800" kern="1200">
-                <a:solidFill>
-                  <a:schemeClr val="tx1"/>
-                </a:solidFill>
-                <a:latin typeface="+mn-lt"/>
-                <a:ea typeface="+mn-ea"/>
-                <a:cs typeface="+mn-cs"/>
-              </a:defRPr>
-            </a:lvl5pPr>
-            <a:lvl6pPr marL="2286000" algn="l" defTabSz="457200" rtl="0" eaLnBrk="1" latinLnBrk="0" hangingPunct="1">
-              <a:defRPr sz="1800" kern="1200">
-                <a:solidFill>
-                  <a:schemeClr val="tx1"/>
-                </a:solidFill>
-                <a:latin typeface="+mn-lt"/>
-                <a:ea typeface="+mn-ea"/>
-                <a:cs typeface="+mn-cs"/>
-              </a:defRPr>
-            </a:lvl6pPr>
-            <a:lvl7pPr marL="2743200" algn="l" defTabSz="457200" rtl="0" eaLnBrk="1" latinLnBrk="0" hangingPunct="1">
-              <a:defRPr sz="1800" kern="1200">
-                <a:solidFill>
-                  <a:schemeClr val="tx1"/>
-                </a:solidFill>
-                <a:latin typeface="+mn-lt"/>
-                <a:ea typeface="+mn-ea"/>
-                <a:cs typeface="+mn-cs"/>
-              </a:defRPr>
-            </a:lvl7pPr>
-            <a:lvl8pPr marL="3200400" algn="l" defTabSz="457200" rtl="0" eaLnBrk="1" latinLnBrk="0" hangingPunct="1">
-              <a:defRPr sz="1800" kern="1200">
-                <a:solidFill>
-                  <a:schemeClr val="tx1"/>
-                </a:solidFill>
-                <a:latin typeface="+mn-lt"/>
-                <a:ea typeface="+mn-ea"/>
-                <a:cs typeface="+mn-cs"/>
-              </a:defRPr>
-            </a:lvl8pPr>
-            <a:lvl9pPr marL="3657600" algn="l" defTabSz="457200" rtl="0" eaLnBrk="1" latinLnBrk="0" hangingPunct="1">
-              <a:defRPr sz="1800" kern="1200">
-                <a:solidFill>
-                  <a:schemeClr val="tx1"/>
-                </a:solidFill>
-                <a:latin typeface="+mn-lt"/>
-                <a:ea typeface="+mn-ea"/>
-                <a:cs typeface="+mn-cs"/>
-              </a:defRPr>
-            </a:lvl9pPr>
-          </a:lstStyle>
-          <a:p>
-            <a:fld id="{6D22F896-40B5-4ADD-8801-0D06FADFA095}" type="slidenum">
-              <a:rPr lang="en-US" sz="1000" smtClean="0">
-                <a:latin typeface="Lato" panose="020F0502020204030203"/>
-              </a:rPr>
-              <a:pPr/>
-              <a:t>13</a:t>
-            </a:fld>
-            <a:endParaRPr lang="en-US" sz="1000" dirty="0">
-              <a:latin typeface="Lato" panose="020F0502020204030203"/>
-            </a:endParaRPr>
-          </a:p>
-        </p:txBody>
-      </p:sp>
     </p:spTree>
     <p:extLst>
       <p:ext uri="{BB962C8B-B14F-4D97-AF65-F5344CB8AC3E}">
@@ -13184,7 +13377,7 @@
           <p:cNvPr id="25" name="Group 24">
             <a:extLst>
               <a:ext uri="{C183D7F6-B498-43B3-948B-1728B52AA6E4}">
-                <adec:decorative xmlns:adec="http://schemas.microsoft.com/office/drawing/2017/decorative" val="1"/>
+                <adec:decorative xmlns:adec="http://schemas.microsoft.com/office/drawing/2017/decorative" xmlns="" val="1"/>
               </a:ext>
             </a:extLst>
           </p:cNvPr>
@@ -13334,7 +13527,7 @@
           <p:cNvPr id="38" name="Straight Connector 37">
             <a:extLst>
               <a:ext uri="{C183D7F6-B498-43B3-948B-1728B52AA6E4}">
-                <adec:decorative xmlns:adec="http://schemas.microsoft.com/office/drawing/2017/decorative" val="1"/>
+                <adec:decorative xmlns:adec="http://schemas.microsoft.com/office/drawing/2017/decorative" xmlns="" val="1"/>
               </a:ext>
             </a:extLst>
           </p:cNvPr>
@@ -13463,7 +13656,7 @@
           <p:cNvPr id="42" name="Straight Connector 41">
             <a:extLst>
               <a:ext uri="{C183D7F6-B498-43B3-948B-1728B52AA6E4}">
-                <adec:decorative xmlns:adec="http://schemas.microsoft.com/office/drawing/2017/decorative" val="1"/>
+                <adec:decorative xmlns:adec="http://schemas.microsoft.com/office/drawing/2017/decorative" xmlns="" val="1"/>
               </a:ext>
             </a:extLst>
           </p:cNvPr>
@@ -13629,7 +13822,7 @@
                 <a16:creationId xmlns:a16="http://schemas.microsoft.com/office/drawing/2014/main" id="{ECA6E5BB-4AC5-41AA-A278-4DCD975C6B60}"/>
               </a:ext>
               <a:ext uri="{C183D7F6-B498-43B3-948B-1728B52AA6E4}">
-                <adec:decorative xmlns:adec="http://schemas.microsoft.com/office/drawing/2017/decorative" val="1"/>
+                <adec:decorative xmlns:adec="http://schemas.microsoft.com/office/drawing/2017/decorative" xmlns="" val="1"/>
               </a:ext>
             </a:extLst>
           </p:cNvPr>
@@ -13754,7 +13947,7 @@
                 <a16:creationId xmlns:a16="http://schemas.microsoft.com/office/drawing/2014/main" id="{18431808-2743-42AE-8F3A-67EAB41896A2}"/>
               </a:ext>
               <a:ext uri="{C183D7F6-B498-43B3-948B-1728B52AA6E4}">
-                <adec:decorative xmlns:adec="http://schemas.microsoft.com/office/drawing/2017/decorative" val="1"/>
+                <adec:decorative xmlns:adec="http://schemas.microsoft.com/office/drawing/2017/decorative" xmlns="" val="1"/>
               </a:ext>
             </a:extLst>
           </p:cNvPr>
@@ -15129,7 +15322,7 @@
                 <a16:creationId xmlns:a16="http://schemas.microsoft.com/office/drawing/2014/main" id="{2F10420F-32EA-4759-B1A9-986EDF27F452}"/>
               </a:ext>
               <a:ext uri="{C183D7F6-B498-43B3-948B-1728B52AA6E4}">
-                <adec:decorative xmlns:adec="http://schemas.microsoft.com/office/drawing/2017/decorative" val="1"/>
+                <adec:decorative xmlns:adec="http://schemas.microsoft.com/office/drawing/2017/decorative" xmlns="" val="1"/>
               </a:ext>
             </a:extLst>
           </p:cNvPr>
@@ -17504,7 +17697,7 @@
           <a:blip r:embed="rId4">
             <a:extLst>
               <a:ext uri="{96DAC541-7B7A-43D3-8B79-37D633B846F1}">
-                <asvg:svgBlip xmlns:asvg="http://schemas.microsoft.com/office/drawing/2016/SVG/main" r:embed="rId5"/>
+                <asvg:svgBlip xmlns:asvg="http://schemas.microsoft.com/office/drawing/2016/SVG/main" xmlns="" r:embed="rId5"/>
               </a:ext>
             </a:extLst>
           </a:blip>
@@ -17540,7 +17733,7 @@
           <a:blip r:embed="rId4">
             <a:extLst>
               <a:ext uri="{96DAC541-7B7A-43D3-8B79-37D633B846F1}">
-                <asvg:svgBlip xmlns:asvg="http://schemas.microsoft.com/office/drawing/2016/SVG/main" r:embed="rId5"/>
+                <asvg:svgBlip xmlns:asvg="http://schemas.microsoft.com/office/drawing/2016/SVG/main" xmlns="" r:embed="rId5"/>
               </a:ext>
             </a:extLst>
           </a:blip>
@@ -17576,7 +17769,7 @@
           <a:blip r:embed="rId4">
             <a:extLst>
               <a:ext uri="{96DAC541-7B7A-43D3-8B79-37D633B846F1}">
-                <asvg:svgBlip xmlns:asvg="http://schemas.microsoft.com/office/drawing/2016/SVG/main" r:embed="rId5"/>
+                <asvg:svgBlip xmlns:asvg="http://schemas.microsoft.com/office/drawing/2016/SVG/main" xmlns="" r:embed="rId5"/>
               </a:ext>
             </a:extLst>
           </a:blip>
@@ -17612,7 +17805,7 @@
           <a:blip r:embed="rId4">
             <a:extLst>
               <a:ext uri="{96DAC541-7B7A-43D3-8B79-37D633B846F1}">
-                <asvg:svgBlip xmlns:asvg="http://schemas.microsoft.com/office/drawing/2016/SVG/main" r:embed="rId5"/>
+                <asvg:svgBlip xmlns:asvg="http://schemas.microsoft.com/office/drawing/2016/SVG/main" xmlns="" r:embed="rId5"/>
               </a:ext>
             </a:extLst>
           </a:blip>

</xml_diff>

<commit_message>
Changes to PPT (notes for Omar)
</commit_message>
<xml_diff>
--- a/Presentation/GiterDun Presentation.pptx
+++ b/Presentation/GiterDun Presentation.pptx
@@ -1152,6 +1152,90 @@
     <p:extLst>
       <p:ext uri="{BB962C8B-B14F-4D97-AF65-F5344CB8AC3E}">
         <p14:creationId xmlns:p14="http://schemas.microsoft.com/office/powerpoint/2010/main" val="3911923116"/>
+      </p:ext>
+    </p:extLst>
+  </p:cSld>
+  <p:clrMapOvr>
+    <a:masterClrMapping/>
+  </p:clrMapOvr>
+</p:notes>
+</file>
+
+<file path=ppt/notesSlides/notesSlide2.xml><?xml version="1.0" encoding="utf-8"?>
+<p:notes xmlns:a="http://schemas.openxmlformats.org/drawingml/2006/main" xmlns:r="http://schemas.openxmlformats.org/officeDocument/2006/relationships" xmlns:p="http://schemas.openxmlformats.org/presentationml/2006/main">
+  <p:cSld>
+    <p:spTree>
+      <p:nvGrpSpPr>
+        <p:cNvPr id="1" name=""/>
+        <p:cNvGrpSpPr/>
+        <p:nvPr/>
+      </p:nvGrpSpPr>
+      <p:grpSpPr>
+        <a:xfrm>
+          <a:off x="0" y="0"/>
+          <a:ext cx="0" cy="0"/>
+          <a:chOff x="0" y="0"/>
+          <a:chExt cx="0" cy="0"/>
+        </a:xfrm>
+      </p:grpSpPr>
+      <p:sp>
+        <p:nvSpPr>
+          <p:cNvPr id="2" name="Slide Image Placeholder 1"/>
+          <p:cNvSpPr>
+            <a:spLocks noGrp="1" noRot="1" noChangeAspect="1"/>
+          </p:cNvSpPr>
+          <p:nvPr>
+            <p:ph type="sldImg"/>
+          </p:nvPr>
+        </p:nvSpPr>
+        <p:spPr/>
+      </p:sp>
+      <p:sp>
+        <p:nvSpPr>
+          <p:cNvPr id="3" name="Notes Placeholder 2"/>
+          <p:cNvSpPr>
+            <a:spLocks noGrp="1"/>
+          </p:cNvSpPr>
+          <p:nvPr>
+            <p:ph type="body" idx="1"/>
+          </p:nvPr>
+        </p:nvSpPr>
+        <p:spPr/>
+        <p:txBody>
+          <a:bodyPr/>
+          <a:lstStyle/>
+          <a:p>
+            <a:endParaRPr lang="en-US" dirty="0"/>
+          </a:p>
+        </p:txBody>
+      </p:sp>
+      <p:sp>
+        <p:nvSpPr>
+          <p:cNvPr id="4" name="Slide Number Placeholder 3"/>
+          <p:cNvSpPr>
+            <a:spLocks noGrp="1"/>
+          </p:cNvSpPr>
+          <p:nvPr>
+            <p:ph type="sldNum" sz="quarter" idx="5"/>
+          </p:nvPr>
+        </p:nvSpPr>
+        <p:spPr/>
+        <p:txBody>
+          <a:bodyPr/>
+          <a:lstStyle/>
+          <a:p>
+            <a:fld id="{62EE58E6-92D5-40D2-8251-63C5386FE249}" type="slidenum">
+              <a:rPr lang="en-US" smtClean="0"/>
+              <a:t>5</a:t>
+            </a:fld>
+            <a:endParaRPr lang="en-US"/>
+          </a:p>
+        </p:txBody>
+      </p:sp>
+    </p:spTree>
+    <p:extLst>
+      <p:ext uri="{BB962C8B-B14F-4D97-AF65-F5344CB8AC3E}">
+        <p14:creationId xmlns:p14="http://schemas.microsoft.com/office/powerpoint/2010/main" val="1651910097"/>
       </p:ext>
     </p:extLst>
   </p:cSld>
@@ -12373,7 +12457,7 @@
         </p:nvSpPr>
         <p:spPr>
           <a:xfrm>
-            <a:off x="9039497" y="0"/>
+            <a:off x="9039497" y="-13063"/>
             <a:ext cx="3152503" cy="1325563"/>
           </a:xfrm>
           <a:prstGeom prst="rect">

</xml_diff>

<commit_message>
updating coloring of text
</commit_message>
<xml_diff>
--- a/Presentation/GiterDun Presentation.pptx
+++ b/Presentation/GiterDun Presentation.pptx
@@ -9311,6 +9311,9 @@
           <a:p>
             <a:r>
               <a:rPr lang="en-US" dirty="0">
+                <a:solidFill>
+                  <a:schemeClr val="bg1"/>
+                </a:solidFill>
                 <a:latin typeface="Lato" panose="020F0502020204030203"/>
               </a:rPr>
               <a:t>Funding by Year – East Coast vs. West Coast</a:t>
@@ -9348,7 +9351,7 @@
           <a:p>
             <a:endParaRPr lang="en-US" dirty="0">
               <a:solidFill>
-                <a:srgbClr val="FF0000"/>
+                <a:schemeClr val="bg1"/>
               </a:solidFill>
               <a:latin typeface="Lato" panose="020F0502020204030203"/>
             </a:endParaRPr>
@@ -9356,6 +9359,9 @@
           <a:p>
             <a:r>
               <a:rPr lang="en-US" dirty="0">
+                <a:solidFill>
+                  <a:schemeClr val="bg1"/>
+                </a:solidFill>
                 <a:latin typeface="Lato" panose="020F0502020204030203"/>
               </a:rPr>
               <a:t>We have observed that the east coast dominates throughout the years, with more funding into its companies.</a:t>
@@ -9623,23 +9629,35 @@
           <a:p>
             <a:r>
               <a:rPr lang="en-US" dirty="0" smtClean="0">
+                <a:solidFill>
+                  <a:schemeClr val="bg1"/>
+                </a:solidFill>
                 <a:latin typeface="Lato" panose="020F0502020204030203"/>
               </a:rPr>
               <a:t>Investors: </a:t>
             </a:r>
             <a:r>
               <a:rPr lang="en-US" dirty="0">
+                <a:solidFill>
+                  <a:schemeClr val="bg1"/>
+                </a:solidFill>
                 <a:latin typeface="Lato" panose="020F0502020204030203"/>
               </a:rPr>
               <a:t>by </a:t>
             </a:r>
             <a:r>
               <a:rPr lang="en-US" dirty="0" smtClean="0">
+                <a:solidFill>
+                  <a:schemeClr val="bg1"/>
+                </a:solidFill>
                 <a:latin typeface="Lato" panose="020F0502020204030203"/>
               </a:rPr>
               <a:t>State &amp; City</a:t>
             </a:r>
             <a:endParaRPr lang="en-US" dirty="0">
+              <a:solidFill>
+                <a:schemeClr val="bg1"/>
+              </a:solidFill>
               <a:latin typeface="Lato" panose="020F0502020204030203"/>
             </a:endParaRPr>
           </a:p>
@@ -9747,18 +9765,27 @@
           <a:p>
             <a:r>
               <a:rPr lang="en-US" dirty="0" smtClean="0">
+                <a:solidFill>
+                  <a:schemeClr val="bg1"/>
+                </a:solidFill>
                 <a:latin typeface="Lato" panose="020F0502020204030203"/>
               </a:rPr>
               <a:t>We </a:t>
             </a:r>
             <a:r>
               <a:rPr lang="en-US" dirty="0">
+                <a:solidFill>
+                  <a:schemeClr val="bg1"/>
+                </a:solidFill>
                 <a:latin typeface="Lato" panose="020F0502020204030203"/>
               </a:rPr>
               <a:t>have observed </a:t>
             </a:r>
             <a:r>
               <a:rPr lang="en-US" dirty="0" smtClean="0">
+                <a:solidFill>
+                  <a:schemeClr val="bg1"/>
+                </a:solidFill>
                 <a:latin typeface="Lato" panose="020F0502020204030203"/>
               </a:rPr>
               <a:t>that the California had the top number of investors of any other state with roughly 50% of total investors </a:t>
@@ -9766,17 +9793,26 @@
           </a:p>
           <a:p>
             <a:endParaRPr lang="en-US" dirty="0" smtClean="0">
+              <a:solidFill>
+                <a:schemeClr val="bg1"/>
+              </a:solidFill>
               <a:latin typeface="Lato" panose="020F0502020204030203"/>
             </a:endParaRPr>
           </a:p>
           <a:p>
             <a:endParaRPr lang="en-US" dirty="0" smtClean="0">
+              <a:solidFill>
+                <a:schemeClr val="bg1"/>
+              </a:solidFill>
               <a:latin typeface="Lato" panose="020F0502020204030203"/>
             </a:endParaRPr>
           </a:p>
           <a:p>
             <a:r>
               <a:rPr lang="en-US" dirty="0" smtClean="0">
+                <a:solidFill>
+                  <a:schemeClr val="bg1"/>
+                </a:solidFill>
                 <a:latin typeface="Lato" panose="020F0502020204030203"/>
               </a:rPr>
               <a:t>While San Francisco has the highest number of investors by city (24%), NYC has the highest percentage of total investors in respect to its state (91%)</a:t>
@@ -9784,22 +9820,34 @@
           </a:p>
           <a:p>
             <a:endParaRPr lang="en-US" dirty="0">
+              <a:solidFill>
+                <a:schemeClr val="bg1"/>
+              </a:solidFill>
               <a:latin typeface="Lato" panose="020F0502020204030203"/>
             </a:endParaRPr>
           </a:p>
           <a:p>
             <a:endParaRPr lang="en-US" dirty="0" smtClean="0">
+              <a:solidFill>
+                <a:schemeClr val="bg1"/>
+              </a:solidFill>
               <a:latin typeface="Lato" panose="020F0502020204030203"/>
             </a:endParaRPr>
           </a:p>
           <a:p>
             <a:r>
               <a:rPr lang="en-US" dirty="0" smtClean="0">
+                <a:solidFill>
+                  <a:schemeClr val="bg1"/>
+                </a:solidFill>
                 <a:latin typeface="Lato" panose="020F0502020204030203"/>
               </a:rPr>
               <a:t>Both figures point to high concentration on investors at costal states and cities </a:t>
             </a:r>
             <a:endParaRPr lang="en-US" dirty="0">
+              <a:solidFill>
+                <a:schemeClr val="bg1"/>
+              </a:solidFill>
               <a:latin typeface="Lato" panose="020F0502020204030203"/>
             </a:endParaRPr>
           </a:p>
@@ -10037,6 +10085,9 @@
           <a:p>
             <a:r>
               <a:rPr lang="en-US" dirty="0">
+                <a:solidFill>
+                  <a:schemeClr val="bg1"/>
+                </a:solidFill>
                 <a:latin typeface="Lato" panose="020F0502020204030203"/>
               </a:rPr>
               <a:t>Company Status by Category</a:t>
@@ -10656,50 +10707,62 @@
           <a:p>
             <a:r>
               <a:rPr lang="en-US" dirty="0" smtClean="0">
+                <a:solidFill>
+                  <a:schemeClr val="bg1"/>
+                </a:solidFill>
                 <a:latin typeface="Lato" panose="020F0502020204030203"/>
               </a:rPr>
               <a:t>We </a:t>
             </a:r>
             <a:r>
               <a:rPr lang="en-US" dirty="0">
+                <a:solidFill>
+                  <a:schemeClr val="bg1"/>
+                </a:solidFill>
                 <a:latin typeface="Lato" panose="020F0502020204030203"/>
               </a:rPr>
               <a:t>have observed </a:t>
             </a:r>
             <a:r>
               <a:rPr lang="en-US" dirty="0" smtClean="0">
+                <a:solidFill>
+                  <a:schemeClr val="bg1"/>
+                </a:solidFill>
                 <a:latin typeface="Lato" panose="020F0502020204030203"/>
               </a:rPr>
-              <a:t>that the largest category across the board is software showing its prevalence </a:t>
-            </a:r>
-            <a:r>
-              <a:rPr lang="en-US" dirty="0" smtClean="0">
-                <a:latin typeface="Lato" panose="020F0502020204030203"/>
-              </a:rPr>
-              <a:t>within the start-up space</a:t>
-            </a:r>
-            <a:endParaRPr lang="en-US" dirty="0" smtClean="0">
+              <a:t>that the largest category across the board is software showing its prevalence within the start-up space</a:t>
+            </a:r>
+          </a:p>
+          <a:p>
+            <a:endParaRPr lang="en-US" dirty="0">
+              <a:solidFill>
+                <a:schemeClr val="bg1"/>
+              </a:solidFill>
               <a:latin typeface="Lato" panose="020F0502020204030203"/>
             </a:endParaRPr>
           </a:p>
           <a:p>
-            <a:endParaRPr lang="en-US" dirty="0">
+            <a:endParaRPr lang="en-US" dirty="0" smtClean="0">
+              <a:solidFill>
+                <a:schemeClr val="bg1"/>
+              </a:solidFill>
               <a:latin typeface="Lato" panose="020F0502020204030203"/>
             </a:endParaRPr>
           </a:p>
           <a:p>
-            <a:endParaRPr lang="en-US" dirty="0" smtClean="0">
-              <a:latin typeface="Lato" panose="020F0502020204030203"/>
-            </a:endParaRPr>
-          </a:p>
-          <a:p>
             <a:r>
               <a:rPr lang="en-US" dirty="0" smtClean="0">
+                <a:solidFill>
+                  <a:schemeClr val="bg1"/>
+                </a:solidFill>
                 <a:latin typeface="Lato" panose="020F0502020204030203"/>
               </a:rPr>
               <a:t>Technology was the largest category to be taken public (IPO) </a:t>
             </a:r>
             <a:endParaRPr lang="en-US" dirty="0">
+              <a:solidFill>
+                <a:schemeClr val="bg1"/>
+              </a:solidFill>
               <a:latin typeface="Lato" panose="020F0502020204030203"/>
             </a:endParaRPr>
           </a:p>
@@ -10763,6 +10826,9 @@
           <a:p>
             <a:r>
               <a:rPr lang="en-US" dirty="0">
+                <a:solidFill>
+                  <a:schemeClr val="bg1"/>
+                </a:solidFill>
                 <a:latin typeface="Lato" panose="020F0502020204030203"/>
               </a:rPr>
               <a:t>Company Status by Category (Comparative)</a:t>
@@ -10808,11 +10874,26 @@
           <a:p>
             <a:r>
               <a:rPr lang="en-US" dirty="0" smtClean="0">
+                <a:solidFill>
+                  <a:schemeClr val="bg1"/>
+                </a:solidFill>
                 <a:latin typeface="Lato" panose="020F0502020204030203"/>
               </a:rPr>
-              <a:t> In comparing all operating types by respective size it becomes apparent that the company status of operating makes the largest percentage (82%) of the data set </a:t>
+              <a:t>In </a:t>
+            </a:r>
+            <a:r>
+              <a:rPr lang="en-US" dirty="0" smtClean="0">
+                <a:solidFill>
+                  <a:schemeClr val="bg1"/>
+                </a:solidFill>
+                <a:latin typeface="Lato" panose="020F0502020204030203"/>
+              </a:rPr>
+              <a:t>comparing all operating types by respective size it becomes apparent that the company status of operating makes the largest percentage (82%) of the data set </a:t>
             </a:r>
             <a:endParaRPr lang="en-US" dirty="0">
+              <a:solidFill>
+                <a:schemeClr val="bg1"/>
+              </a:solidFill>
               <a:latin typeface="Lato" panose="020F0502020204030203"/>
             </a:endParaRPr>
           </a:p>
@@ -11182,6 +11263,9 @@
           <a:p>
             <a:r>
               <a:rPr lang="en-US" dirty="0">
+                <a:solidFill>
+                  <a:schemeClr val="bg1"/>
+                </a:solidFill>
                 <a:latin typeface="Lato" panose="020F0502020204030203"/>
               </a:rPr>
               <a:t>Acquisitions</a:t>
@@ -11204,7 +11288,7 @@
         <p:spPr>
           <a:xfrm>
             <a:off x="431069" y="1603975"/>
-            <a:ext cx="2593605" cy="4801314"/>
+            <a:ext cx="2593605" cy="4524315"/>
           </a:xfrm>
           <a:prstGeom prst="rect">
             <a:avLst/>
@@ -11219,6 +11303,9 @@
           <a:p>
             <a:r>
               <a:rPr lang="en-US" dirty="0">
+                <a:solidFill>
+                  <a:schemeClr val="bg1"/>
+                </a:solidFill>
                 <a:latin typeface="Lato" panose="020F0502020204030203"/>
               </a:rPr>
               <a:t>There were a total of 801 (5.9%) firms acquired by 494 firms (acquirers) for a total of $334 B.</a:t>
@@ -11226,12 +11313,18 @@
           </a:p>
           <a:p>
             <a:endParaRPr lang="en-US" dirty="0">
+              <a:solidFill>
+                <a:schemeClr val="bg1"/>
+              </a:solidFill>
               <a:latin typeface="Lato" panose="020F0502020204030203"/>
             </a:endParaRPr>
           </a:p>
           <a:p>
             <a:r>
               <a:rPr lang="en-US" dirty="0">
+                <a:solidFill>
+                  <a:schemeClr val="bg1"/>
+                </a:solidFill>
                 <a:latin typeface="Lato" panose="020F0502020204030203"/>
               </a:rPr>
               <a:t>The average acquisition price for the acquired firms was $339 million (skewed by larger acquisitions).</a:t>
@@ -11239,12 +11332,18 @@
           </a:p>
           <a:p>
             <a:endParaRPr lang="en-US" dirty="0">
+              <a:solidFill>
+                <a:schemeClr val="bg1"/>
+              </a:solidFill>
               <a:latin typeface="Lato" panose="020F0502020204030203"/>
             </a:endParaRPr>
           </a:p>
           <a:p>
             <a:r>
               <a:rPr lang="en-US" dirty="0">
+                <a:solidFill>
+                  <a:schemeClr val="bg1"/>
+                </a:solidFill>
                 <a:latin typeface="Lato" panose="020F0502020204030203"/>
               </a:rPr>
               <a:t>Serial acquirers, firms that acquired 7 or more companies, spent less on average than the non-serial acquirers.</a:t>
@@ -12005,6 +12104,9 @@
           <a:p>
             <a:r>
               <a:rPr lang="en-US" dirty="0">
+                <a:solidFill>
+                  <a:schemeClr val="bg1"/>
+                </a:solidFill>
                 <a:latin typeface="Lato" panose="020F0502020204030203"/>
               </a:rPr>
               <a:t>Acquisitions: Acquirers</a:t>
@@ -12086,7 +12188,7 @@
         </p:nvSpPr>
         <p:spPr>
           <a:xfrm>
-            <a:off x="838200" y="1455361"/>
+            <a:off x="838200" y="1274608"/>
             <a:ext cx="10515600" cy="1754326"/>
           </a:xfrm>
           <a:prstGeom prst="rect">
@@ -12102,6 +12204,9 @@
           <a:p>
             <a:r>
               <a:rPr lang="en-US" dirty="0">
+                <a:solidFill>
+                  <a:schemeClr val="bg1"/>
+                </a:solidFill>
                 <a:latin typeface="Lato" panose="020F0502020204030203"/>
               </a:rPr>
               <a:t>There were a total of 14 (~3% of all acquirers) serial acquirers (acquisitions &gt;=7), which accounted for 30% ($101 B) of total acquisition spending ($334 B). </a:t>
@@ -12109,12 +12214,18 @@
           </a:p>
           <a:p>
             <a:endParaRPr lang="en-US" dirty="0">
+              <a:solidFill>
+                <a:schemeClr val="bg1"/>
+              </a:solidFill>
               <a:latin typeface="Lato" panose="020F0502020204030203"/>
             </a:endParaRPr>
           </a:p>
           <a:p>
             <a:r>
               <a:rPr lang="en-US" dirty="0">
+                <a:solidFill>
+                  <a:schemeClr val="bg1"/>
+                </a:solidFill>
                 <a:latin typeface="Lato" panose="020F0502020204030203"/>
               </a:rPr>
               <a:t>The serial acquirers are heavily in the technology industry. While Google had the most acquisitions (23 total), Facebook (9 total) and Hewlett-Packard (7 total) were standouts for most money spent and highest average acquisition price paid.</a:t>
@@ -12373,6 +12484,9 @@
           <a:p>
             <a:r>
               <a:rPr lang="en-US" dirty="0">
+                <a:solidFill>
+                  <a:schemeClr val="bg1"/>
+                </a:solidFill>
                 <a:latin typeface="Lato" panose="020F0502020204030203"/>
               </a:rPr>
               <a:t>Post Mortem</a:t>
@@ -12741,6 +12855,9 @@
             <a:pPr algn="ctr"/>
             <a:r>
               <a:rPr lang="en-US" sz="11500" dirty="0">
+                <a:solidFill>
+                  <a:schemeClr val="bg1"/>
+                </a:solidFill>
                 <a:latin typeface="Lato" panose="020F0502020204030203"/>
               </a:rPr>
               <a:t>Questions?</a:t>
@@ -13377,7 +13494,7 @@
           <p:cNvPr id="25" name="Group 24">
             <a:extLst>
               <a:ext uri="{C183D7F6-B498-43B3-948B-1728B52AA6E4}">
-                <adec:decorative xmlns:adec="http://schemas.microsoft.com/office/drawing/2017/decorative" xmlns="" val="1"/>
+                <adec:decorative xmlns="" xmlns:adec="http://schemas.microsoft.com/office/drawing/2017/decorative" val="1"/>
               </a:ext>
             </a:extLst>
           </p:cNvPr>
@@ -13527,7 +13644,7 @@
           <p:cNvPr id="38" name="Straight Connector 37">
             <a:extLst>
               <a:ext uri="{C183D7F6-B498-43B3-948B-1728B52AA6E4}">
-                <adec:decorative xmlns:adec="http://schemas.microsoft.com/office/drawing/2017/decorative" xmlns="" val="1"/>
+                <adec:decorative xmlns="" xmlns:adec="http://schemas.microsoft.com/office/drawing/2017/decorative" val="1"/>
               </a:ext>
             </a:extLst>
           </p:cNvPr>
@@ -13566,8 +13683,8 @@
         </p:nvSpPr>
         <p:spPr>
           <a:xfrm>
-            <a:off x="1145800" y="5430633"/>
-            <a:ext cx="1577676" cy="338554"/>
+            <a:off x="1238069" y="5430633"/>
+            <a:ext cx="1393137" cy="338554"/>
           </a:xfrm>
           <a:prstGeom prst="rect">
             <a:avLst/>
@@ -13584,7 +13701,7 @@
             <a:r>
               <a:rPr lang="en-US" sz="1600" b="1" dirty="0">
                 <a:solidFill>
-                  <a:schemeClr val="tx2"/>
+                  <a:schemeClr val="bg1"/>
                 </a:solidFill>
                 <a:latin typeface="Lato" panose="020F0502020204030203"/>
                 <a:ea typeface="Lato" panose="020F0502020204030203" pitchFamily="34" charset="0"/>
@@ -13595,7 +13712,7 @@
             <a:r>
               <a:rPr lang="en-US" sz="1600" b="1" dirty="0" err="1">
                 <a:solidFill>
-                  <a:schemeClr val="tx2"/>
+                  <a:schemeClr val="bg1"/>
                 </a:solidFill>
                 <a:latin typeface="Lato" panose="020F0502020204030203"/>
                 <a:ea typeface="Lato" panose="020F0502020204030203" pitchFamily="34" charset="0"/>
@@ -13605,7 +13722,7 @@
             </a:r>
             <a:endParaRPr lang="en-US" sz="1600" b="1" dirty="0">
               <a:solidFill>
-                <a:schemeClr val="tx2"/>
+                <a:schemeClr val="bg1"/>
               </a:solidFill>
               <a:latin typeface="Lato" panose="020F0502020204030203"/>
               <a:ea typeface="Lato" panose="020F0502020204030203" pitchFamily="34" charset="0"/>
@@ -13656,7 +13773,7 @@
           <p:cNvPr id="42" name="Straight Connector 41">
             <a:extLst>
               <a:ext uri="{C183D7F6-B498-43B3-948B-1728B52AA6E4}">
-                <adec:decorative xmlns:adec="http://schemas.microsoft.com/office/drawing/2017/decorative" xmlns="" val="1"/>
+                <adec:decorative xmlns="" xmlns:adec="http://schemas.microsoft.com/office/drawing/2017/decorative" val="1"/>
               </a:ext>
             </a:extLst>
           </p:cNvPr>
@@ -13695,8 +13812,8 @@
         </p:nvSpPr>
         <p:spPr>
           <a:xfrm>
-            <a:off x="4100936" y="5430633"/>
-            <a:ext cx="1366080" cy="338554"/>
+            <a:off x="4167461" y="5430633"/>
+            <a:ext cx="1233030" cy="338554"/>
           </a:xfrm>
           <a:prstGeom prst="rect">
             <a:avLst/>
@@ -13713,7 +13830,7 @@
             <a:r>
               <a:rPr lang="en-US" sz="1600" b="1" dirty="0">
                 <a:solidFill>
-                  <a:schemeClr val="tx2"/>
+                  <a:schemeClr val="bg1"/>
                 </a:solidFill>
                 <a:latin typeface="Lato" panose="020F0502020204030203"/>
                 <a:ea typeface="Lato" panose="020F0502020204030203" pitchFamily="34" charset="0"/>
@@ -13724,7 +13841,7 @@
             <a:r>
               <a:rPr lang="en-US" sz="1600" b="1" dirty="0" err="1">
                 <a:solidFill>
-                  <a:schemeClr val="tx2"/>
+                  <a:schemeClr val="bg1"/>
                 </a:solidFill>
                 <a:latin typeface="Lato" panose="020F0502020204030203"/>
                 <a:ea typeface="Lato" panose="020F0502020204030203" pitchFamily="34" charset="0"/>
@@ -13734,7 +13851,7 @@
             </a:r>
             <a:endParaRPr lang="en-US" sz="1600" b="1" dirty="0">
               <a:solidFill>
-                <a:schemeClr val="tx2"/>
+                <a:schemeClr val="bg1"/>
               </a:solidFill>
               <a:latin typeface="Lato" panose="020F0502020204030203"/>
               <a:ea typeface="Lato" panose="020F0502020204030203" pitchFamily="34" charset="0"/>
@@ -13822,7 +13939,7 @@
                 <a16:creationId xmlns:a16="http://schemas.microsoft.com/office/drawing/2014/main" id="{ECA6E5BB-4AC5-41AA-A278-4DCD975C6B60}"/>
               </a:ext>
               <a:ext uri="{C183D7F6-B498-43B3-948B-1728B52AA6E4}">
-                <adec:decorative xmlns:adec="http://schemas.microsoft.com/office/drawing/2017/decorative" xmlns="" val="1"/>
+                <adec:decorative xmlns="" xmlns:adec="http://schemas.microsoft.com/office/drawing/2017/decorative" val="1"/>
               </a:ext>
             </a:extLst>
           </p:cNvPr>
@@ -13867,8 +13984,8 @@
         </p:nvSpPr>
         <p:spPr>
           <a:xfrm>
-            <a:off x="7058551" y="5430633"/>
-            <a:ext cx="1325171" cy="338554"/>
+            <a:off x="7127929" y="5430633"/>
+            <a:ext cx="1186415" cy="338554"/>
           </a:xfrm>
           <a:prstGeom prst="rect">
             <a:avLst/>
@@ -13885,7 +14002,7 @@
             <a:r>
               <a:rPr lang="en-US" sz="1600" b="1" dirty="0">
                 <a:solidFill>
-                  <a:schemeClr val="tx2"/>
+                  <a:schemeClr val="bg1"/>
                 </a:solidFill>
                 <a:latin typeface="Lato" panose="020F0502020204030203"/>
                 <a:ea typeface="Lato" panose="020F0502020204030203" pitchFamily="34" charset="0"/>
@@ -13947,7 +14064,7 @@
                 <a16:creationId xmlns:a16="http://schemas.microsoft.com/office/drawing/2014/main" id="{18431808-2743-42AE-8F3A-67EAB41896A2}"/>
               </a:ext>
               <a:ext uri="{C183D7F6-B498-43B3-948B-1728B52AA6E4}">
-                <adec:decorative xmlns:adec="http://schemas.microsoft.com/office/drawing/2017/decorative" xmlns="" val="1"/>
+                <adec:decorative xmlns="" xmlns:adec="http://schemas.microsoft.com/office/drawing/2017/decorative" val="1"/>
               </a:ext>
             </a:extLst>
           </p:cNvPr>
@@ -13992,8 +14109,8 @@
         </p:nvSpPr>
         <p:spPr>
           <a:xfrm>
-            <a:off x="9908433" y="5430633"/>
-            <a:ext cx="1397306" cy="338554"/>
+            <a:off x="9976977" y="5430633"/>
+            <a:ext cx="1260217" cy="338554"/>
           </a:xfrm>
           <a:prstGeom prst="rect">
             <a:avLst/>
@@ -14010,7 +14127,7 @@
             <a:r>
               <a:rPr lang="en-US" sz="1600" b="1" dirty="0">
                 <a:solidFill>
-                  <a:schemeClr val="tx2"/>
+                  <a:schemeClr val="bg1"/>
                 </a:solidFill>
                 <a:latin typeface="Lato" panose="020F0502020204030203"/>
                 <a:ea typeface="Lato" panose="020F0502020204030203" pitchFamily="34" charset="0"/>
@@ -14021,7 +14138,7 @@
             <a:r>
               <a:rPr lang="en-US" sz="1600" b="1" dirty="0" err="1">
                 <a:solidFill>
-                  <a:schemeClr val="tx2"/>
+                  <a:schemeClr val="bg1"/>
                 </a:solidFill>
                 <a:latin typeface="Lato" panose="020F0502020204030203"/>
                 <a:ea typeface="Lato" panose="020F0502020204030203" pitchFamily="34" charset="0"/>
@@ -14031,7 +14148,7 @@
             </a:r>
             <a:endParaRPr lang="en-US" sz="1600" b="1" dirty="0">
               <a:solidFill>
-                <a:schemeClr val="tx2"/>
+                <a:schemeClr val="bg1"/>
               </a:solidFill>
               <a:latin typeface="Lato" panose="020F0502020204030203"/>
               <a:ea typeface="Lato" panose="020F0502020204030203" pitchFamily="34" charset="0"/>
@@ -15322,7 +15439,7 @@
                 <a16:creationId xmlns:a16="http://schemas.microsoft.com/office/drawing/2014/main" id="{2F10420F-32EA-4759-B1A9-986EDF27F452}"/>
               </a:ext>
               <a:ext uri="{C183D7F6-B498-43B3-948B-1728B52AA6E4}">
-                <adec:decorative xmlns:adec="http://schemas.microsoft.com/office/drawing/2017/decorative" xmlns="" val="1"/>
+                <adec:decorative xmlns="" xmlns:adec="http://schemas.microsoft.com/office/drawing/2017/decorative" val="1"/>
               </a:ext>
             </a:extLst>
           </p:cNvPr>
@@ -15900,6 +16017,9 @@
           <a:p>
             <a:r>
               <a:rPr lang="en-US" dirty="0">
+                <a:solidFill>
+                  <a:schemeClr val="bg1"/>
+                </a:solidFill>
                 <a:latin typeface="Lato" panose="020F0502020204030203"/>
               </a:rPr>
               <a:t>TOC</a:t>
@@ -16390,6 +16510,9 @@
           <a:p>
             <a:r>
               <a:rPr lang="en-US" dirty="0">
+                <a:solidFill>
+                  <a:schemeClr val="bg1"/>
+                </a:solidFill>
                 <a:latin typeface="Lato" panose="020F0502020204030203"/>
               </a:rPr>
               <a:t>Methodology</a:t>
@@ -16813,7 +16936,11 @@
           <a:lstStyle/>
           <a:p>
             <a:r>
-              <a:rPr lang="en-US" dirty="0"/>
+              <a:rPr lang="en-US" dirty="0">
+                <a:solidFill>
+                  <a:schemeClr val="bg1"/>
+                </a:solidFill>
+              </a:rPr>
               <a:t>Summary</a:t>
             </a:r>
           </a:p>
@@ -17187,6 +17314,9 @@
           <a:p>
             <a:r>
               <a:rPr lang="en-US" dirty="0">
+                <a:solidFill>
+                  <a:schemeClr val="bg1"/>
+                </a:solidFill>
                 <a:latin typeface="Lato" panose="020F0502020204030203"/>
               </a:rPr>
               <a:t>Plot of count of companies vs. funding amounts</a:t>
@@ -17284,6 +17414,9 @@
           <a:p>
             <a:r>
               <a:rPr lang="en-US" dirty="0">
+                <a:solidFill>
+                  <a:schemeClr val="bg1"/>
+                </a:solidFill>
                 <a:latin typeface="Lato" panose="020F0502020204030203"/>
               </a:rPr>
               <a:t>We have observed high concentration of companies in NY and CA, however total funding is more apparent in other states such as Colorado, Texas, Illinois, Washington and Florida.</a:t>
@@ -17635,6 +17768,9 @@
           <a:p>
             <a:r>
               <a:rPr lang="en-US" dirty="0">
+                <a:solidFill>
+                  <a:schemeClr val="bg1"/>
+                </a:solidFill>
                 <a:latin typeface="Lato" panose="020F0502020204030203"/>
               </a:rPr>
               <a:t>Total Funding by Category by City</a:t>
@@ -17672,6 +17808,9 @@
           <a:p>
             <a:r>
               <a:rPr lang="en-US" dirty="0">
+                <a:solidFill>
+                  <a:schemeClr val="bg1"/>
+                </a:solidFill>
                 <a:latin typeface="Lato" panose="020F0502020204030203"/>
               </a:rPr>
               <a:t>We have observed trends within the technology and software category as popular across all states. Additionally some states seemed to be popular across many categories. When we focused further to total category funding &gt;$1B, we see New York and San Francisco as the most popular cities and technology as well as software coming into greater focus. Marketing in NY and Software/Transportation in San Francisco are the highest funded.</a:t>
@@ -17697,7 +17836,7 @@
           <a:blip r:embed="rId4">
             <a:extLst>
               <a:ext uri="{96DAC541-7B7A-43D3-8B79-37D633B846F1}">
-                <asvg:svgBlip xmlns:asvg="http://schemas.microsoft.com/office/drawing/2016/SVG/main" xmlns="" r:embed="rId5"/>
+                <asvg:svgBlip xmlns="" xmlns:asvg="http://schemas.microsoft.com/office/drawing/2016/SVG/main" r:embed="rId5"/>
               </a:ext>
             </a:extLst>
           </a:blip>
@@ -17733,7 +17872,7 @@
           <a:blip r:embed="rId4">
             <a:extLst>
               <a:ext uri="{96DAC541-7B7A-43D3-8B79-37D633B846F1}">
-                <asvg:svgBlip xmlns:asvg="http://schemas.microsoft.com/office/drawing/2016/SVG/main" xmlns="" r:embed="rId5"/>
+                <asvg:svgBlip xmlns="" xmlns:asvg="http://schemas.microsoft.com/office/drawing/2016/SVG/main" r:embed="rId5"/>
               </a:ext>
             </a:extLst>
           </a:blip>
@@ -17769,7 +17908,7 @@
           <a:blip r:embed="rId4">
             <a:extLst>
               <a:ext uri="{96DAC541-7B7A-43D3-8B79-37D633B846F1}">
-                <asvg:svgBlip xmlns:asvg="http://schemas.microsoft.com/office/drawing/2016/SVG/main" xmlns="" r:embed="rId5"/>
+                <asvg:svgBlip xmlns="" xmlns:asvg="http://schemas.microsoft.com/office/drawing/2016/SVG/main" r:embed="rId5"/>
               </a:ext>
             </a:extLst>
           </a:blip>
@@ -17805,7 +17944,7 @@
           <a:blip r:embed="rId4">
             <a:extLst>
               <a:ext uri="{96DAC541-7B7A-43D3-8B79-37D633B846F1}">
-                <asvg:svgBlip xmlns:asvg="http://schemas.microsoft.com/office/drawing/2016/SVG/main" xmlns="" r:embed="rId5"/>
+                <asvg:svgBlip xmlns="" xmlns:asvg="http://schemas.microsoft.com/office/drawing/2016/SVG/main" r:embed="rId5"/>
               </a:ext>
             </a:extLst>
           </a:blip>
@@ -18085,6 +18224,9 @@
           <a:p>
             <a:r>
               <a:rPr lang="en-US" dirty="0">
+                <a:solidFill>
+                  <a:schemeClr val="bg1"/>
+                </a:solidFill>
                 <a:latin typeface="Lato" panose="020F0502020204030203"/>
               </a:rPr>
               <a:t>Investment by Category</a:t>
@@ -18122,6 +18264,9 @@
           <a:p>
             <a:r>
               <a:rPr lang="en-US" dirty="0">
+                <a:solidFill>
+                  <a:schemeClr val="bg1"/>
+                </a:solidFill>
                 <a:latin typeface="Lato" panose="020F0502020204030203"/>
               </a:rPr>
               <a:t>We have observed that transportation, software, and marketing are the leading categories with the largest total of investments. We were surprised to see that technology came up only at the eighth-most invested category overall.</a:t>

</xml_diff>

<commit_message>
updated investors graphic on ppt
</commit_message>
<xml_diff>
--- a/Presentation/GiterDun Presentation.pptx
+++ b/Presentation/GiterDun Presentation.pptx
@@ -1695,6 +1695,40 @@
               <a:t>Focus is by state and micro of city. City proves NYC and San Fran as biggest cities for investments</a:t>
             </a:r>
           </a:p>
+          <a:p>
+            <a:endParaRPr lang="en-US" dirty="0"/>
+          </a:p>
+          <a:p>
+            <a:pPr marL="0" marR="0" lvl="0" indent="0" algn="l" defTabSz="914400" rtl="0" eaLnBrk="1" fontAlgn="auto" latinLnBrk="0" hangingPunct="1">
+              <a:lnSpc>
+                <a:spcPct val="100000"/>
+              </a:lnSpc>
+              <a:spcBef>
+                <a:spcPts val="0"/>
+              </a:spcBef>
+              <a:spcAft>
+                <a:spcPts val="0"/>
+              </a:spcAft>
+              <a:buClrTx/>
+              <a:buSzTx/>
+              <a:buFontTx/>
+              <a:buNone/>
+              <a:tabLst/>
+              <a:defRPr/>
+            </a:pPr>
+            <a:r>
+              <a:rPr lang="en-US" dirty="0">
+                <a:solidFill>
+                  <a:schemeClr val="bg1"/>
+                </a:solidFill>
+                <a:latin typeface="Lato" panose="020F0502020204030203"/>
+              </a:rPr>
+              <a:t>While San Francisco has the highest number of investors by city (24%), NYC has the highest percentage of total investors in respect to its state (91%)</a:t>
+            </a:r>
+          </a:p>
+          <a:p>
+            <a:endParaRPr lang="en-US" dirty="0"/>
+          </a:p>
         </p:txBody>
       </p:sp>
       <p:sp>
@@ -9628,38 +9662,14 @@
           <a:lstStyle/>
           <a:p>
             <a:r>
-              <a:rPr lang="en-US" dirty="0" smtClean="0">
+              <a:rPr lang="en-US" dirty="0">
                 <a:solidFill>
                   <a:schemeClr val="bg1"/>
                 </a:solidFill>
                 <a:latin typeface="Lato" panose="020F0502020204030203"/>
               </a:rPr>
-              <a:t>Investors: </a:t>
-            </a:r>
-            <a:r>
-              <a:rPr lang="en-US" dirty="0">
-                <a:solidFill>
-                  <a:schemeClr val="bg1"/>
-                </a:solidFill>
-                <a:latin typeface="Lato" panose="020F0502020204030203"/>
-              </a:rPr>
-              <a:t>by </a:t>
-            </a:r>
-            <a:r>
-              <a:rPr lang="en-US" dirty="0" smtClean="0">
-                <a:solidFill>
-                  <a:schemeClr val="bg1"/>
-                </a:solidFill>
-                <a:latin typeface="Lato" panose="020F0502020204030203"/>
-              </a:rPr>
-              <a:t>State &amp; City</a:t>
-            </a:r>
-            <a:endParaRPr lang="en-US" dirty="0">
-              <a:solidFill>
-                <a:schemeClr val="bg1"/>
-              </a:solidFill>
-              <a:latin typeface="Lato" panose="020F0502020204030203"/>
-            </a:endParaRPr>
+              <a:t>Investors: by State &amp; City</a:t>
+            </a:r>
           </a:p>
         </p:txBody>
       </p:sp>
@@ -9691,8 +9701,8 @@
         </p:blipFill>
         <p:spPr>
           <a:xfrm>
-            <a:off x="3656246" y="2141335"/>
-            <a:ext cx="8476277" cy="4654246"/>
+            <a:off x="5330120" y="3109761"/>
+            <a:ext cx="6861880" cy="3767795"/>
           </a:xfrm>
           <a:prstGeom prst="rect">
             <a:avLst/>
@@ -9713,7 +9723,7 @@
           </p:cNvPicPr>
           <p:nvPr/>
         </p:nvPicPr>
-        <p:blipFill>
+        <p:blipFill rotWithShape="1">
           <a:blip r:embed="rId4">
             <a:extLst>
               <a:ext uri="{28A0092B-C50C-407E-A947-70E740481C1C}">
@@ -9721,14 +9731,13 @@
               </a:ext>
             </a:extLst>
           </a:blip>
-          <a:stretch>
-            <a:fillRect/>
-          </a:stretch>
+          <a:srcRect b="5742"/>
+          <a:stretch/>
         </p:blipFill>
         <p:spPr>
           <a:xfrm>
-            <a:off x="7729870" y="154354"/>
-            <a:ext cx="4402653" cy="2525051"/>
+            <a:off x="5270643" y="-1"/>
+            <a:ext cx="6921358" cy="3741685"/>
           </a:xfrm>
           <a:prstGeom prst="rect">
             <a:avLst/>
@@ -9750,7 +9759,7 @@
         <p:spPr>
           <a:xfrm>
             <a:off x="198800" y="1332376"/>
-            <a:ext cx="3378118" cy="4524315"/>
+            <a:ext cx="3378118" cy="3970318"/>
           </a:xfrm>
           <a:prstGeom prst="rect">
             <a:avLst/>
@@ -9762,62 +9771,6 @@
             <a:spAutoFit/>
           </a:bodyPr>
           <a:lstStyle/>
-          <a:p>
-            <a:r>
-              <a:rPr lang="en-US" dirty="0" smtClean="0">
-                <a:solidFill>
-                  <a:schemeClr val="bg1"/>
-                </a:solidFill>
-                <a:latin typeface="Lato" panose="020F0502020204030203"/>
-              </a:rPr>
-              <a:t>We </a:t>
-            </a:r>
-            <a:r>
-              <a:rPr lang="en-US" dirty="0">
-                <a:solidFill>
-                  <a:schemeClr val="bg1"/>
-                </a:solidFill>
-                <a:latin typeface="Lato" panose="020F0502020204030203"/>
-              </a:rPr>
-              <a:t>have observed </a:t>
-            </a:r>
-            <a:r>
-              <a:rPr lang="en-US" dirty="0" smtClean="0">
-                <a:solidFill>
-                  <a:schemeClr val="bg1"/>
-                </a:solidFill>
-                <a:latin typeface="Lato" panose="020F0502020204030203"/>
-              </a:rPr>
-              <a:t>that the California had the top number of investors of any other state with roughly 50% of total investors </a:t>
-            </a:r>
-          </a:p>
-          <a:p>
-            <a:endParaRPr lang="en-US" dirty="0" smtClean="0">
-              <a:solidFill>
-                <a:schemeClr val="bg1"/>
-              </a:solidFill>
-              <a:latin typeface="Lato" panose="020F0502020204030203"/>
-            </a:endParaRPr>
-          </a:p>
-          <a:p>
-            <a:endParaRPr lang="en-US" dirty="0" smtClean="0">
-              <a:solidFill>
-                <a:schemeClr val="bg1"/>
-              </a:solidFill>
-              <a:latin typeface="Lato" panose="020F0502020204030203"/>
-            </a:endParaRPr>
-          </a:p>
-          <a:p>
-            <a:r>
-              <a:rPr lang="en-US" dirty="0" smtClean="0">
-                <a:solidFill>
-                  <a:schemeClr val="bg1"/>
-                </a:solidFill>
-                <a:latin typeface="Lato" panose="020F0502020204030203"/>
-              </a:rPr>
-              <a:t>While San Francisco has the highest number of investors by city (24%), NYC has the highest percentage of total investors in respect to its state (91%)</a:t>
-            </a:r>
-          </a:p>
           <a:p>
             <a:endParaRPr lang="en-US" dirty="0">
               <a:solidFill>
@@ -9827,29 +9780,66 @@
             </a:endParaRPr>
           </a:p>
           <a:p>
-            <a:endParaRPr lang="en-US" dirty="0" smtClean="0">
-              <a:solidFill>
-                <a:schemeClr val="bg1"/>
-              </a:solidFill>
-              <a:latin typeface="Lato" panose="020F0502020204030203"/>
-            </a:endParaRPr>
-          </a:p>
-          <a:p>
-            <a:r>
-              <a:rPr lang="en-US" dirty="0" smtClean="0">
-                <a:solidFill>
-                  <a:schemeClr val="bg1"/>
-                </a:solidFill>
-                <a:latin typeface="Lato" panose="020F0502020204030203"/>
-              </a:rPr>
-              <a:t>Both figures point to high concentration on investors at costal states and cities </a:t>
-            </a:r>
             <a:endParaRPr lang="en-US" dirty="0">
               <a:solidFill>
                 <a:schemeClr val="bg1"/>
               </a:solidFill>
               <a:latin typeface="Lato" panose="020F0502020204030203"/>
             </a:endParaRPr>
+          </a:p>
+          <a:p>
+            <a:r>
+              <a:rPr lang="en-US" dirty="0">
+                <a:solidFill>
+                  <a:schemeClr val="bg1"/>
+                </a:solidFill>
+                <a:latin typeface="Lato" panose="020F0502020204030203"/>
+              </a:rPr>
+              <a:t>We have observed that the California had the top number of investors of any other state with roughly 50% of total investors </a:t>
+            </a:r>
+          </a:p>
+          <a:p>
+            <a:endParaRPr lang="en-US" dirty="0">
+              <a:solidFill>
+                <a:schemeClr val="bg1"/>
+              </a:solidFill>
+              <a:latin typeface="Lato" panose="020F0502020204030203"/>
+            </a:endParaRPr>
+          </a:p>
+          <a:p>
+            <a:endParaRPr lang="en-US" dirty="0">
+              <a:solidFill>
+                <a:schemeClr val="bg1"/>
+              </a:solidFill>
+              <a:latin typeface="Lato" panose="020F0502020204030203"/>
+            </a:endParaRPr>
+          </a:p>
+          <a:p>
+            <a:endParaRPr lang="en-US" dirty="0">
+              <a:solidFill>
+                <a:schemeClr val="bg1"/>
+              </a:solidFill>
+              <a:latin typeface="Lato" panose="020F0502020204030203"/>
+            </a:endParaRPr>
+          </a:p>
+          <a:p>
+            <a:endParaRPr lang="en-US" dirty="0">
+              <a:solidFill>
+                <a:schemeClr val="bg1"/>
+              </a:solidFill>
+              <a:latin typeface="Lato" panose="020F0502020204030203"/>
+            </a:endParaRPr>
+          </a:p>
+          <a:p>
+            <a:r>
+              <a:rPr lang="en-US" dirty="0">
+                <a:solidFill>
+                  <a:schemeClr val="bg1"/>
+                </a:solidFill>
+                <a:latin typeface="Lato" panose="020F0502020204030203"/>
+              </a:rPr>
+              <a:t>Both figures point to high concentration on investors at costal states and cities </a:t>
+            </a:r>
           </a:p>
         </p:txBody>
       </p:sp>
@@ -10706,31 +10696,13 @@
           </a:p>
           <a:p>
             <a:r>
-              <a:rPr lang="en-US" dirty="0" smtClean="0">
+              <a:rPr lang="en-US" dirty="0">
                 <a:solidFill>
                   <a:schemeClr val="bg1"/>
                 </a:solidFill>
                 <a:latin typeface="Lato" panose="020F0502020204030203"/>
               </a:rPr>
-              <a:t>We </a:t>
-            </a:r>
-            <a:r>
-              <a:rPr lang="en-US" dirty="0">
-                <a:solidFill>
-                  <a:schemeClr val="bg1"/>
-                </a:solidFill>
-                <a:latin typeface="Lato" panose="020F0502020204030203"/>
-              </a:rPr>
-              <a:t>have observed </a:t>
-            </a:r>
-            <a:r>
-              <a:rPr lang="en-US" dirty="0" smtClean="0">
-                <a:solidFill>
-                  <a:schemeClr val="bg1"/>
-                </a:solidFill>
-                <a:latin typeface="Lato" panose="020F0502020204030203"/>
-              </a:rPr>
-              <a:t>that the largest category across the board is software showing its prevalence within the start-up space</a:t>
+              <a:t>We have observed that the largest category across the board is software showing its prevalence within the start-up space</a:t>
             </a:r>
           </a:p>
           <a:p>
@@ -10742,29 +10714,23 @@
             </a:endParaRPr>
           </a:p>
           <a:p>
-            <a:endParaRPr lang="en-US" dirty="0" smtClean="0">
-              <a:solidFill>
-                <a:schemeClr val="bg1"/>
-              </a:solidFill>
-              <a:latin typeface="Lato" panose="020F0502020204030203"/>
-            </a:endParaRPr>
-          </a:p>
-          <a:p>
-            <a:r>
-              <a:rPr lang="en-US" dirty="0" smtClean="0">
-                <a:solidFill>
-                  <a:schemeClr val="bg1"/>
-                </a:solidFill>
-                <a:latin typeface="Lato" panose="020F0502020204030203"/>
-              </a:rPr>
-              <a:t>Technology was the largest category to be taken public (IPO) </a:t>
-            </a:r>
             <a:endParaRPr lang="en-US" dirty="0">
               <a:solidFill>
                 <a:schemeClr val="bg1"/>
               </a:solidFill>
               <a:latin typeface="Lato" panose="020F0502020204030203"/>
             </a:endParaRPr>
+          </a:p>
+          <a:p>
+            <a:r>
+              <a:rPr lang="en-US" dirty="0">
+                <a:solidFill>
+                  <a:schemeClr val="bg1"/>
+                </a:solidFill>
+                <a:latin typeface="Lato" panose="020F0502020204030203"/>
+              </a:rPr>
+              <a:t>Technology was the largest category to be taken public (IPO) </a:t>
+            </a:r>
           </a:p>
         </p:txBody>
       </p:sp>
@@ -10873,29 +10839,14 @@
           </a:p>
           <a:p>
             <a:r>
-              <a:rPr lang="en-US" dirty="0" smtClean="0">
+              <a:rPr lang="en-US" dirty="0">
                 <a:solidFill>
                   <a:schemeClr val="bg1"/>
                 </a:solidFill>
                 <a:latin typeface="Lato" panose="020F0502020204030203"/>
               </a:rPr>
-              <a:t>In </a:t>
-            </a:r>
-            <a:r>
-              <a:rPr lang="en-US" dirty="0" smtClean="0">
-                <a:solidFill>
-                  <a:schemeClr val="bg1"/>
-                </a:solidFill>
-                <a:latin typeface="Lato" panose="020F0502020204030203"/>
-              </a:rPr>
-              <a:t>comparing all operating types by respective size it becomes apparent that the company status of operating makes the largest percentage (82%) of the data set </a:t>
-            </a:r>
-            <a:endParaRPr lang="en-US" dirty="0">
-              <a:solidFill>
-                <a:schemeClr val="bg1"/>
-              </a:solidFill>
-              <a:latin typeface="Lato" panose="020F0502020204030203"/>
-            </a:endParaRPr>
+              <a:t>In comparing all operating types by respective size it becomes apparent that the company status of operating makes the largest percentage (82%) of the data set </a:t>
+            </a:r>
           </a:p>
         </p:txBody>
       </p:sp>
@@ -13494,7 +13445,7 @@
           <p:cNvPr id="25" name="Group 24">
             <a:extLst>
               <a:ext uri="{C183D7F6-B498-43B3-948B-1728B52AA6E4}">
-                <adec:decorative xmlns="" xmlns:adec="http://schemas.microsoft.com/office/drawing/2017/decorative" val="1"/>
+                <adec:decorative xmlns:adec="http://schemas.microsoft.com/office/drawing/2017/decorative" val="1"/>
               </a:ext>
             </a:extLst>
           </p:cNvPr>
@@ -13644,7 +13595,7 @@
           <p:cNvPr id="38" name="Straight Connector 37">
             <a:extLst>
               <a:ext uri="{C183D7F6-B498-43B3-948B-1728B52AA6E4}">
-                <adec:decorative xmlns="" xmlns:adec="http://schemas.microsoft.com/office/drawing/2017/decorative" val="1"/>
+                <adec:decorative xmlns:adec="http://schemas.microsoft.com/office/drawing/2017/decorative" val="1"/>
               </a:ext>
             </a:extLst>
           </p:cNvPr>
@@ -13773,7 +13724,7 @@
           <p:cNvPr id="42" name="Straight Connector 41">
             <a:extLst>
               <a:ext uri="{C183D7F6-B498-43B3-948B-1728B52AA6E4}">
-                <adec:decorative xmlns="" xmlns:adec="http://schemas.microsoft.com/office/drawing/2017/decorative" val="1"/>
+                <adec:decorative xmlns:adec="http://schemas.microsoft.com/office/drawing/2017/decorative" val="1"/>
               </a:ext>
             </a:extLst>
           </p:cNvPr>
@@ -13939,7 +13890,7 @@
                 <a16:creationId xmlns:a16="http://schemas.microsoft.com/office/drawing/2014/main" id="{ECA6E5BB-4AC5-41AA-A278-4DCD975C6B60}"/>
               </a:ext>
               <a:ext uri="{C183D7F6-B498-43B3-948B-1728B52AA6E4}">
-                <adec:decorative xmlns="" xmlns:adec="http://schemas.microsoft.com/office/drawing/2017/decorative" val="1"/>
+                <adec:decorative xmlns:adec="http://schemas.microsoft.com/office/drawing/2017/decorative" val="1"/>
               </a:ext>
             </a:extLst>
           </p:cNvPr>
@@ -14064,7 +14015,7 @@
                 <a16:creationId xmlns:a16="http://schemas.microsoft.com/office/drawing/2014/main" id="{18431808-2743-42AE-8F3A-67EAB41896A2}"/>
               </a:ext>
               <a:ext uri="{C183D7F6-B498-43B3-948B-1728B52AA6E4}">
-                <adec:decorative xmlns="" xmlns:adec="http://schemas.microsoft.com/office/drawing/2017/decorative" val="1"/>
+                <adec:decorative xmlns:adec="http://schemas.microsoft.com/office/drawing/2017/decorative" val="1"/>
               </a:ext>
             </a:extLst>
           </p:cNvPr>
@@ -15439,7 +15390,7 @@
                 <a16:creationId xmlns:a16="http://schemas.microsoft.com/office/drawing/2014/main" id="{2F10420F-32EA-4759-B1A9-986EDF27F452}"/>
               </a:ext>
               <a:ext uri="{C183D7F6-B498-43B3-948B-1728B52AA6E4}">
-                <adec:decorative xmlns="" xmlns:adec="http://schemas.microsoft.com/office/drawing/2017/decorative" val="1"/>
+                <adec:decorative xmlns:adec="http://schemas.microsoft.com/office/drawing/2017/decorative" val="1"/>
               </a:ext>
             </a:extLst>
           </p:cNvPr>
@@ -17836,7 +17787,7 @@
           <a:blip r:embed="rId4">
             <a:extLst>
               <a:ext uri="{96DAC541-7B7A-43D3-8B79-37D633B846F1}">
-                <asvg:svgBlip xmlns="" xmlns:asvg="http://schemas.microsoft.com/office/drawing/2016/SVG/main" r:embed="rId5"/>
+                <asvg:svgBlip xmlns:asvg="http://schemas.microsoft.com/office/drawing/2016/SVG/main" r:embed="rId5"/>
               </a:ext>
             </a:extLst>
           </a:blip>
@@ -17872,7 +17823,7 @@
           <a:blip r:embed="rId4">
             <a:extLst>
               <a:ext uri="{96DAC541-7B7A-43D3-8B79-37D633B846F1}">
-                <asvg:svgBlip xmlns="" xmlns:asvg="http://schemas.microsoft.com/office/drawing/2016/SVG/main" r:embed="rId5"/>
+                <asvg:svgBlip xmlns:asvg="http://schemas.microsoft.com/office/drawing/2016/SVG/main" r:embed="rId5"/>
               </a:ext>
             </a:extLst>
           </a:blip>
@@ -17908,7 +17859,7 @@
           <a:blip r:embed="rId4">
             <a:extLst>
               <a:ext uri="{96DAC541-7B7A-43D3-8B79-37D633B846F1}">
-                <asvg:svgBlip xmlns="" xmlns:asvg="http://schemas.microsoft.com/office/drawing/2016/SVG/main" r:embed="rId5"/>
+                <asvg:svgBlip xmlns:asvg="http://schemas.microsoft.com/office/drawing/2016/SVG/main" r:embed="rId5"/>
               </a:ext>
             </a:extLst>
           </a:blip>
@@ -17944,7 +17895,7 @@
           <a:blip r:embed="rId4">
             <a:extLst>
               <a:ext uri="{96DAC541-7B7A-43D3-8B79-37D633B846F1}">
-                <asvg:svgBlip xmlns="" xmlns:asvg="http://schemas.microsoft.com/office/drawing/2016/SVG/main" r:embed="rId5"/>
+                <asvg:svgBlip xmlns:asvg="http://schemas.microsoft.com/office/drawing/2016/SVG/main" r:embed="rId5"/>
               </a:ext>
             </a:extLst>
           </a:blip>
@@ -18223,7 +18174,7 @@
           <a:lstStyle/>
           <a:p>
             <a:r>
-              <a:rPr lang="en-US" dirty="0">
+              <a:rPr lang="en-US">
                 <a:solidFill>
                   <a:schemeClr val="bg1"/>
                 </a:solidFill>
@@ -18231,6 +18182,12 @@
               </a:rPr>
               <a:t>Investment by Category</a:t>
             </a:r>
+            <a:endParaRPr lang="en-US" dirty="0">
+              <a:solidFill>
+                <a:schemeClr val="bg1"/>
+              </a:solidFill>
+              <a:latin typeface="Lato" panose="020F0502020204030203"/>
+            </a:endParaRPr>
           </a:p>
         </p:txBody>
       </p:sp>
@@ -18263,7 +18220,7 @@
           <a:lstStyle/>
           <a:p>
             <a:r>
-              <a:rPr lang="en-US" dirty="0">
+              <a:rPr lang="en-US">
                 <a:solidFill>
                   <a:schemeClr val="bg1"/>
                 </a:solidFill>
@@ -18271,6 +18228,12 @@
               </a:rPr>
               <a:t>We have observed that transportation, software, and marketing are the leading categories with the largest total of investments. We were surprised to see that technology came up only at the eighth-most invested category overall.</a:t>
             </a:r>
+            <a:endParaRPr lang="en-US" dirty="0">
+              <a:solidFill>
+                <a:schemeClr val="bg1"/>
+              </a:solidFill>
+              <a:latin typeface="Lato" panose="020F0502020204030203"/>
+            </a:endParaRPr>
           </a:p>
         </p:txBody>
       </p:sp>

</xml_diff>

<commit_message>
modified powerpoint slides and deleted duplicate api_key file
</commit_message>
<xml_diff>
--- a/Presentation/GiterDun Presentation.pptx
+++ b/Presentation/GiterDun Presentation.pptx
@@ -814,7 +814,7 @@
           <a:p>
             <a:fld id="{69685EF1-E703-46DB-B8E6-B1636C21AD63}" type="datetimeFigureOut">
               <a:rPr lang="en-US" smtClean="0"/>
-              <a:t>9/11/2019</a:t>
+              <a:t>9/11/19</a:t>
             </a:fld>
             <a:endParaRPr lang="en-US"/>
           </a:p>
@@ -9350,7 +9350,7 @@
                 </a:solidFill>
                 <a:latin typeface="Lato" panose="020F0502020204030203"/>
               </a:rPr>
-              <a:t>Funding by Year – East Coast vs. West Coast</a:t>
+              <a:t>Funding by Year – East vs. West</a:t>
             </a:r>
           </a:p>
         </p:txBody>
@@ -9398,41 +9398,11 @@
                 </a:solidFill>
                 <a:latin typeface="Lato" panose="020F0502020204030203"/>
               </a:rPr>
-              <a:t>We have observed that the east coast dominates throughout the years, with more funding into its companies.</a:t>
-            </a:r>
-          </a:p>
-        </p:txBody>
-      </p:sp>
-      <p:pic>
-        <p:nvPicPr>
-          <p:cNvPr id="4" name="Picture 3">
-            <a:extLst>
-              <a:ext uri="{FF2B5EF4-FFF2-40B4-BE49-F238E27FC236}">
-                <a16:creationId xmlns:a16="http://schemas.microsoft.com/office/drawing/2014/main" id="{9A3DFD73-5985-8B4D-8497-670445794AFA}"/>
-              </a:ext>
-            </a:extLst>
-          </p:cNvPr>
-          <p:cNvPicPr>
-            <a:picLocks noChangeAspect="1"/>
-          </p:cNvPicPr>
-          <p:nvPr/>
-        </p:nvPicPr>
-        <p:blipFill>
-          <a:blip r:embed="rId2"/>
-          <a:stretch>
-            <a:fillRect/>
-          </a:stretch>
-        </p:blipFill>
-        <p:spPr>
-          <a:xfrm>
-            <a:off x="4994331" y="725979"/>
-            <a:ext cx="6413108" cy="5496950"/>
-          </a:xfrm>
-          <a:prstGeom prst="rect">
-            <a:avLst/>
-          </a:prstGeom>
-        </p:spPr>
-      </p:pic>
+              <a:t>We have observed that the east dominates throughout the years, with more funding into its companies.</a:t>
+            </a:r>
+          </a:p>
+        </p:txBody>
+      </p:sp>
       <p:pic>
         <p:nvPicPr>
           <p:cNvPr id="7" name="Picture 6">
@@ -9448,7 +9418,7 @@
           <p:nvPr/>
         </p:nvPicPr>
         <p:blipFill>
-          <a:blip r:embed="rId3">
+          <a:blip r:embed="rId2">
             <a:duotone>
               <a:schemeClr val="accent1">
                 <a:shade val="45000"/>
@@ -9605,6 +9575,36 @@
           </a:p>
         </p:txBody>
       </p:sp>
+      <p:pic>
+        <p:nvPicPr>
+          <p:cNvPr id="6" name="Picture 5">
+            <a:extLst>
+              <a:ext uri="{FF2B5EF4-FFF2-40B4-BE49-F238E27FC236}">
+                <a16:creationId xmlns:a16="http://schemas.microsoft.com/office/drawing/2014/main" id="{C07E5AE7-1D7E-0F43-9130-CB3FF8E31491}"/>
+              </a:ext>
+            </a:extLst>
+          </p:cNvPr>
+          <p:cNvPicPr>
+            <a:picLocks noChangeAspect="1"/>
+          </p:cNvPicPr>
+          <p:nvPr/>
+        </p:nvPicPr>
+        <p:blipFill>
+          <a:blip r:embed="rId3"/>
+          <a:stretch>
+            <a:fillRect/>
+          </a:stretch>
+        </p:blipFill>
+        <p:spPr>
+          <a:xfrm>
+            <a:off x="5199017" y="774758"/>
+            <a:ext cx="6493675" cy="5566007"/>
+          </a:xfrm>
+          <a:prstGeom prst="rect">
+            <a:avLst/>
+          </a:prstGeom>
+        </p:spPr>
+      </p:pic>
     </p:spTree>
     <p:extLst>
       <p:ext uri="{BB962C8B-B14F-4D97-AF65-F5344CB8AC3E}">
@@ -16106,7 +16106,7 @@
                 </a:solidFill>
                 <a:latin typeface="Lato" panose="020F0502020204030203"/>
               </a:rPr>
-              <a:t>Funding by Year – East Coast vs. West Coast</a:t>
+              <a:t>Funding by Year – East vs. West</a:t>
             </a:r>
           </a:p>
           <a:p>

</xml_diff>

<commit_message>
updated pptx with talking points & design tune up
</commit_message>
<xml_diff>
--- a/Presentation/GiterDun Presentation.pptx
+++ b/Presentation/GiterDun Presentation.pptx
@@ -814,7 +814,7 @@
           <a:p>
             <a:fld id="{69685EF1-E703-46DB-B8E6-B1636C21AD63}" type="datetimeFigureOut">
               <a:rPr lang="en-US" smtClean="0"/>
-              <a:t>9/11/19</a:t>
+              <a:t>9/11/2019</a:t>
             </a:fld>
             <a:endParaRPr lang="en-US"/>
           </a:p>
@@ -1127,13 +1127,7 @@
           <a:p>
             <a:r>
               <a:rPr lang="en-US" dirty="0"/>
-              <a:t>Omar to present </a:t>
-            </a:r>
-          </a:p>
-          <a:p>
-            <a:r>
-              <a:rPr lang="en-US" dirty="0"/>
-              <a:t>Welcome state team name and first name of team</a:t>
+              <a:t>Present Team name and project description</a:t>
             </a:r>
           </a:p>
         </p:txBody>
@@ -1145,7 +1139,7 @@
             <a:spLocks noGrp="1"/>
           </p:cNvSpPr>
           <p:nvPr>
-            <p:ph type="sldNum" sz="quarter" idx="10"/>
+            <p:ph type="sldNum" sz="quarter" idx="5"/>
           </p:nvPr>
         </p:nvSpPr>
         <p:spPr/>
@@ -1153,18 +1147,538 @@
           <a:bodyPr/>
           <a:lstStyle/>
           <a:p>
-            <a:fld id="{7F220CB7-DCA5-4E5B-97F1-300CDD8D2AAB}" type="slidenum">
+            <a:fld id="{62EE58E6-92D5-40D2-8251-63C5386FE249}" type="slidenum">
               <a:rPr lang="en-US" smtClean="0"/>
-              <a:t>2</a:t>
+              <a:t>1</a:t>
             </a:fld>
-            <a:endParaRPr lang="en-US" dirty="0"/>
+            <a:endParaRPr lang="en-US"/>
           </a:p>
         </p:txBody>
       </p:sp>
     </p:spTree>
     <p:extLst>
       <p:ext uri="{BB962C8B-B14F-4D97-AF65-F5344CB8AC3E}">
-        <p14:creationId xmlns:p14="http://schemas.microsoft.com/office/powerpoint/2010/main" val="3911923116"/>
+        <p14:creationId xmlns:p14="http://schemas.microsoft.com/office/powerpoint/2010/main" val="3878927517"/>
+      </p:ext>
+    </p:extLst>
+  </p:cSld>
+  <p:clrMapOvr>
+    <a:masterClrMapping/>
+  </p:clrMapOvr>
+</p:notes>
+</file>
+
+<file path=ppt/notesSlides/notesSlide10.xml><?xml version="1.0" encoding="utf-8"?>
+<p:notes xmlns:a="http://schemas.openxmlformats.org/drawingml/2006/main" xmlns:r="http://schemas.openxmlformats.org/officeDocument/2006/relationships" xmlns:p="http://schemas.openxmlformats.org/presentationml/2006/main">
+  <p:cSld>
+    <p:spTree>
+      <p:nvGrpSpPr>
+        <p:cNvPr id="1" name=""/>
+        <p:cNvGrpSpPr/>
+        <p:nvPr/>
+      </p:nvGrpSpPr>
+      <p:grpSpPr>
+        <a:xfrm>
+          <a:off x="0" y="0"/>
+          <a:ext cx="0" cy="0"/>
+          <a:chOff x="0" y="0"/>
+          <a:chExt cx="0" cy="0"/>
+        </a:xfrm>
+      </p:grpSpPr>
+      <p:sp>
+        <p:nvSpPr>
+          <p:cNvPr id="2" name="Slide Image Placeholder 1"/>
+          <p:cNvSpPr>
+            <a:spLocks noGrp="1" noRot="1" noChangeAspect="1"/>
+          </p:cNvSpPr>
+          <p:nvPr>
+            <p:ph type="sldImg"/>
+          </p:nvPr>
+        </p:nvSpPr>
+        <p:spPr/>
+      </p:sp>
+      <p:sp>
+        <p:nvSpPr>
+          <p:cNvPr id="3" name="Notes Placeholder 2"/>
+          <p:cNvSpPr>
+            <a:spLocks noGrp="1"/>
+          </p:cNvSpPr>
+          <p:nvPr>
+            <p:ph type="body" idx="1"/>
+          </p:nvPr>
+        </p:nvSpPr>
+        <p:spPr/>
+        <p:txBody>
+          <a:bodyPr/>
+          <a:lstStyle/>
+          <a:p>
+            <a:pPr marL="0" indent="0">
+              <a:buFontTx/>
+              <a:buNone/>
+            </a:pPr>
+            <a:r>
+              <a:rPr lang="en-US" dirty="0"/>
+              <a:t>Talking Points:</a:t>
+            </a:r>
+          </a:p>
+          <a:p>
+            <a:pPr marL="171450" indent="-171450">
+              <a:buFontTx/>
+              <a:buChar char="-"/>
+            </a:pPr>
+            <a:r>
+              <a:rPr lang="en-US" dirty="0">
+                <a:solidFill>
+                  <a:schemeClr val="bg1"/>
+                </a:solidFill>
+                <a:latin typeface="Lato" panose="020F0502020204030203"/>
+              </a:rPr>
+              <a:t>These plots breakdown the 4 statuses of companies as either Operating, Acquired, IPO, or Closed and then is broken down further by the percentages of each category within this status</a:t>
+            </a:r>
+          </a:p>
+          <a:p>
+            <a:pPr marL="171450" indent="-171450">
+              <a:buFontTx/>
+              <a:buChar char="-"/>
+            </a:pPr>
+            <a:r>
+              <a:rPr lang="en-US" dirty="0">
+                <a:solidFill>
+                  <a:schemeClr val="bg1"/>
+                </a:solidFill>
+                <a:latin typeface="Lato" panose="020F0502020204030203"/>
+              </a:rPr>
+              <a:t>The prominent trend shows that software companies are the most prevalent with over 43% in 3 of the 4 categories </a:t>
+            </a:r>
+          </a:p>
+          <a:p>
+            <a:pPr marL="171450" indent="-171450">
+              <a:buFontTx/>
+              <a:buChar char="-"/>
+            </a:pPr>
+            <a:r>
+              <a:rPr lang="en-US" dirty="0">
+                <a:solidFill>
+                  <a:schemeClr val="bg1"/>
+                </a:solidFill>
+                <a:latin typeface="Lato" panose="020F0502020204030203"/>
+              </a:rPr>
+              <a:t>While Operating, Acquired and Closed show similar percentages, IPO plot shows a different story with Technology was the largest category to be taken public (IPO) </a:t>
+            </a:r>
+          </a:p>
+          <a:p>
+            <a:endParaRPr lang="en-US" dirty="0"/>
+          </a:p>
+        </p:txBody>
+      </p:sp>
+      <p:sp>
+        <p:nvSpPr>
+          <p:cNvPr id="4" name="Slide Number Placeholder 3"/>
+          <p:cNvSpPr>
+            <a:spLocks noGrp="1"/>
+          </p:cNvSpPr>
+          <p:nvPr>
+            <p:ph type="sldNum" sz="quarter" idx="5"/>
+          </p:nvPr>
+        </p:nvSpPr>
+        <p:spPr/>
+        <p:txBody>
+          <a:bodyPr/>
+          <a:lstStyle/>
+          <a:p>
+            <a:fld id="{62EE58E6-92D5-40D2-8251-63C5386FE249}" type="slidenum">
+              <a:rPr lang="en-US" smtClean="0"/>
+              <a:t>12</a:t>
+            </a:fld>
+            <a:endParaRPr lang="en-US"/>
+          </a:p>
+        </p:txBody>
+      </p:sp>
+    </p:spTree>
+    <p:extLst>
+      <p:ext uri="{BB962C8B-B14F-4D97-AF65-F5344CB8AC3E}">
+        <p14:creationId xmlns:p14="http://schemas.microsoft.com/office/powerpoint/2010/main" val="4025341267"/>
+      </p:ext>
+    </p:extLst>
+  </p:cSld>
+  <p:clrMapOvr>
+    <a:masterClrMapping/>
+  </p:clrMapOvr>
+</p:notes>
+</file>
+
+<file path=ppt/notesSlides/notesSlide11.xml><?xml version="1.0" encoding="utf-8"?>
+<p:notes xmlns:a="http://schemas.openxmlformats.org/drawingml/2006/main" xmlns:r="http://schemas.openxmlformats.org/officeDocument/2006/relationships" xmlns:p="http://schemas.openxmlformats.org/presentationml/2006/main">
+  <p:cSld>
+    <p:spTree>
+      <p:nvGrpSpPr>
+        <p:cNvPr id="1" name=""/>
+        <p:cNvGrpSpPr/>
+        <p:nvPr/>
+      </p:nvGrpSpPr>
+      <p:grpSpPr>
+        <a:xfrm>
+          <a:off x="0" y="0"/>
+          <a:ext cx="0" cy="0"/>
+          <a:chOff x="0" y="0"/>
+          <a:chExt cx="0" cy="0"/>
+        </a:xfrm>
+      </p:grpSpPr>
+      <p:sp>
+        <p:nvSpPr>
+          <p:cNvPr id="2" name="Slide Image Placeholder 1"/>
+          <p:cNvSpPr>
+            <a:spLocks noGrp="1" noRot="1" noChangeAspect="1"/>
+          </p:cNvSpPr>
+          <p:nvPr>
+            <p:ph type="sldImg"/>
+          </p:nvPr>
+        </p:nvSpPr>
+        <p:spPr/>
+      </p:sp>
+      <p:sp>
+        <p:nvSpPr>
+          <p:cNvPr id="3" name="Notes Placeholder 2"/>
+          <p:cNvSpPr>
+            <a:spLocks noGrp="1"/>
+          </p:cNvSpPr>
+          <p:nvPr>
+            <p:ph type="body" idx="1"/>
+          </p:nvPr>
+        </p:nvSpPr>
+        <p:spPr/>
+        <p:txBody>
+          <a:bodyPr/>
+          <a:lstStyle/>
+          <a:p>
+            <a:pPr marL="0" indent="0">
+              <a:buFontTx/>
+              <a:buNone/>
+            </a:pPr>
+            <a:r>
+              <a:rPr lang="en-US" dirty="0"/>
+              <a:t>Talking Points:</a:t>
+            </a:r>
+          </a:p>
+          <a:p>
+            <a:pPr marL="171450" indent="-171450">
+              <a:buFontTx/>
+              <a:buChar char="-"/>
+            </a:pPr>
+            <a:r>
+              <a:rPr lang="en-US" dirty="0"/>
+              <a:t>This slide displays the previous pie charts with relative size to display the prominence of the status of “operating” amongst companies </a:t>
+            </a:r>
+          </a:p>
+          <a:p>
+            <a:pPr marL="171450" indent="-171450">
+              <a:buFontTx/>
+              <a:buChar char="-"/>
+            </a:pPr>
+            <a:r>
+              <a:rPr lang="en-US" dirty="0"/>
+              <a:t>82% of the companies fall into the category of “operating” while “acquired”, “</a:t>
+            </a:r>
+            <a:r>
+              <a:rPr lang="en-US" dirty="0" err="1"/>
+              <a:t>ipo</a:t>
+            </a:r>
+            <a:r>
+              <a:rPr lang="en-US" dirty="0"/>
+              <a:t>”, and “closed” are 5.9%, 3.5%, and 7.5% respectively</a:t>
+            </a:r>
+          </a:p>
+          <a:p>
+            <a:pPr marL="171450" indent="-171450">
+              <a:buFontTx/>
+              <a:buChar char="-"/>
+            </a:pPr>
+            <a:r>
+              <a:rPr lang="en-US" dirty="0"/>
+              <a:t>This is a good trend for investors as 92.5% of companies in this data set are still in business</a:t>
+            </a:r>
+          </a:p>
+        </p:txBody>
+      </p:sp>
+      <p:sp>
+        <p:nvSpPr>
+          <p:cNvPr id="4" name="Slide Number Placeholder 3"/>
+          <p:cNvSpPr>
+            <a:spLocks noGrp="1"/>
+          </p:cNvSpPr>
+          <p:nvPr>
+            <p:ph type="sldNum" sz="quarter" idx="5"/>
+          </p:nvPr>
+        </p:nvSpPr>
+        <p:spPr/>
+        <p:txBody>
+          <a:bodyPr/>
+          <a:lstStyle/>
+          <a:p>
+            <a:fld id="{62EE58E6-92D5-40D2-8251-63C5386FE249}" type="slidenum">
+              <a:rPr lang="en-US" smtClean="0"/>
+              <a:t>13</a:t>
+            </a:fld>
+            <a:endParaRPr lang="en-US"/>
+          </a:p>
+        </p:txBody>
+      </p:sp>
+    </p:spTree>
+    <p:extLst>
+      <p:ext uri="{BB962C8B-B14F-4D97-AF65-F5344CB8AC3E}">
+        <p14:creationId xmlns:p14="http://schemas.microsoft.com/office/powerpoint/2010/main" val="4100592668"/>
+      </p:ext>
+    </p:extLst>
+  </p:cSld>
+  <p:clrMapOvr>
+    <a:masterClrMapping/>
+  </p:clrMapOvr>
+</p:notes>
+</file>
+
+<file path=ppt/notesSlides/notesSlide12.xml><?xml version="1.0" encoding="utf-8"?>
+<p:notes xmlns:a="http://schemas.openxmlformats.org/drawingml/2006/main" xmlns:r="http://schemas.openxmlformats.org/officeDocument/2006/relationships" xmlns:p="http://schemas.openxmlformats.org/presentationml/2006/main">
+  <p:cSld>
+    <p:spTree>
+      <p:nvGrpSpPr>
+        <p:cNvPr id="1" name=""/>
+        <p:cNvGrpSpPr/>
+        <p:nvPr/>
+      </p:nvGrpSpPr>
+      <p:grpSpPr>
+        <a:xfrm>
+          <a:off x="0" y="0"/>
+          <a:ext cx="0" cy="0"/>
+          <a:chOff x="0" y="0"/>
+          <a:chExt cx="0" cy="0"/>
+        </a:xfrm>
+      </p:grpSpPr>
+      <p:sp>
+        <p:nvSpPr>
+          <p:cNvPr id="2" name="Slide Image Placeholder 1"/>
+          <p:cNvSpPr>
+            <a:spLocks noGrp="1" noRot="1" noChangeAspect="1"/>
+          </p:cNvSpPr>
+          <p:nvPr>
+            <p:ph type="sldImg"/>
+          </p:nvPr>
+        </p:nvSpPr>
+        <p:spPr/>
+      </p:sp>
+      <p:sp>
+        <p:nvSpPr>
+          <p:cNvPr id="3" name="Notes Placeholder 2"/>
+          <p:cNvSpPr>
+            <a:spLocks noGrp="1"/>
+          </p:cNvSpPr>
+          <p:nvPr>
+            <p:ph type="body" idx="1"/>
+          </p:nvPr>
+        </p:nvSpPr>
+        <p:spPr/>
+        <p:txBody>
+          <a:bodyPr/>
+          <a:lstStyle/>
+          <a:p>
+            <a:endParaRPr lang="en-US" dirty="0"/>
+          </a:p>
+        </p:txBody>
+      </p:sp>
+      <p:sp>
+        <p:nvSpPr>
+          <p:cNvPr id="4" name="Slide Number Placeholder 3"/>
+          <p:cNvSpPr>
+            <a:spLocks noGrp="1"/>
+          </p:cNvSpPr>
+          <p:nvPr>
+            <p:ph type="sldNum" sz="quarter" idx="5"/>
+          </p:nvPr>
+        </p:nvSpPr>
+        <p:spPr/>
+        <p:txBody>
+          <a:bodyPr/>
+          <a:lstStyle/>
+          <a:p>
+            <a:fld id="{62EE58E6-92D5-40D2-8251-63C5386FE249}" type="slidenum">
+              <a:rPr lang="en-US" smtClean="0"/>
+              <a:t>15</a:t>
+            </a:fld>
+            <a:endParaRPr lang="en-US"/>
+          </a:p>
+        </p:txBody>
+      </p:sp>
+    </p:spTree>
+    <p:extLst>
+      <p:ext uri="{BB962C8B-B14F-4D97-AF65-F5344CB8AC3E}">
+        <p14:creationId xmlns:p14="http://schemas.microsoft.com/office/powerpoint/2010/main" val="1281214363"/>
+      </p:ext>
+    </p:extLst>
+  </p:cSld>
+  <p:clrMapOvr>
+    <a:masterClrMapping/>
+  </p:clrMapOvr>
+</p:notes>
+</file>
+
+<file path=ppt/notesSlides/notesSlide13.xml><?xml version="1.0" encoding="utf-8"?>
+<p:notes xmlns:a="http://schemas.openxmlformats.org/drawingml/2006/main" xmlns:r="http://schemas.openxmlformats.org/officeDocument/2006/relationships" xmlns:p="http://schemas.openxmlformats.org/presentationml/2006/main">
+  <p:cSld>
+    <p:spTree>
+      <p:nvGrpSpPr>
+        <p:cNvPr id="1" name=""/>
+        <p:cNvGrpSpPr/>
+        <p:nvPr/>
+      </p:nvGrpSpPr>
+      <p:grpSpPr>
+        <a:xfrm>
+          <a:off x="0" y="0"/>
+          <a:ext cx="0" cy="0"/>
+          <a:chOff x="0" y="0"/>
+          <a:chExt cx="0" cy="0"/>
+        </a:xfrm>
+      </p:grpSpPr>
+      <p:sp>
+        <p:nvSpPr>
+          <p:cNvPr id="2" name="Slide Image Placeholder 1"/>
+          <p:cNvSpPr>
+            <a:spLocks noGrp="1" noRot="1" noChangeAspect="1"/>
+          </p:cNvSpPr>
+          <p:nvPr>
+            <p:ph type="sldImg"/>
+          </p:nvPr>
+        </p:nvSpPr>
+        <p:spPr/>
+      </p:sp>
+      <p:sp>
+        <p:nvSpPr>
+          <p:cNvPr id="3" name="Notes Placeholder 2"/>
+          <p:cNvSpPr>
+            <a:spLocks noGrp="1"/>
+          </p:cNvSpPr>
+          <p:nvPr>
+            <p:ph type="body" idx="1"/>
+          </p:nvPr>
+        </p:nvSpPr>
+        <p:spPr/>
+        <p:txBody>
+          <a:bodyPr/>
+          <a:lstStyle/>
+          <a:p>
+            <a:endParaRPr lang="en-US" dirty="0"/>
+          </a:p>
+        </p:txBody>
+      </p:sp>
+      <p:sp>
+        <p:nvSpPr>
+          <p:cNvPr id="4" name="Slide Number Placeholder 3"/>
+          <p:cNvSpPr>
+            <a:spLocks noGrp="1"/>
+          </p:cNvSpPr>
+          <p:nvPr>
+            <p:ph type="sldNum" sz="quarter" idx="5"/>
+          </p:nvPr>
+        </p:nvSpPr>
+        <p:spPr/>
+        <p:txBody>
+          <a:bodyPr/>
+          <a:lstStyle/>
+          <a:p>
+            <a:fld id="{62EE58E6-92D5-40D2-8251-63C5386FE249}" type="slidenum">
+              <a:rPr lang="en-US" smtClean="0"/>
+              <a:t>17</a:t>
+            </a:fld>
+            <a:endParaRPr lang="en-US"/>
+          </a:p>
+        </p:txBody>
+      </p:sp>
+    </p:spTree>
+    <p:extLst>
+      <p:ext uri="{BB962C8B-B14F-4D97-AF65-F5344CB8AC3E}">
+        <p14:creationId xmlns:p14="http://schemas.microsoft.com/office/powerpoint/2010/main" val="1290178468"/>
+      </p:ext>
+    </p:extLst>
+  </p:cSld>
+  <p:clrMapOvr>
+    <a:masterClrMapping/>
+  </p:clrMapOvr>
+</p:notes>
+</file>
+
+<file path=ppt/notesSlides/notesSlide14.xml><?xml version="1.0" encoding="utf-8"?>
+<p:notes xmlns:a="http://schemas.openxmlformats.org/drawingml/2006/main" xmlns:r="http://schemas.openxmlformats.org/officeDocument/2006/relationships" xmlns:p="http://schemas.openxmlformats.org/presentationml/2006/main">
+  <p:cSld>
+    <p:spTree>
+      <p:nvGrpSpPr>
+        <p:cNvPr id="1" name=""/>
+        <p:cNvGrpSpPr/>
+        <p:nvPr/>
+      </p:nvGrpSpPr>
+      <p:grpSpPr>
+        <a:xfrm>
+          <a:off x="0" y="0"/>
+          <a:ext cx="0" cy="0"/>
+          <a:chOff x="0" y="0"/>
+          <a:chExt cx="0" cy="0"/>
+        </a:xfrm>
+      </p:grpSpPr>
+      <p:sp>
+        <p:nvSpPr>
+          <p:cNvPr id="2" name="Slide Image Placeholder 1"/>
+          <p:cNvSpPr>
+            <a:spLocks noGrp="1" noRot="1" noChangeAspect="1"/>
+          </p:cNvSpPr>
+          <p:nvPr>
+            <p:ph type="sldImg"/>
+          </p:nvPr>
+        </p:nvSpPr>
+        <p:spPr/>
+      </p:sp>
+      <p:sp>
+        <p:nvSpPr>
+          <p:cNvPr id="3" name="Notes Placeholder 2"/>
+          <p:cNvSpPr>
+            <a:spLocks noGrp="1"/>
+          </p:cNvSpPr>
+          <p:nvPr>
+            <p:ph type="body" idx="1"/>
+          </p:nvPr>
+        </p:nvSpPr>
+        <p:spPr/>
+        <p:txBody>
+          <a:bodyPr/>
+          <a:lstStyle/>
+          <a:p>
+            <a:endParaRPr lang="en-US" dirty="0"/>
+          </a:p>
+        </p:txBody>
+      </p:sp>
+      <p:sp>
+        <p:nvSpPr>
+          <p:cNvPr id="4" name="Slide Number Placeholder 3"/>
+          <p:cNvSpPr>
+            <a:spLocks noGrp="1"/>
+          </p:cNvSpPr>
+          <p:nvPr>
+            <p:ph type="sldNum" sz="quarter" idx="5"/>
+          </p:nvPr>
+        </p:nvSpPr>
+        <p:spPr/>
+        <p:txBody>
+          <a:bodyPr/>
+          <a:lstStyle/>
+          <a:p>
+            <a:fld id="{62EE58E6-92D5-40D2-8251-63C5386FE249}" type="slidenum">
+              <a:rPr lang="en-US" smtClean="0"/>
+              <a:t>18</a:t>
+            </a:fld>
+            <a:endParaRPr lang="en-US"/>
+          </a:p>
+        </p:txBody>
+      </p:sp>
+    </p:spTree>
+    <p:extLst>
+      <p:ext uri="{BB962C8B-B14F-4D97-AF65-F5344CB8AC3E}">
+        <p14:creationId xmlns:p14="http://schemas.microsoft.com/office/powerpoint/2010/main" val="668280716"/>
       </p:ext>
     </p:extLst>
   </p:cSld>
@@ -1220,7 +1734,13 @@
           <a:p>
             <a:r>
               <a:rPr lang="en-US" dirty="0"/>
-              <a:t>Omar to cover mission with hypothesis and questions we set to answer</a:t>
+              <a:t>Charles to present </a:t>
+            </a:r>
+          </a:p>
+          <a:p>
+            <a:r>
+              <a:rPr lang="en-US" dirty="0"/>
+              <a:t>“Ok so now that you know what we are about its time to meet the team… we have Don, Drew, Omar (the team lead) and myself (Charles) who will start off with our mission for this project”</a:t>
             </a:r>
           </a:p>
         </p:txBody>
@@ -1232,7 +1752,7 @@
             <a:spLocks noGrp="1"/>
           </p:cNvSpPr>
           <p:nvPr>
-            <p:ph type="sldNum" sz="quarter" idx="5"/>
+            <p:ph type="sldNum" sz="quarter" idx="10"/>
           </p:nvPr>
         </p:nvSpPr>
         <p:spPr/>
@@ -1240,18 +1760,18 @@
           <a:bodyPr/>
           <a:lstStyle/>
           <a:p>
-            <a:fld id="{62EE58E6-92D5-40D2-8251-63C5386FE249}" type="slidenum">
+            <a:fld id="{7F220CB7-DCA5-4E5B-97F1-300CDD8D2AAB}" type="slidenum">
               <a:rPr lang="en-US" smtClean="0"/>
-              <a:t>3</a:t>
+              <a:t>2</a:t>
             </a:fld>
-            <a:endParaRPr lang="en-US"/>
+            <a:endParaRPr lang="en-US" dirty="0"/>
           </a:p>
         </p:txBody>
       </p:sp>
     </p:spTree>
     <p:extLst>
       <p:ext uri="{BB962C8B-B14F-4D97-AF65-F5344CB8AC3E}">
-        <p14:creationId xmlns:p14="http://schemas.microsoft.com/office/powerpoint/2010/main" val="3784700002"/>
+        <p14:creationId xmlns:p14="http://schemas.microsoft.com/office/powerpoint/2010/main" val="3911923116"/>
       </p:ext>
     </p:extLst>
   </p:cSld>
@@ -1307,11 +1827,8 @@
           <a:p>
             <a:r>
               <a:rPr lang="en-US" dirty="0"/>
-              <a:t>Omar to cover methodology and then turn over to…..</a:t>
-            </a:r>
-          </a:p>
-          <a:p>
-            <a:endParaRPr lang="en-US" dirty="0"/>
+              <a:t>Charles to cover mission with questions we set to answer</a:t>
+            </a:r>
           </a:p>
         </p:txBody>
       </p:sp>
@@ -1332,7 +1849,7 @@
           <a:p>
             <a:fld id="{62EE58E6-92D5-40D2-8251-63C5386FE249}" type="slidenum">
               <a:rPr lang="en-US" smtClean="0"/>
-              <a:t>5</a:t>
+              <a:t>3</a:t>
             </a:fld>
             <a:endParaRPr lang="en-US"/>
           </a:p>
@@ -1341,7 +1858,7 @@
     </p:spTree>
     <p:extLst>
       <p:ext uri="{BB962C8B-B14F-4D97-AF65-F5344CB8AC3E}">
-        <p14:creationId xmlns:p14="http://schemas.microsoft.com/office/powerpoint/2010/main" val="3195519237"/>
+        <p14:creationId xmlns:p14="http://schemas.microsoft.com/office/powerpoint/2010/main" val="3784700002"/>
       </p:ext>
     </p:extLst>
   </p:cSld>
@@ -1397,7 +1914,7 @@
           <a:p>
             <a:r>
               <a:rPr lang="en-US" dirty="0"/>
-              <a:t>Macro view of where the companies and funding are. This is a good visual of where are the companies, and where is the funding?</a:t>
+              <a:t>“Here we have our table of Contents if you get lost along the way”</a:t>
             </a:r>
           </a:p>
         </p:txBody>
@@ -1419,7 +1936,7 @@
           <a:p>
             <a:fld id="{62EE58E6-92D5-40D2-8251-63C5386FE249}" type="slidenum">
               <a:rPr lang="en-US" smtClean="0"/>
-              <a:t>7</a:t>
+              <a:t>4</a:t>
             </a:fld>
             <a:endParaRPr lang="en-US"/>
           </a:p>
@@ -1428,7 +1945,7 @@
     </p:spTree>
     <p:extLst>
       <p:ext uri="{BB962C8B-B14F-4D97-AF65-F5344CB8AC3E}">
-        <p14:creationId xmlns:p14="http://schemas.microsoft.com/office/powerpoint/2010/main" val="1355675700"/>
+        <p14:creationId xmlns:p14="http://schemas.microsoft.com/office/powerpoint/2010/main" val="1071082043"/>
       </p:ext>
     </p:extLst>
   </p:cSld>
@@ -1484,42 +2001,11 @@
           <a:p>
             <a:r>
               <a:rPr lang="en-US" dirty="0"/>
-              <a:t>Diving deeper into the details, we plotted the data in a heatmap to see if we can see any trends. At the macro level, 2 categories: Technology and Software are apparent across most of the cities. When we zoom in, by filtering out category funding of under $1B, we can see these trends more clearly. NY and </a:t>
-            </a:r>
-            <a:r>
-              <a:rPr lang="en-US" dirty="0" err="1"/>
-              <a:t>SanFran</a:t>
-            </a:r>
-            <a:r>
-              <a:rPr lang="en-US" dirty="0"/>
-              <a:t> are also very popular across all categories. </a:t>
-            </a:r>
-          </a:p>
-          <a:p>
-            <a:r>
-              <a:rPr lang="en-US" dirty="0"/>
-              <a:t>Marketing/Software in NY</a:t>
-            </a:r>
-          </a:p>
-          <a:p>
-            <a:r>
-              <a:rPr lang="en-US" dirty="0"/>
-              <a:t>Finance/Software/Transportation in San Fran. Finance was interesting, but is in-line with the </a:t>
-            </a:r>
-            <a:r>
-              <a:rPr lang="en-US" dirty="0" err="1"/>
-              <a:t>fintechs</a:t>
-            </a:r>
-            <a:r>
-              <a:rPr lang="en-US" dirty="0"/>
-              <a:t> coming out of silicon valley.</a:t>
-            </a:r>
-          </a:p>
-          <a:p>
-            <a:r>
-              <a:rPr lang="en-US" dirty="0"/>
-              <a:t>Turn over to Don</a:t>
-            </a:r>
+              <a:t>Charles to cover methodology and then turn over to Drew…</a:t>
+            </a:r>
+          </a:p>
+          <a:p>
+            <a:endParaRPr lang="en-US" dirty="0"/>
           </a:p>
         </p:txBody>
       </p:sp>
@@ -1540,7 +2026,7 @@
           <a:p>
             <a:fld id="{62EE58E6-92D5-40D2-8251-63C5386FE249}" type="slidenum">
               <a:rPr lang="en-US" smtClean="0"/>
-              <a:t>8</a:t>
+              <a:t>5</a:t>
             </a:fld>
             <a:endParaRPr lang="en-US"/>
           </a:p>
@@ -1549,7 +2035,7 @@
     </p:spTree>
     <p:extLst>
       <p:ext uri="{BB962C8B-B14F-4D97-AF65-F5344CB8AC3E}">
-        <p14:creationId xmlns:p14="http://schemas.microsoft.com/office/powerpoint/2010/main" val="3566492009"/>
+        <p14:creationId xmlns:p14="http://schemas.microsoft.com/office/powerpoint/2010/main" val="3195519237"/>
       </p:ext>
     </p:extLst>
   </p:cSld>
@@ -1605,7 +2091,7 @@
           <a:p>
             <a:r>
               <a:rPr lang="en-US" dirty="0"/>
-              <a:t>Don to cover</a:t>
+              <a:t>Macro view of where the companies and funding are. This is a good visual of where are the companies, and where is the funding?</a:t>
             </a:r>
           </a:p>
         </p:txBody>
@@ -1627,7 +2113,7 @@
           <a:p>
             <a:fld id="{62EE58E6-92D5-40D2-8251-63C5386FE249}" type="slidenum">
               <a:rPr lang="en-US" smtClean="0"/>
-              <a:t>9</a:t>
+              <a:t>7</a:t>
             </a:fld>
             <a:endParaRPr lang="en-US"/>
           </a:p>
@@ -1636,7 +2122,7 @@
     </p:spTree>
     <p:extLst>
       <p:ext uri="{BB962C8B-B14F-4D97-AF65-F5344CB8AC3E}">
-        <p14:creationId xmlns:p14="http://schemas.microsoft.com/office/powerpoint/2010/main" val="1653409152"/>
+        <p14:creationId xmlns:p14="http://schemas.microsoft.com/office/powerpoint/2010/main" val="1355675700"/>
       </p:ext>
     </p:extLst>
   </p:cSld>
@@ -1692,42 +2178,42 @@
           <a:p>
             <a:r>
               <a:rPr lang="en-US" dirty="0"/>
-              <a:t>Focus is by state and micro of city. City proves NYC and San Fran as biggest cities for investments</a:t>
-            </a:r>
-          </a:p>
-          <a:p>
-            <a:endParaRPr lang="en-US" dirty="0"/>
-          </a:p>
-          <a:p>
-            <a:pPr marL="0" marR="0" lvl="0" indent="0" algn="l" defTabSz="914400" rtl="0" eaLnBrk="1" fontAlgn="auto" latinLnBrk="0" hangingPunct="1">
-              <a:lnSpc>
-                <a:spcPct val="100000"/>
-              </a:lnSpc>
-              <a:spcBef>
-                <a:spcPts val="0"/>
-              </a:spcBef>
-              <a:spcAft>
-                <a:spcPts val="0"/>
-              </a:spcAft>
-              <a:buClrTx/>
-              <a:buSzTx/>
-              <a:buFontTx/>
-              <a:buNone/>
-              <a:tabLst/>
-              <a:defRPr/>
-            </a:pPr>
-            <a:r>
-              <a:rPr lang="en-US" dirty="0">
-                <a:solidFill>
-                  <a:schemeClr val="bg1"/>
-                </a:solidFill>
-                <a:latin typeface="Lato" panose="020F0502020204030203"/>
-              </a:rPr>
-              <a:t>While San Francisco has the highest number of investors by city (24%), NYC has the highest percentage of total investors in respect to its state (91%)</a:t>
-            </a:r>
-          </a:p>
-          <a:p>
-            <a:endParaRPr lang="en-US" dirty="0"/>
+              <a:t>Diving deeper into the details, we plotted the data in a heatmap to see if we can see any trends. At the macro level, 2 categories: Technology and Software are apparent across most of the cities. When we zoom in, by filtering out category funding of under $1B, we can see these trends more clearly. NY and </a:t>
+            </a:r>
+            <a:r>
+              <a:rPr lang="en-US" dirty="0" err="1"/>
+              <a:t>SanFran</a:t>
+            </a:r>
+            <a:r>
+              <a:rPr lang="en-US" dirty="0"/>
+              <a:t> are also very popular across all categories. </a:t>
+            </a:r>
+          </a:p>
+          <a:p>
+            <a:r>
+              <a:rPr lang="en-US" dirty="0"/>
+              <a:t>Marketing/Software in NY</a:t>
+            </a:r>
+          </a:p>
+          <a:p>
+            <a:r>
+              <a:rPr lang="en-US" dirty="0"/>
+              <a:t>Finance/Software/Transportation in San Fran. Finance was interesting, but is in-line with the </a:t>
+            </a:r>
+            <a:r>
+              <a:rPr lang="en-US" dirty="0" err="1"/>
+              <a:t>fintechs</a:t>
+            </a:r>
+            <a:r>
+              <a:rPr lang="en-US" dirty="0"/>
+              <a:t> coming out of silicon valley.</a:t>
+            </a:r>
+          </a:p>
+          <a:p>
+            <a:r>
+              <a:rPr lang="en-US" dirty="0"/>
+              <a:t>Turn over to Don</a:t>
+            </a:r>
           </a:p>
         </p:txBody>
       </p:sp>
@@ -1748,7 +2234,7 @@
           <a:p>
             <a:fld id="{62EE58E6-92D5-40D2-8251-63C5386FE249}" type="slidenum">
               <a:rPr lang="en-US" smtClean="0"/>
-              <a:t>11</a:t>
+              <a:t>8</a:t>
             </a:fld>
             <a:endParaRPr lang="en-US"/>
           </a:p>
@@ -1757,7 +2243,7 @@
     </p:spTree>
     <p:extLst>
       <p:ext uri="{BB962C8B-B14F-4D97-AF65-F5344CB8AC3E}">
-        <p14:creationId xmlns:p14="http://schemas.microsoft.com/office/powerpoint/2010/main" val="1263075450"/>
+        <p14:creationId xmlns:p14="http://schemas.microsoft.com/office/powerpoint/2010/main" val="3566492009"/>
       </p:ext>
     </p:extLst>
   </p:cSld>
@@ -1811,7 +2297,10 @@
           <a:bodyPr/>
           <a:lstStyle/>
           <a:p>
-            <a:endParaRPr lang="en-US" dirty="0"/>
+            <a:r>
+              <a:rPr lang="en-US" dirty="0"/>
+              <a:t>Don to cover</a:t>
+            </a:r>
           </a:p>
         </p:txBody>
       </p:sp>
@@ -1832,7 +2321,7 @@
           <a:p>
             <a:fld id="{62EE58E6-92D5-40D2-8251-63C5386FE249}" type="slidenum">
               <a:rPr lang="en-US" smtClean="0"/>
-              <a:t>12</a:t>
+              <a:t>9</a:t>
             </a:fld>
             <a:endParaRPr lang="en-US"/>
           </a:p>
@@ -1841,7 +2330,152 @@
     </p:spTree>
     <p:extLst>
       <p:ext uri="{BB962C8B-B14F-4D97-AF65-F5344CB8AC3E}">
-        <p14:creationId xmlns:p14="http://schemas.microsoft.com/office/powerpoint/2010/main" val="4025341267"/>
+        <p14:creationId xmlns:p14="http://schemas.microsoft.com/office/powerpoint/2010/main" val="1653409152"/>
+      </p:ext>
+    </p:extLst>
+  </p:cSld>
+  <p:clrMapOvr>
+    <a:masterClrMapping/>
+  </p:clrMapOvr>
+</p:notes>
+</file>
+
+<file path=ppt/notesSlides/notesSlide9.xml><?xml version="1.0" encoding="utf-8"?>
+<p:notes xmlns:a="http://schemas.openxmlformats.org/drawingml/2006/main" xmlns:r="http://schemas.openxmlformats.org/officeDocument/2006/relationships" xmlns:p="http://schemas.openxmlformats.org/presentationml/2006/main">
+  <p:cSld>
+    <p:spTree>
+      <p:nvGrpSpPr>
+        <p:cNvPr id="1" name=""/>
+        <p:cNvGrpSpPr/>
+        <p:nvPr/>
+      </p:nvGrpSpPr>
+      <p:grpSpPr>
+        <a:xfrm>
+          <a:off x="0" y="0"/>
+          <a:ext cx="0" cy="0"/>
+          <a:chOff x="0" y="0"/>
+          <a:chExt cx="0" cy="0"/>
+        </a:xfrm>
+      </p:grpSpPr>
+      <p:sp>
+        <p:nvSpPr>
+          <p:cNvPr id="2" name="Slide Image Placeholder 1"/>
+          <p:cNvSpPr>
+            <a:spLocks noGrp="1" noRot="1" noChangeAspect="1"/>
+          </p:cNvSpPr>
+          <p:nvPr>
+            <p:ph type="sldImg"/>
+          </p:nvPr>
+        </p:nvSpPr>
+        <p:spPr/>
+      </p:sp>
+      <p:sp>
+        <p:nvSpPr>
+          <p:cNvPr id="3" name="Notes Placeholder 2"/>
+          <p:cNvSpPr>
+            <a:spLocks noGrp="1"/>
+          </p:cNvSpPr>
+          <p:nvPr>
+            <p:ph type="body" idx="1"/>
+          </p:nvPr>
+        </p:nvSpPr>
+        <p:spPr/>
+        <p:txBody>
+          <a:bodyPr/>
+          <a:lstStyle/>
+          <a:p>
+            <a:pPr marL="0" indent="0">
+              <a:buFontTx/>
+              <a:buNone/>
+            </a:pPr>
+            <a:r>
+              <a:rPr lang="en-US" dirty="0"/>
+              <a:t>Talking Points:</a:t>
+            </a:r>
+          </a:p>
+          <a:p>
+            <a:pPr marL="171450" indent="-171450">
+              <a:buFontTx/>
+              <a:buChar char="-"/>
+            </a:pPr>
+            <a:r>
+              <a:rPr lang="en-US" dirty="0"/>
+              <a:t>This plot examines the number of investors per State, with the size of the plot representing the total funding</a:t>
+            </a:r>
+          </a:p>
+          <a:p>
+            <a:pPr marL="171450" indent="-171450">
+              <a:buFontTx/>
+              <a:buChar char="-"/>
+            </a:pPr>
+            <a:r>
+              <a:rPr lang="en-US" dirty="0"/>
+              <a:t>This plot shows that California and NY have largest number of investors per state (50% and 16% respectively), following previous trends of these costal states being hotbeds for investment</a:t>
+            </a:r>
+          </a:p>
+          <a:p>
+            <a:pPr marL="171450" indent="-171450">
+              <a:buFontTx/>
+              <a:buChar char="-"/>
+            </a:pPr>
+            <a:r>
+              <a:rPr lang="en-US" dirty="0"/>
+              <a:t>Taking a deeper dive we investigate the number of investors per city, which shows that San Francisco and NY have the greatest number investors</a:t>
+            </a:r>
+            <a:endParaRPr lang="en-US" dirty="0">
+              <a:solidFill>
+                <a:schemeClr val="tx1"/>
+              </a:solidFill>
+              <a:latin typeface="+mn-lt"/>
+            </a:endParaRPr>
+          </a:p>
+          <a:p>
+            <a:pPr marL="171450" indent="-171450">
+              <a:buFontTx/>
+              <a:buChar char="-"/>
+            </a:pPr>
+            <a:r>
+              <a:rPr lang="en-US" dirty="0">
+                <a:solidFill>
+                  <a:schemeClr val="bg1"/>
+                </a:solidFill>
+                <a:latin typeface="Lato" panose="020F0502020204030203"/>
+              </a:rPr>
+              <a:t>While San Francisco has the highest number of investors by city (24%), NYC has the highest percentage of total investors in respect to its state (91%)</a:t>
+            </a:r>
+          </a:p>
+          <a:p>
+            <a:endParaRPr lang="en-US" dirty="0"/>
+          </a:p>
+        </p:txBody>
+      </p:sp>
+      <p:sp>
+        <p:nvSpPr>
+          <p:cNvPr id="4" name="Slide Number Placeholder 3"/>
+          <p:cNvSpPr>
+            <a:spLocks noGrp="1"/>
+          </p:cNvSpPr>
+          <p:nvPr>
+            <p:ph type="sldNum" sz="quarter" idx="5"/>
+          </p:nvPr>
+        </p:nvSpPr>
+        <p:spPr/>
+        <p:txBody>
+          <a:bodyPr/>
+          <a:lstStyle/>
+          <a:p>
+            <a:fld id="{62EE58E6-92D5-40D2-8251-63C5386FE249}" type="slidenum">
+              <a:rPr lang="en-US" smtClean="0"/>
+              <a:t>11</a:t>
+            </a:fld>
+            <a:endParaRPr lang="en-US"/>
+          </a:p>
+        </p:txBody>
+      </p:sp>
+    </p:spTree>
+    <p:extLst>
+      <p:ext uri="{BB962C8B-B14F-4D97-AF65-F5344CB8AC3E}">
+        <p14:creationId xmlns:p14="http://schemas.microsoft.com/office/powerpoint/2010/main" val="1263075450"/>
       </p:ext>
     </p:extLst>
   </p:cSld>
@@ -9333,7 +9967,7 @@
         </p:nvSpPr>
         <p:spPr>
           <a:xfrm>
-            <a:off x="0" y="1"/>
+            <a:off x="119149" y="126522"/>
             <a:ext cx="11953701" cy="635070"/>
           </a:xfrm>
         </p:spPr>
@@ -9597,7 +10231,7 @@
         </p:blipFill>
         <p:spPr>
           <a:xfrm>
-            <a:off x="5199017" y="774758"/>
+            <a:off x="5199017" y="805067"/>
             <a:ext cx="6493675" cy="5566007"/>
           </a:xfrm>
           <a:prstGeom prst="rect">
@@ -9653,7 +10287,7 @@
         </p:nvSpPr>
         <p:spPr>
           <a:xfrm>
-            <a:off x="35575" y="15501"/>
+            <a:off x="174668" y="229625"/>
             <a:ext cx="11318225" cy="777875"/>
           </a:xfrm>
         </p:spPr>
@@ -9668,7 +10302,7 @@
                 </a:solidFill>
                 <a:latin typeface="Lato" panose="020F0502020204030203"/>
               </a:rPr>
-              <a:t>Investors: by State &amp; City</a:t>
+              <a:t>Investors: State &amp; City</a:t>
             </a:r>
           </a:p>
         </p:txBody>
@@ -9701,8 +10335,8 @@
         </p:blipFill>
         <p:spPr>
           <a:xfrm>
-            <a:off x="5330120" y="3109761"/>
-            <a:ext cx="6861880" cy="3767795"/>
+            <a:off x="3819083" y="1332376"/>
+            <a:ext cx="8085242" cy="4439532"/>
           </a:xfrm>
           <a:prstGeom prst="rect">
             <a:avLst/>
@@ -9736,8 +10370,8 @@
         </p:blipFill>
         <p:spPr>
           <a:xfrm>
-            <a:off x="5270643" y="-1"/>
-            <a:ext cx="6921358" cy="3741685"/>
+            <a:off x="3819084" y="1332376"/>
+            <a:ext cx="8085242" cy="4439533"/>
           </a:xfrm>
           <a:prstGeom prst="rect">
             <a:avLst/>
@@ -9780,6 +10414,17 @@
             </a:endParaRPr>
           </a:p>
           <a:p>
+            <a:r>
+              <a:rPr lang="en-US" dirty="0">
+                <a:solidFill>
+                  <a:schemeClr val="bg1"/>
+                </a:solidFill>
+                <a:latin typeface="Lato" panose="020F0502020204030203"/>
+              </a:rPr>
+              <a:t>We observed that CA and NY were the primary states of companies that investors invested in</a:t>
+            </a:r>
+          </a:p>
+          <a:p>
             <a:endParaRPr lang="en-US" dirty="0">
               <a:solidFill>
                 <a:schemeClr val="bg1"/>
@@ -9788,17 +10433,6 @@
             </a:endParaRPr>
           </a:p>
           <a:p>
-            <a:r>
-              <a:rPr lang="en-US" dirty="0">
-                <a:solidFill>
-                  <a:schemeClr val="bg1"/>
-                </a:solidFill>
-                <a:latin typeface="Lato" panose="020F0502020204030203"/>
-              </a:rPr>
-              <a:t>We have observed that the California had the top number of investors of any other state with roughly 50% of total investors </a:t>
-            </a:r>
-          </a:p>
-          <a:p>
             <a:endParaRPr lang="en-US" dirty="0">
               <a:solidFill>
                 <a:schemeClr val="bg1"/>
@@ -9807,6 +10441,17 @@
             </a:endParaRPr>
           </a:p>
           <a:p>
+            <a:r>
+              <a:rPr lang="en-US" dirty="0">
+                <a:solidFill>
+                  <a:schemeClr val="bg1"/>
+                </a:solidFill>
+                <a:latin typeface="Lato" panose="020F0502020204030203"/>
+              </a:rPr>
+              <a:t>California had the top number of investors of any other state with roughly 50% of total investors </a:t>
+            </a:r>
+          </a:p>
+          <a:p>
             <a:endParaRPr lang="en-US" dirty="0">
               <a:solidFill>
                 <a:schemeClr val="bg1"/>
@@ -9829,17 +10474,6 @@
               </a:solidFill>
               <a:latin typeface="Lato" panose="020F0502020204030203"/>
             </a:endParaRPr>
-          </a:p>
-          <a:p>
-            <a:r>
-              <a:rPr lang="en-US" dirty="0">
-                <a:solidFill>
-                  <a:schemeClr val="bg1"/>
-                </a:solidFill>
-                <a:latin typeface="Lato" panose="020F0502020204030203"/>
-              </a:rPr>
-              <a:t>Both figures point to high concentration on investors at costal states and cities </a:t>
-            </a:r>
           </a:p>
         </p:txBody>
       </p:sp>
@@ -10025,6 +10659,81 @@
   <p:clrMapOvr>
     <a:masterClrMapping/>
   </p:clrMapOvr>
+  <p:timing>
+    <p:tnLst>
+      <p:par>
+        <p:cTn id="1" dur="indefinite" restart="never" nodeType="tmRoot">
+          <p:childTnLst>
+            <p:seq concurrent="1" nextAc="seek">
+              <p:cTn id="2" dur="indefinite" nodeType="mainSeq">
+                <p:childTnLst>
+                  <p:par>
+                    <p:cTn id="3" fill="hold">
+                      <p:stCondLst>
+                        <p:cond delay="indefinite"/>
+                      </p:stCondLst>
+                      <p:childTnLst>
+                        <p:par>
+                          <p:cTn id="4" fill="hold">
+                            <p:stCondLst>
+                              <p:cond delay="0"/>
+                            </p:stCondLst>
+                            <p:childTnLst>
+                              <p:par>
+                                <p:cTn id="5" presetID="1" presetClass="entr" presetSubtype="0" fill="hold" nodeType="clickEffect">
+                                  <p:stCondLst>
+                                    <p:cond delay="0"/>
+                                  </p:stCondLst>
+                                  <p:childTnLst>
+                                    <p:set>
+                                      <p:cBhvr>
+                                        <p:cTn id="6" dur="1" fill="hold">
+                                          <p:stCondLst>
+                                            <p:cond delay="0"/>
+                                          </p:stCondLst>
+                                        </p:cTn>
+                                        <p:tgtEl>
+                                          <p:spTgt spid="5"/>
+                                        </p:tgtEl>
+                                        <p:attrNameLst>
+                                          <p:attrName>style.visibility</p:attrName>
+                                        </p:attrNameLst>
+                                      </p:cBhvr>
+                                      <p:to>
+                                        <p:strVal val="visible"/>
+                                      </p:to>
+                                    </p:set>
+                                  </p:childTnLst>
+                                </p:cTn>
+                              </p:par>
+                            </p:childTnLst>
+                          </p:cTn>
+                        </p:par>
+                      </p:childTnLst>
+                    </p:cTn>
+                  </p:par>
+                </p:childTnLst>
+              </p:cTn>
+              <p:prevCondLst>
+                <p:cond evt="onPrev" delay="0">
+                  <p:tgtEl>
+                    <p:sldTgt/>
+                  </p:tgtEl>
+                </p:cond>
+              </p:prevCondLst>
+              <p:nextCondLst>
+                <p:cond evt="onNext" delay="0">
+                  <p:tgtEl>
+                    <p:sldTgt/>
+                  </p:tgtEl>
+                </p:cond>
+              </p:nextCondLst>
+            </p:seq>
+          </p:childTnLst>
+        </p:cTn>
+      </p:par>
+    </p:tnLst>
+  </p:timing>
 </p:sld>
 </file>
 
@@ -10063,7 +10772,7 @@
         </p:nvSpPr>
         <p:spPr>
           <a:xfrm>
-            <a:off x="0" y="18035"/>
+            <a:off x="123289" y="157282"/>
             <a:ext cx="10666084" cy="536544"/>
           </a:xfrm>
         </p:spPr>
@@ -10099,7 +10808,7 @@
         </p:nvGrpSpPr>
         <p:grpSpPr>
           <a:xfrm>
-            <a:off x="4240728" y="873343"/>
+            <a:off x="4220180" y="1161019"/>
             <a:ext cx="7666968" cy="5111313"/>
             <a:chOff x="2262516" y="1690688"/>
             <a:chExt cx="7666968" cy="5111313"/>
@@ -10271,7 +10980,7 @@
             </p:nvSpPr>
             <p:spPr>
               <a:xfrm>
-                <a:off x="6169036" y="1728073"/>
+                <a:off x="6096000" y="1728073"/>
                 <a:ext cx="1351280" cy="369332"/>
               </a:xfrm>
               <a:prstGeom prst="rect">
@@ -10407,10 +11116,10 @@
           </p:nvGrpSpPr>
           <p:grpSpPr>
             <a:xfrm>
-              <a:off x="6096000" y="4246345"/>
-              <a:ext cx="3833484" cy="2555656"/>
-              <a:chOff x="6096000" y="4246345"/>
-              <a:chExt cx="3833484" cy="2555656"/>
+              <a:off x="6096000" y="4246344"/>
+              <a:ext cx="3833484" cy="2555657"/>
+              <a:chOff x="6096000" y="4246344"/>
+              <a:chExt cx="3833484" cy="2555657"/>
             </a:xfrm>
           </p:grpSpPr>
           <p:pic>
@@ -10463,7 +11172,7 @@
             </p:nvSpPr>
             <p:spPr>
               <a:xfrm>
-                <a:off x="6096000" y="4422100"/>
+                <a:off x="6096000" y="4246344"/>
                 <a:ext cx="1351280" cy="369332"/>
               </a:xfrm>
               <a:prstGeom prst="rect">
@@ -10677,7 +11386,7 @@
         <p:spPr>
           <a:xfrm>
             <a:off x="198800" y="1332376"/>
-            <a:ext cx="3378118" cy="2585323"/>
+            <a:ext cx="3378118" cy="2308324"/>
           </a:xfrm>
           <a:prstGeom prst="rect">
             <a:avLst/>
@@ -10702,7 +11411,7 @@
                 </a:solidFill>
                 <a:latin typeface="Lato" panose="020F0502020204030203"/>
               </a:rPr>
-              <a:t>We have observed that the largest category across the board is software showing its prevalence within the start-up space</a:t>
+              <a:t>The largest category across the board is software showing its prevalence as a type of company that investors invest into </a:t>
             </a:r>
           </a:p>
           <a:p>
@@ -10720,17 +11429,6 @@
               </a:solidFill>
               <a:latin typeface="Lato" panose="020F0502020204030203"/>
             </a:endParaRPr>
-          </a:p>
-          <a:p>
-            <a:r>
-              <a:rPr lang="en-US" dirty="0">
-                <a:solidFill>
-                  <a:schemeClr val="bg1"/>
-                </a:solidFill>
-                <a:latin typeface="Lato" panose="020F0502020204030203"/>
-              </a:rPr>
-              <a:t>Technology was the largest category to be taken public (IPO) </a:t>
-            </a:r>
           </a:p>
         </p:txBody>
       </p:sp>
@@ -10782,7 +11480,7 @@
         </p:nvSpPr>
         <p:spPr>
           <a:xfrm>
-            <a:off x="0" y="0"/>
+            <a:off x="123289" y="125916"/>
             <a:ext cx="10515600" cy="646331"/>
           </a:xfrm>
         </p:spPr>
@@ -11027,7 +11725,7 @@
               <p:nvPr/>
             </p:nvPicPr>
             <p:blipFill rotWithShape="1">
-              <a:blip r:embed="rId2">
+              <a:blip r:embed="rId3">
                 <a:extLst>
                   <a:ext uri="{28A0092B-C50C-407E-A947-70E740481C1C}">
                     <a14:useLocalDpi xmlns:a14="http://schemas.microsoft.com/office/drawing/2010/main" val="0"/>
@@ -11056,7 +11754,7 @@
               <p:nvPr/>
             </p:nvPicPr>
             <p:blipFill rotWithShape="1">
-              <a:blip r:embed="rId3"/>
+              <a:blip r:embed="rId4"/>
               <a:srcRect l="11323" r="56699"/>
               <a:stretch/>
             </p:blipFill>
@@ -11079,7 +11777,7 @@
               <p:nvPr/>
             </p:nvPicPr>
             <p:blipFill rotWithShape="1">
-              <a:blip r:embed="rId4"/>
+              <a:blip r:embed="rId5"/>
               <a:srcRect r="62326"/>
               <a:stretch/>
             </p:blipFill>
@@ -11103,7 +11801,7 @@
             <p:nvPr/>
           </p:nvPicPr>
           <p:blipFill rotWithShape="1">
-            <a:blip r:embed="rId5"/>
+            <a:blip r:embed="rId6"/>
             <a:srcRect r="15087" b="88553"/>
             <a:stretch/>
           </p:blipFill>
@@ -11133,7 +11831,7 @@
           <p:nvPr/>
         </p:nvPicPr>
         <p:blipFill>
-          <a:blip r:embed="rId6">
+          <a:blip r:embed="rId7">
             <a:duotone>
               <a:schemeClr val="accent1">
                 <a:shade val="45000"/>
@@ -12080,7 +12778,7 @@
           <p:nvPr/>
         </p:nvPicPr>
         <p:blipFill>
-          <a:blip r:embed="rId2"/>
+          <a:blip r:embed="rId3"/>
           <a:stretch>
             <a:fillRect/>
           </a:stretch>
@@ -12110,7 +12808,7 @@
           <p:nvPr/>
         </p:nvPicPr>
         <p:blipFill>
-          <a:blip r:embed="rId3"/>
+          <a:blip r:embed="rId4"/>
           <a:stretch>
             <a:fillRect/>
           </a:stretch>
@@ -12199,7 +12897,7 @@
           <p:nvPr/>
         </p:nvPicPr>
         <p:blipFill>
-          <a:blip r:embed="rId4">
+          <a:blip r:embed="rId5">
             <a:duotone>
               <a:schemeClr val="accent1">
                 <a:shade val="45000"/>
@@ -12540,16 +13238,7 @@
                 </a:solidFill>
                 <a:latin typeface="Lato" panose="020F0502020204030203"/>
               </a:rPr>
-              <a:t>Git…. Its in our name, but </a:t>
-            </a:r>
-            <a:r>
-              <a:rPr lang="en-US" sz="2400">
-                <a:solidFill>
-                  <a:srgbClr val="000000"/>
-                </a:solidFill>
-                <a:latin typeface="Lato" panose="020F0502020204030203"/>
-              </a:rPr>
-              <a:t>still challenging!</a:t>
+              <a:t>Git…. Its in our name, but still challenging!</a:t>
             </a:r>
             <a:endParaRPr lang="en-US" sz="2400" dirty="0">
               <a:solidFill>
@@ -12761,6 +13450,41 @@
 <file path=ppt/slides/slide17.xml><?xml version="1.0" encoding="utf-8"?>
 <p:sld xmlns:a="http://schemas.openxmlformats.org/drawingml/2006/main" xmlns:r="http://schemas.openxmlformats.org/officeDocument/2006/relationships" xmlns:p="http://schemas.openxmlformats.org/presentationml/2006/main">
   <p:cSld>
+    <p:bg>
+      <p:bgPr>
+        <a:gradFill rotWithShape="1">
+          <a:gsLst>
+            <a:gs pos="0">
+              <a:schemeClr val="bg2">
+                <a:tint val="96000"/>
+                <a:shade val="100000"/>
+                <a:hueMod val="270000"/>
+                <a:satMod val="200000"/>
+                <a:lumMod val="128000"/>
+              </a:schemeClr>
+            </a:gs>
+            <a:gs pos="50000">
+              <a:schemeClr val="bg2">
+                <a:shade val="100000"/>
+                <a:hueMod val="100000"/>
+                <a:satMod val="110000"/>
+                <a:lumMod val="130000"/>
+              </a:schemeClr>
+            </a:gs>
+            <a:gs pos="100000">
+              <a:schemeClr val="bg2">
+                <a:shade val="78000"/>
+                <a:hueMod val="44000"/>
+                <a:satMod val="200000"/>
+                <a:lumMod val="69000"/>
+              </a:schemeClr>
+            </a:gs>
+          </a:gsLst>
+          <a:lin ang="2520000" scaled="0"/>
+        </a:gradFill>
+        <a:effectLst/>
+      </p:bgPr>
+    </p:bg>
     <p:spTree>
       <p:nvGrpSpPr>
         <p:cNvPr id="1" name=""/>
@@ -12775,6 +13499,524 @@
           <a:chExt cx="0" cy="0"/>
         </a:xfrm>
       </p:grpSpPr>
+      <p:pic>
+        <p:nvPicPr>
+          <p:cNvPr id="34" name="Picture 33">
+            <a:extLst>
+              <a:ext uri="{FF2B5EF4-FFF2-40B4-BE49-F238E27FC236}">
+                <a16:creationId xmlns:a16="http://schemas.microsoft.com/office/drawing/2014/main" id="{5321D838-2C7E-4177-9DD3-DAC78324A2B2}"/>
+              </a:ext>
+              <a:ext uri="{C183D7F6-B498-43B3-948B-1728B52AA6E4}">
+                <adec:decorative xmlns:adec="http://schemas.microsoft.com/office/drawing/2017/decorative" val="1"/>
+              </a:ext>
+            </a:extLst>
+          </p:cNvPr>
+          <p:cNvPicPr>
+            <a:picLocks noGrp="1" noRot="1" noChangeAspect="1" noMove="1" noResize="1" noEditPoints="1" noAdjustHandles="1" noChangeArrowheads="1" noChangeShapeType="1" noCrop="1"/>
+          </p:cNvPicPr>
+          <p:nvPr>
+            <p:extLst>
+              <p:ext uri="{386F3935-93C4-4BCD-93E2-E3B085C9AB24}">
+                <p16:designElem xmlns:p16="http://schemas.microsoft.com/office/powerpoint/2015/main" val="1"/>
+              </p:ext>
+            </p:extLst>
+          </p:nvPr>
+        </p:nvPicPr>
+        <p:blipFill>
+          <a:blip r:embed="rId3">
+            <a:alphaModFix amt="10000"/>
+            <a:extLst>
+              <a:ext uri="{28A0092B-C50C-407E-A947-70E740481C1C}">
+                <a14:useLocalDpi xmlns:a14="http://schemas.microsoft.com/office/drawing/2010/main" val="0"/>
+              </a:ext>
+            </a:extLst>
+          </a:blip>
+          <a:stretch>
+            <a:fillRect/>
+          </a:stretch>
+        </p:blipFill>
+        <p:spPr>
+          <a:xfrm>
+            <a:off x="0" y="0"/>
+            <a:ext cx="12192000" cy="6858000"/>
+          </a:xfrm>
+          <a:prstGeom prst="rect">
+            <a:avLst/>
+          </a:prstGeom>
+        </p:spPr>
+      </p:pic>
+      <p:pic>
+        <p:nvPicPr>
+          <p:cNvPr id="36" name="Picture 35">
+            <a:extLst>
+              <a:ext uri="{FF2B5EF4-FFF2-40B4-BE49-F238E27FC236}">
+                <a16:creationId xmlns:a16="http://schemas.microsoft.com/office/drawing/2014/main" id="{0146E45C-1450-4186-B501-74F221F897A8}"/>
+              </a:ext>
+              <a:ext uri="{C183D7F6-B498-43B3-948B-1728B52AA6E4}">
+                <adec:decorative xmlns:adec="http://schemas.microsoft.com/office/drawing/2017/decorative" val="1"/>
+              </a:ext>
+            </a:extLst>
+          </p:cNvPr>
+          <p:cNvPicPr>
+            <a:picLocks noGrp="1" noRot="1" noChangeAspect="1" noMove="1" noResize="1" noEditPoints="1" noAdjustHandles="1" noChangeArrowheads="1" noChangeShapeType="1" noCrop="1"/>
+          </p:cNvPicPr>
+          <p:nvPr>
+            <p:extLst>
+              <p:ext uri="{386F3935-93C4-4BCD-93E2-E3B085C9AB24}">
+                <p16:designElem xmlns:p16="http://schemas.microsoft.com/office/powerpoint/2015/main" val="1"/>
+              </p:ext>
+            </p:extLst>
+          </p:nvPr>
+        </p:nvPicPr>
+        <p:blipFill>
+          <a:blip r:embed="rId4">
+            <a:extLst>
+              <a:ext uri="{28A0092B-C50C-407E-A947-70E740481C1C}">
+                <a14:useLocalDpi xmlns:a14="http://schemas.microsoft.com/office/drawing/2010/main" val="0"/>
+              </a:ext>
+            </a:extLst>
+          </a:blip>
+          <a:stretch>
+            <a:fillRect/>
+          </a:stretch>
+        </p:blipFill>
+        <p:spPr>
+          <a:xfrm>
+            <a:off x="1" y="4242851"/>
+            <a:ext cx="8968084" cy="275942"/>
+          </a:xfrm>
+          <a:prstGeom prst="rect">
+            <a:avLst/>
+          </a:prstGeom>
+        </p:spPr>
+      </p:pic>
+      <p:pic>
+        <p:nvPicPr>
+          <p:cNvPr id="38" name="Picture 37">
+            <a:extLst>
+              <a:ext uri="{FF2B5EF4-FFF2-40B4-BE49-F238E27FC236}">
+                <a16:creationId xmlns:a16="http://schemas.microsoft.com/office/drawing/2014/main" id="{EEDDA48B-BC04-4915-ADA3-A1A9522EB0D1}"/>
+              </a:ext>
+              <a:ext uri="{C183D7F6-B498-43B3-948B-1728B52AA6E4}">
+                <adec:decorative xmlns:adec="http://schemas.microsoft.com/office/drawing/2017/decorative" val="1"/>
+              </a:ext>
+            </a:extLst>
+          </p:cNvPr>
+          <p:cNvPicPr>
+            <a:picLocks noGrp="1" noRot="1" noChangeAspect="1" noMove="1" noResize="1" noEditPoints="1" noAdjustHandles="1" noChangeArrowheads="1" noChangeShapeType="1" noCrop="1"/>
+          </p:cNvPicPr>
+          <p:nvPr>
+            <p:extLst>
+              <p:ext uri="{386F3935-93C4-4BCD-93E2-E3B085C9AB24}">
+                <p16:designElem xmlns:p16="http://schemas.microsoft.com/office/powerpoint/2015/main" val="1"/>
+              </p:ext>
+            </p:extLst>
+          </p:nvPr>
+        </p:nvPicPr>
+        <p:blipFill>
+          <a:blip r:embed="rId5">
+            <a:extLst>
+              <a:ext uri="{28A0092B-C50C-407E-A947-70E740481C1C}">
+                <a14:useLocalDpi xmlns:a14="http://schemas.microsoft.com/office/drawing/2010/main" val="0"/>
+              </a:ext>
+            </a:extLst>
+          </a:blip>
+          <a:stretch>
+            <a:fillRect/>
+          </a:stretch>
+        </p:blipFill>
+        <p:spPr>
+          <a:xfrm>
+            <a:off x="9111716" y="4243845"/>
+            <a:ext cx="3077108" cy="276940"/>
+          </a:xfrm>
+          <a:prstGeom prst="rect">
+            <a:avLst/>
+          </a:prstGeom>
+        </p:spPr>
+      </p:pic>
+      <p:sp>
+        <p:nvSpPr>
+          <p:cNvPr id="40" name="Rectangle 39">
+            <a:extLst>
+              <a:ext uri="{FF2B5EF4-FFF2-40B4-BE49-F238E27FC236}">
+                <a16:creationId xmlns:a16="http://schemas.microsoft.com/office/drawing/2014/main" id="{78C9D07A-5A22-4E55-B18A-47CF07E5080D}"/>
+              </a:ext>
+              <a:ext uri="{C183D7F6-B498-43B3-948B-1728B52AA6E4}">
+                <adec:decorative xmlns:adec="http://schemas.microsoft.com/office/drawing/2017/decorative" val="1"/>
+              </a:ext>
+            </a:extLst>
+          </p:cNvPr>
+          <p:cNvSpPr>
+            <a:spLocks noGrp="1" noRot="1" noChangeAspect="1" noMove="1" noResize="1" noEditPoints="1" noAdjustHandles="1" noChangeArrowheads="1" noChangeShapeType="1" noTextEdit="1"/>
+          </p:cNvSpPr>
+          <p:nvPr>
+            <p:extLst>
+              <p:ext uri="{386F3935-93C4-4BCD-93E2-E3B085C9AB24}">
+                <p16:designElem xmlns:p16="http://schemas.microsoft.com/office/powerpoint/2015/main" val="1"/>
+              </p:ext>
+            </p:extLst>
+          </p:nvPr>
+        </p:nvSpPr>
+        <p:spPr>
+          <a:xfrm>
+            <a:off x="0" y="2590078"/>
+            <a:ext cx="8968085" cy="1660332"/>
+          </a:xfrm>
+          <a:prstGeom prst="rect">
+            <a:avLst/>
+          </a:prstGeom>
+          <a:solidFill>
+            <a:schemeClr val="bg1">
+              <a:lumMod val="85000"/>
+              <a:lumOff val="15000"/>
+            </a:schemeClr>
+          </a:solidFill>
+          <a:ln>
+            <a:noFill/>
+          </a:ln>
+        </p:spPr>
+        <p:style>
+          <a:lnRef idx="2">
+            <a:schemeClr val="accent1">
+              <a:shade val="50000"/>
+            </a:schemeClr>
+          </a:lnRef>
+          <a:fillRef idx="1">
+            <a:schemeClr val="accent1"/>
+          </a:fillRef>
+          <a:effectRef idx="0">
+            <a:schemeClr val="accent1"/>
+          </a:effectRef>
+          <a:fontRef idx="minor">
+            <a:schemeClr val="lt1"/>
+          </a:fontRef>
+        </p:style>
+      </p:sp>
+      <p:sp>
+        <p:nvSpPr>
+          <p:cNvPr id="42" name="Rectangle 41">
+            <a:extLst>
+              <a:ext uri="{FF2B5EF4-FFF2-40B4-BE49-F238E27FC236}">
+                <a16:creationId xmlns:a16="http://schemas.microsoft.com/office/drawing/2014/main" id="{3D71E629-0739-4A59-972B-A9E9A4500E31}"/>
+              </a:ext>
+              <a:ext uri="{C183D7F6-B498-43B3-948B-1728B52AA6E4}">
+                <adec:decorative xmlns:adec="http://schemas.microsoft.com/office/drawing/2017/decorative" val="1"/>
+              </a:ext>
+            </a:extLst>
+          </p:cNvPr>
+          <p:cNvSpPr>
+            <a:spLocks noGrp="1" noRot="1" noChangeAspect="1" noMove="1" noResize="1" noEditPoints="1" noAdjustHandles="1" noChangeArrowheads="1" noChangeShapeType="1" noTextEdit="1"/>
+          </p:cNvSpPr>
+          <p:nvPr>
+            <p:extLst>
+              <p:ext uri="{386F3935-93C4-4BCD-93E2-E3B085C9AB24}">
+                <p16:designElem xmlns:p16="http://schemas.microsoft.com/office/powerpoint/2015/main" val="1"/>
+              </p:ext>
+            </p:extLst>
+          </p:nvPr>
+        </p:nvSpPr>
+        <p:spPr>
+          <a:xfrm>
+            <a:off x="9111715" y="2590078"/>
+            <a:ext cx="3077109" cy="1660332"/>
+          </a:xfrm>
+          <a:prstGeom prst="rect">
+            <a:avLst/>
+          </a:prstGeom>
+          <a:solidFill>
+            <a:schemeClr val="accent1"/>
+          </a:solidFill>
+          <a:ln>
+            <a:noFill/>
+          </a:ln>
+        </p:spPr>
+        <p:style>
+          <a:lnRef idx="2">
+            <a:schemeClr val="accent1">
+              <a:shade val="50000"/>
+            </a:schemeClr>
+          </a:lnRef>
+          <a:fillRef idx="1">
+            <a:schemeClr val="accent1"/>
+          </a:fillRef>
+          <a:effectRef idx="0">
+            <a:schemeClr val="accent1"/>
+          </a:effectRef>
+          <a:fontRef idx="minor">
+            <a:schemeClr val="lt1"/>
+          </a:fontRef>
+        </p:style>
+      </p:sp>
+      <p:sp useBgFill="1">
+        <p:nvSpPr>
+          <p:cNvPr id="44" name="Rectangle 43">
+            <a:extLst>
+              <a:ext uri="{FF2B5EF4-FFF2-40B4-BE49-F238E27FC236}">
+                <a16:creationId xmlns:a16="http://schemas.microsoft.com/office/drawing/2014/main" id="{DFE6DBF9-94F5-4877-B532-D859966E9798}"/>
+              </a:ext>
+              <a:ext uri="{C183D7F6-B498-43B3-948B-1728B52AA6E4}">
+                <adec:decorative xmlns:adec="http://schemas.microsoft.com/office/drawing/2017/decorative" val="1"/>
+              </a:ext>
+            </a:extLst>
+          </p:cNvPr>
+          <p:cNvSpPr>
+            <a:spLocks noGrp="1" noRot="1" noChangeAspect="1" noMove="1" noResize="1" noEditPoints="1" noAdjustHandles="1" noChangeArrowheads="1" noChangeShapeType="1" noTextEdit="1"/>
+          </p:cNvSpPr>
+          <p:nvPr>
+            <p:extLst>
+              <p:ext uri="{386F3935-93C4-4BCD-93E2-E3B085C9AB24}">
+                <p16:designElem xmlns:p16="http://schemas.microsoft.com/office/powerpoint/2015/main" val="1"/>
+              </p:ext>
+            </p:extLst>
+          </p:nvPr>
+        </p:nvSpPr>
+        <p:spPr>
+          <a:xfrm>
+            <a:off x="0" y="0"/>
+            <a:ext cx="12188824" cy="6858000"/>
+          </a:xfrm>
+          <a:prstGeom prst="rect">
+            <a:avLst/>
+          </a:prstGeom>
+          <a:ln>
+            <a:noFill/>
+          </a:ln>
+        </p:spPr>
+        <p:style>
+          <a:lnRef idx="2">
+            <a:schemeClr val="accent1">
+              <a:shade val="50000"/>
+            </a:schemeClr>
+          </a:lnRef>
+          <a:fillRef idx="1">
+            <a:schemeClr val="accent1"/>
+          </a:fillRef>
+          <a:effectRef idx="0">
+            <a:schemeClr val="accent1"/>
+          </a:effectRef>
+          <a:fontRef idx="minor">
+            <a:schemeClr val="lt1"/>
+          </a:fontRef>
+        </p:style>
+        <p:txBody>
+          <a:bodyPr rtlCol="0" anchor="ctr"/>
+          <a:lstStyle/>
+          <a:p>
+            <a:pPr algn="ctr"/>
+            <a:endParaRPr lang="en-US"/>
+          </a:p>
+        </p:txBody>
+      </p:sp>
+      <p:pic>
+        <p:nvPicPr>
+          <p:cNvPr id="46" name="Picture 45">
+            <a:extLst>
+              <a:ext uri="{FF2B5EF4-FFF2-40B4-BE49-F238E27FC236}">
+                <a16:creationId xmlns:a16="http://schemas.microsoft.com/office/drawing/2014/main" id="{65EBA155-CB71-48F7-8A85-0B293C773950}"/>
+              </a:ext>
+              <a:ext uri="{C183D7F6-B498-43B3-948B-1728B52AA6E4}">
+                <adec:decorative xmlns:adec="http://schemas.microsoft.com/office/drawing/2017/decorative" val="1"/>
+              </a:ext>
+            </a:extLst>
+          </p:cNvPr>
+          <p:cNvPicPr>
+            <a:picLocks noGrp="1" noRot="1" noChangeAspect="1" noMove="1" noResize="1" noEditPoints="1" noAdjustHandles="1" noChangeArrowheads="1" noChangeShapeType="1" noCrop="1"/>
+          </p:cNvPicPr>
+          <p:nvPr>
+            <p:extLst>
+              <p:ext uri="{386F3935-93C4-4BCD-93E2-E3B085C9AB24}">
+                <p16:designElem xmlns:p16="http://schemas.microsoft.com/office/powerpoint/2015/main" val="1"/>
+              </p:ext>
+            </p:extLst>
+          </p:nvPr>
+        </p:nvPicPr>
+        <p:blipFill>
+          <a:blip r:embed="rId3">
+            <a:alphaModFix amt="10000"/>
+            <a:extLst>
+              <a:ext uri="{28A0092B-C50C-407E-A947-70E740481C1C}">
+                <a14:useLocalDpi xmlns:a14="http://schemas.microsoft.com/office/drawing/2010/main" val="0"/>
+              </a:ext>
+            </a:extLst>
+          </a:blip>
+          <a:stretch>
+            <a:fillRect/>
+          </a:stretch>
+        </p:blipFill>
+        <p:spPr>
+          <a:xfrm>
+            <a:off x="-3176" y="0"/>
+            <a:ext cx="12192000" cy="6858000"/>
+          </a:xfrm>
+          <a:prstGeom prst="rect">
+            <a:avLst/>
+          </a:prstGeom>
+        </p:spPr>
+      </p:pic>
+      <p:sp>
+        <p:nvSpPr>
+          <p:cNvPr id="48" name="Rectangle 47">
+            <a:extLst>
+              <a:ext uri="{FF2B5EF4-FFF2-40B4-BE49-F238E27FC236}">
+                <a16:creationId xmlns:a16="http://schemas.microsoft.com/office/drawing/2014/main" id="{7A9A3980-304B-4116-B0FB-155B054B0DC8}"/>
+              </a:ext>
+              <a:ext uri="{C183D7F6-B498-43B3-948B-1728B52AA6E4}">
+                <adec:decorative xmlns:adec="http://schemas.microsoft.com/office/drawing/2017/decorative" val="1"/>
+              </a:ext>
+            </a:extLst>
+          </p:cNvPr>
+          <p:cNvSpPr>
+            <a:spLocks noGrp="1" noRot="1" noChangeAspect="1" noMove="1" noResize="1" noEditPoints="1" noAdjustHandles="1" noChangeArrowheads="1" noChangeShapeType="1" noTextEdit="1"/>
+          </p:cNvSpPr>
+          <p:nvPr>
+            <p:extLst>
+              <p:ext uri="{386F3935-93C4-4BCD-93E2-E3B085C9AB24}">
+                <p16:designElem xmlns:p16="http://schemas.microsoft.com/office/powerpoint/2015/main" val="1"/>
+              </p:ext>
+            </p:extLst>
+          </p:nvPr>
+        </p:nvSpPr>
+        <p:spPr>
+          <a:xfrm>
+            <a:off x="7555992" y="0"/>
+            <a:ext cx="4636008" cy="6858001"/>
+          </a:xfrm>
+          <a:prstGeom prst="rect">
+            <a:avLst/>
+          </a:prstGeom>
+          <a:ln>
+            <a:noFill/>
+          </a:ln>
+        </p:spPr>
+        <p:style>
+          <a:lnRef idx="2">
+            <a:schemeClr val="accent1">
+              <a:shade val="50000"/>
+            </a:schemeClr>
+          </a:lnRef>
+          <a:fillRef idx="1">
+            <a:schemeClr val="accent1"/>
+          </a:fillRef>
+          <a:effectRef idx="0">
+            <a:schemeClr val="accent1"/>
+          </a:effectRef>
+          <a:fontRef idx="minor">
+            <a:schemeClr val="lt1"/>
+          </a:fontRef>
+        </p:style>
+        <p:txBody>
+          <a:bodyPr rtlCol="0" anchor="ctr"/>
+          <a:lstStyle/>
+          <a:p>
+            <a:pPr algn="ctr"/>
+            <a:endParaRPr lang="en-US"/>
+          </a:p>
+        </p:txBody>
+      </p:sp>
+      <p:pic>
+        <p:nvPicPr>
+          <p:cNvPr id="50" name="Picture 49">
+            <a:extLst>
+              <a:ext uri="{FF2B5EF4-FFF2-40B4-BE49-F238E27FC236}">
+                <a16:creationId xmlns:a16="http://schemas.microsoft.com/office/drawing/2014/main" id="{924FA7CC-8015-40C6-9D92-644E30DCCA6F}"/>
+              </a:ext>
+              <a:ext uri="{C183D7F6-B498-43B3-948B-1728B52AA6E4}">
+                <adec:decorative xmlns:adec="http://schemas.microsoft.com/office/drawing/2017/decorative" val="1"/>
+              </a:ext>
+            </a:extLst>
+          </p:cNvPr>
+          <p:cNvPicPr>
+            <a:picLocks noGrp="1" noRot="1" noChangeAspect="1" noMove="1" noResize="1" noEditPoints="1" noAdjustHandles="1" noChangeArrowheads="1" noChangeShapeType="1" noCrop="1"/>
+          </p:cNvPicPr>
+          <p:nvPr>
+            <p:extLst>
+              <p:ext uri="{386F3935-93C4-4BCD-93E2-E3B085C9AB24}">
+                <p16:designElem xmlns:p16="http://schemas.microsoft.com/office/powerpoint/2015/main" val="1"/>
+              </p:ext>
+            </p:extLst>
+          </p:nvPr>
+        </p:nvPicPr>
+        <p:blipFill>
+          <a:blip r:embed="rId4">
+            <a:extLst>
+              <a:ext uri="{28A0092B-C50C-407E-A947-70E740481C1C}">
+                <a14:useLocalDpi xmlns:a14="http://schemas.microsoft.com/office/drawing/2010/main" val="0"/>
+              </a:ext>
+            </a:extLst>
+          </a:blip>
+          <a:stretch>
+            <a:fillRect/>
+          </a:stretch>
+        </p:blipFill>
+        <p:spPr>
+          <a:xfrm>
+            <a:off x="1" y="4242852"/>
+            <a:ext cx="7767872" cy="225365"/>
+          </a:xfrm>
+          <a:prstGeom prst="rect">
+            <a:avLst/>
+          </a:prstGeom>
+        </p:spPr>
+      </p:pic>
+      <p:sp>
+        <p:nvSpPr>
+          <p:cNvPr id="52" name="Rectangle 51">
+            <a:extLst>
+              <a:ext uri="{FF2B5EF4-FFF2-40B4-BE49-F238E27FC236}">
+                <a16:creationId xmlns:a16="http://schemas.microsoft.com/office/drawing/2014/main" id="{D146040E-7E20-4B05-9660-47E254E1A4A8}"/>
+              </a:ext>
+              <a:ext uri="{C183D7F6-B498-43B3-948B-1728B52AA6E4}">
+                <adec:decorative xmlns:adec="http://schemas.microsoft.com/office/drawing/2017/decorative" val="1"/>
+              </a:ext>
+            </a:extLst>
+          </p:cNvPr>
+          <p:cNvSpPr>
+            <a:spLocks noGrp="1" noRot="1" noChangeAspect="1" noMove="1" noResize="1" noEditPoints="1" noAdjustHandles="1" noChangeArrowheads="1" noChangeShapeType="1" noTextEdit="1"/>
+          </p:cNvSpPr>
+          <p:nvPr>
+            <p:extLst>
+              <p:ext uri="{386F3935-93C4-4BCD-93E2-E3B085C9AB24}">
+                <p16:designElem xmlns:p16="http://schemas.microsoft.com/office/powerpoint/2015/main" val="1"/>
+              </p:ext>
+            </p:extLst>
+          </p:nvPr>
+        </p:nvSpPr>
+        <p:spPr>
+          <a:xfrm>
+            <a:off x="-1" y="2590078"/>
+            <a:ext cx="7868173" cy="1660332"/>
+          </a:xfrm>
+          <a:prstGeom prst="rect">
+            <a:avLst/>
+          </a:prstGeom>
+          <a:solidFill>
+            <a:schemeClr val="bg1">
+              <a:lumMod val="85000"/>
+              <a:lumOff val="15000"/>
+            </a:schemeClr>
+          </a:solidFill>
+          <a:ln>
+            <a:noFill/>
+          </a:ln>
+        </p:spPr>
+        <p:style>
+          <a:lnRef idx="2">
+            <a:schemeClr val="accent1">
+              <a:shade val="50000"/>
+            </a:schemeClr>
+          </a:lnRef>
+          <a:fillRef idx="1">
+            <a:schemeClr val="accent1"/>
+          </a:fillRef>
+          <a:effectRef idx="0">
+            <a:schemeClr val="accent1"/>
+          </a:effectRef>
+          <a:fontRef idx="minor">
+            <a:schemeClr val="lt1"/>
+          </a:fontRef>
+        </p:style>
+      </p:sp>
       <p:sp>
         <p:nvSpPr>
           <p:cNvPr id="2" name="Title 1">
@@ -12793,29 +14035,73 @@
         </p:nvSpPr>
         <p:spPr>
           <a:xfrm>
-            <a:off x="838200" y="365125"/>
-            <a:ext cx="10515600" cy="5647748"/>
+            <a:off x="680322" y="2733709"/>
+            <a:ext cx="6752110" cy="1373070"/>
           </a:xfrm>
         </p:spPr>
         <p:txBody>
-          <a:bodyPr>
+          <a:bodyPr vert="horz" lIns="91440" tIns="45720" rIns="91440" bIns="45720" rtlCol="0" anchor="ctr">
             <a:normAutofit/>
           </a:bodyPr>
           <a:lstStyle/>
           <a:p>
-            <a:pPr algn="ctr"/>
-            <a:r>
-              <a:rPr lang="en-US" sz="11500" dirty="0">
-                <a:solidFill>
-                  <a:schemeClr val="bg1"/>
-                </a:solidFill>
-                <a:latin typeface="Lato" panose="020F0502020204030203"/>
-              </a:rPr>
+            <a:pPr algn="r"/>
+            <a:r>
+              <a:rPr lang="en-US" sz="5400"/>
               <a:t>Questions?</a:t>
             </a:r>
           </a:p>
         </p:txBody>
       </p:sp>
+      <p:pic>
+        <p:nvPicPr>
+          <p:cNvPr id="8" name="Graphic 7" descr="Questions">
+            <a:extLst>
+              <a:ext uri="{FF2B5EF4-FFF2-40B4-BE49-F238E27FC236}">
+                <a16:creationId xmlns:a16="http://schemas.microsoft.com/office/drawing/2014/main" id="{0034DB39-B637-48EA-B885-FBF2058A10DE}"/>
+              </a:ext>
+            </a:extLst>
+          </p:cNvPr>
+          <p:cNvPicPr>
+            <a:picLocks noChangeAspect="1"/>
+          </p:cNvPicPr>
+          <p:nvPr/>
+        </p:nvPicPr>
+        <p:blipFill>
+          <a:blip r:embed="rId6">
+            <a:extLst>
+              <a:ext uri="{28A0092B-C50C-407E-A947-70E740481C1C}">
+                <a14:useLocalDpi xmlns:a14="http://schemas.microsoft.com/office/drawing/2010/main" val="0"/>
+              </a:ext>
+              <a:ext uri="{96DAC541-7B7A-43D3-8B79-37D633B846F1}">
+                <asvg:svgBlip xmlns:asvg="http://schemas.microsoft.com/office/drawing/2016/SVG/main" r:embed="rId7"/>
+              </a:ext>
+            </a:extLst>
+          </a:blip>
+          <a:stretch>
+            <a:fillRect/>
+          </a:stretch>
+        </p:blipFill>
+        <p:spPr>
+          <a:xfrm>
+            <a:off x="8187091" y="1749761"/>
+            <a:ext cx="3358478" cy="3358478"/>
+          </a:xfrm>
+          <a:prstGeom prst="rect">
+            <a:avLst/>
+          </a:prstGeom>
+          <a:ln>
+            <a:noFill/>
+          </a:ln>
+          <a:effectLst>
+            <a:outerShdw blurRad="76200" dist="63500" dir="5040000" algn="tl" rotWithShape="0">
+              <a:srgbClr val="000000">
+                <a:alpha val="41000"/>
+              </a:srgbClr>
+            </a:outerShdw>
+          </a:effectLst>
+        </p:spPr>
+      </p:pic>
       <p:pic>
         <p:nvPicPr>
           <p:cNvPr id="3" name="Picture 2">
@@ -12831,7 +14117,7 @@
           <p:nvPr/>
         </p:nvPicPr>
         <p:blipFill>
-          <a:blip r:embed="rId2">
+          <a:blip r:embed="rId8">
             <a:duotone>
               <a:schemeClr val="accent1">
                 <a:shade val="45000"/>
@@ -12975,14 +14261,23 @@
             </a:lvl9pPr>
           </a:lstStyle>
           <a:p>
+            <a:pPr>
+              <a:spcAft>
+                <a:spcPts val="600"/>
+              </a:spcAft>
+            </a:pPr>
             <a:fld id="{6D22F896-40B5-4ADD-8801-0D06FADFA095}" type="slidenum">
               <a:rPr lang="en-US" sz="1000" smtClean="0">
                 <a:latin typeface="Lato" panose="020F0502020204030203"/>
               </a:rPr>
-              <a:pPr/>
+              <a:pPr>
+                <a:spcAft>
+                  <a:spcPts val="600"/>
+                </a:spcAft>
+              </a:pPr>
               <a:t>17</a:t>
             </a:fld>
-            <a:endParaRPr lang="en-US" sz="1000" dirty="0">
+            <a:endParaRPr lang="en-US" sz="1000">
               <a:latin typeface="Lato" panose="020F0502020204030203"/>
             </a:endParaRPr>
           </a:p>
@@ -13004,6 +14299,41 @@
 <file path=ppt/slides/slide18.xml><?xml version="1.0" encoding="utf-8"?>
 <p:sld xmlns:a="http://schemas.openxmlformats.org/drawingml/2006/main" xmlns:r="http://schemas.openxmlformats.org/officeDocument/2006/relationships" xmlns:p="http://schemas.openxmlformats.org/presentationml/2006/main">
   <p:cSld>
+    <p:bg>
+      <p:bgPr>
+        <a:gradFill rotWithShape="1">
+          <a:gsLst>
+            <a:gs pos="0">
+              <a:schemeClr val="bg2">
+                <a:tint val="96000"/>
+                <a:shade val="100000"/>
+                <a:hueMod val="270000"/>
+                <a:satMod val="200000"/>
+                <a:lumMod val="128000"/>
+              </a:schemeClr>
+            </a:gs>
+            <a:gs pos="50000">
+              <a:schemeClr val="bg2">
+                <a:shade val="100000"/>
+                <a:hueMod val="100000"/>
+                <a:satMod val="110000"/>
+                <a:lumMod val="130000"/>
+              </a:schemeClr>
+            </a:gs>
+            <a:gs pos="100000">
+              <a:schemeClr val="bg2">
+                <a:shade val="78000"/>
+                <a:hueMod val="44000"/>
+                <a:satMod val="200000"/>
+                <a:lumMod val="69000"/>
+              </a:schemeClr>
+            </a:gs>
+          </a:gsLst>
+          <a:lin ang="2520000" scaled="0"/>
+        </a:gradFill>
+        <a:effectLst/>
+      </p:bgPr>
+    </p:bg>
     <p:spTree>
       <p:nvGrpSpPr>
         <p:cNvPr id="1" name=""/>
@@ -13018,6 +14348,516 @@
           <a:chExt cx="0" cy="0"/>
         </a:xfrm>
       </p:grpSpPr>
+      <p:pic>
+        <p:nvPicPr>
+          <p:cNvPr id="8" name="Picture 7">
+            <a:extLst>
+              <a:ext uri="{FF2B5EF4-FFF2-40B4-BE49-F238E27FC236}">
+                <a16:creationId xmlns:a16="http://schemas.microsoft.com/office/drawing/2014/main" id="{AC3E6C53-102E-4ACA-BCBB-3CC973B99486}"/>
+              </a:ext>
+              <a:ext uri="{C183D7F6-B498-43B3-948B-1728B52AA6E4}">
+                <adec:decorative xmlns:adec="http://schemas.microsoft.com/office/drawing/2017/decorative" val="1"/>
+              </a:ext>
+            </a:extLst>
+          </p:cNvPr>
+          <p:cNvPicPr>
+            <a:picLocks noGrp="1" noRot="1" noChangeAspect="1" noMove="1" noResize="1" noEditPoints="1" noAdjustHandles="1" noChangeArrowheads="1" noChangeShapeType="1" noCrop="1"/>
+          </p:cNvPicPr>
+          <p:nvPr>
+            <p:extLst>
+              <p:ext uri="{386F3935-93C4-4BCD-93E2-E3B085C9AB24}">
+                <p16:designElem xmlns:p16="http://schemas.microsoft.com/office/powerpoint/2015/main" val="1"/>
+              </p:ext>
+            </p:extLst>
+          </p:nvPr>
+        </p:nvPicPr>
+        <p:blipFill>
+          <a:blip r:embed="rId3">
+            <a:alphaModFix amt="10000"/>
+            <a:extLst>
+              <a:ext uri="{28A0092B-C50C-407E-A947-70E740481C1C}">
+                <a14:useLocalDpi xmlns:a14="http://schemas.microsoft.com/office/drawing/2010/main" val="0"/>
+              </a:ext>
+            </a:extLst>
+          </a:blip>
+          <a:stretch>
+            <a:fillRect/>
+          </a:stretch>
+        </p:blipFill>
+        <p:spPr>
+          <a:xfrm>
+            <a:off x="0" y="0"/>
+            <a:ext cx="12192000" cy="6858000"/>
+          </a:xfrm>
+          <a:prstGeom prst="rect">
+            <a:avLst/>
+          </a:prstGeom>
+        </p:spPr>
+      </p:pic>
+      <p:pic>
+        <p:nvPicPr>
+          <p:cNvPr id="10" name="Picture 9">
+            <a:extLst>
+              <a:ext uri="{FF2B5EF4-FFF2-40B4-BE49-F238E27FC236}">
+                <a16:creationId xmlns:a16="http://schemas.microsoft.com/office/drawing/2014/main" id="{17B2B42C-0777-4D6E-9432-535281803A88}"/>
+              </a:ext>
+              <a:ext uri="{C183D7F6-B498-43B3-948B-1728B52AA6E4}">
+                <adec:decorative xmlns:adec="http://schemas.microsoft.com/office/drawing/2017/decorative" val="1"/>
+              </a:ext>
+            </a:extLst>
+          </p:cNvPr>
+          <p:cNvPicPr>
+            <a:picLocks noGrp="1" noRot="1" noChangeAspect="1" noMove="1" noResize="1" noEditPoints="1" noAdjustHandles="1" noChangeArrowheads="1" noChangeShapeType="1" noCrop="1"/>
+          </p:cNvPicPr>
+          <p:nvPr>
+            <p:extLst>
+              <p:ext uri="{386F3935-93C4-4BCD-93E2-E3B085C9AB24}">
+                <p16:designElem xmlns:p16="http://schemas.microsoft.com/office/powerpoint/2015/main" val="1"/>
+              </p:ext>
+            </p:extLst>
+          </p:nvPr>
+        </p:nvPicPr>
+        <p:blipFill>
+          <a:blip r:embed="rId4">
+            <a:extLst>
+              <a:ext uri="{28A0092B-C50C-407E-A947-70E740481C1C}">
+                <a14:useLocalDpi xmlns:a14="http://schemas.microsoft.com/office/drawing/2010/main" val="0"/>
+              </a:ext>
+            </a:extLst>
+          </a:blip>
+          <a:stretch>
+            <a:fillRect/>
+          </a:stretch>
+        </p:blipFill>
+        <p:spPr>
+          <a:xfrm>
+            <a:off x="1" y="4242851"/>
+            <a:ext cx="8968084" cy="275942"/>
+          </a:xfrm>
+          <a:prstGeom prst="rect">
+            <a:avLst/>
+          </a:prstGeom>
+        </p:spPr>
+      </p:pic>
+      <p:pic>
+        <p:nvPicPr>
+          <p:cNvPr id="12" name="Picture 11">
+            <a:extLst>
+              <a:ext uri="{FF2B5EF4-FFF2-40B4-BE49-F238E27FC236}">
+                <a16:creationId xmlns:a16="http://schemas.microsoft.com/office/drawing/2014/main" id="{EFEAAB60-93E2-4DC6-99AC-939637BCE864}"/>
+              </a:ext>
+              <a:ext uri="{C183D7F6-B498-43B3-948B-1728B52AA6E4}">
+                <adec:decorative xmlns:adec="http://schemas.microsoft.com/office/drawing/2017/decorative" val="1"/>
+              </a:ext>
+            </a:extLst>
+          </p:cNvPr>
+          <p:cNvPicPr>
+            <a:picLocks noGrp="1" noRot="1" noChangeAspect="1" noMove="1" noResize="1" noEditPoints="1" noAdjustHandles="1" noChangeArrowheads="1" noChangeShapeType="1" noCrop="1"/>
+          </p:cNvPicPr>
+          <p:nvPr>
+            <p:extLst>
+              <p:ext uri="{386F3935-93C4-4BCD-93E2-E3B085C9AB24}">
+                <p16:designElem xmlns:p16="http://schemas.microsoft.com/office/powerpoint/2015/main" val="1"/>
+              </p:ext>
+            </p:extLst>
+          </p:nvPr>
+        </p:nvPicPr>
+        <p:blipFill>
+          <a:blip r:embed="rId5">
+            <a:extLst>
+              <a:ext uri="{28A0092B-C50C-407E-A947-70E740481C1C}">
+                <a14:useLocalDpi xmlns:a14="http://schemas.microsoft.com/office/drawing/2010/main" val="0"/>
+              </a:ext>
+            </a:extLst>
+          </a:blip>
+          <a:stretch>
+            <a:fillRect/>
+          </a:stretch>
+        </p:blipFill>
+        <p:spPr>
+          <a:xfrm>
+            <a:off x="9111716" y="4243845"/>
+            <a:ext cx="3077108" cy="276940"/>
+          </a:xfrm>
+          <a:prstGeom prst="rect">
+            <a:avLst/>
+          </a:prstGeom>
+        </p:spPr>
+      </p:pic>
+      <p:sp>
+        <p:nvSpPr>
+          <p:cNvPr id="14" name="Rectangle 13">
+            <a:extLst>
+              <a:ext uri="{FF2B5EF4-FFF2-40B4-BE49-F238E27FC236}">
+                <a16:creationId xmlns:a16="http://schemas.microsoft.com/office/drawing/2014/main" id="{7EF5ECB8-D49C-48FB-A93E-88EB2FFDFD42}"/>
+              </a:ext>
+              <a:ext uri="{C183D7F6-B498-43B3-948B-1728B52AA6E4}">
+                <adec:decorative xmlns:adec="http://schemas.microsoft.com/office/drawing/2017/decorative" val="1"/>
+              </a:ext>
+            </a:extLst>
+          </p:cNvPr>
+          <p:cNvSpPr>
+            <a:spLocks noGrp="1" noRot="1" noChangeAspect="1" noMove="1" noResize="1" noEditPoints="1" noAdjustHandles="1" noChangeArrowheads="1" noChangeShapeType="1" noTextEdit="1"/>
+          </p:cNvSpPr>
+          <p:nvPr>
+            <p:extLst>
+              <p:ext uri="{386F3935-93C4-4BCD-93E2-E3B085C9AB24}">
+                <p16:designElem xmlns:p16="http://schemas.microsoft.com/office/powerpoint/2015/main" val="1"/>
+              </p:ext>
+            </p:extLst>
+          </p:nvPr>
+        </p:nvSpPr>
+        <p:spPr bwMode="ltGray">
+          <a:xfrm>
+            <a:off x="0" y="2590078"/>
+            <a:ext cx="8968085" cy="1660332"/>
+          </a:xfrm>
+          <a:prstGeom prst="rect">
+            <a:avLst/>
+          </a:prstGeom>
+          <a:solidFill>
+            <a:schemeClr val="bg1">
+              <a:lumMod val="85000"/>
+              <a:lumOff val="15000"/>
+            </a:schemeClr>
+          </a:solidFill>
+          <a:ln>
+            <a:noFill/>
+          </a:ln>
+        </p:spPr>
+        <p:style>
+          <a:lnRef idx="2">
+            <a:schemeClr val="accent1">
+              <a:shade val="50000"/>
+            </a:schemeClr>
+          </a:lnRef>
+          <a:fillRef idx="1">
+            <a:schemeClr val="accent1"/>
+          </a:fillRef>
+          <a:effectRef idx="0">
+            <a:schemeClr val="accent1"/>
+          </a:effectRef>
+          <a:fontRef idx="minor">
+            <a:schemeClr val="lt1"/>
+          </a:fontRef>
+        </p:style>
+      </p:sp>
+      <p:sp>
+        <p:nvSpPr>
+          <p:cNvPr id="16" name="Rectangle 15">
+            <a:extLst>
+              <a:ext uri="{FF2B5EF4-FFF2-40B4-BE49-F238E27FC236}">
+                <a16:creationId xmlns:a16="http://schemas.microsoft.com/office/drawing/2014/main" id="{411B77A2-BD5C-432D-B52E-C12612C74C17}"/>
+              </a:ext>
+              <a:ext uri="{C183D7F6-B498-43B3-948B-1728B52AA6E4}">
+                <adec:decorative xmlns:adec="http://schemas.microsoft.com/office/drawing/2017/decorative" val="1"/>
+              </a:ext>
+            </a:extLst>
+          </p:cNvPr>
+          <p:cNvSpPr>
+            <a:spLocks noGrp="1" noRot="1" noChangeAspect="1" noMove="1" noResize="1" noEditPoints="1" noAdjustHandles="1" noChangeArrowheads="1" noChangeShapeType="1" noTextEdit="1"/>
+          </p:cNvSpPr>
+          <p:nvPr>
+            <p:extLst>
+              <p:ext uri="{386F3935-93C4-4BCD-93E2-E3B085C9AB24}">
+                <p16:designElem xmlns:p16="http://schemas.microsoft.com/office/powerpoint/2015/main" val="1"/>
+              </p:ext>
+            </p:extLst>
+          </p:nvPr>
+        </p:nvSpPr>
+        <p:spPr>
+          <a:xfrm>
+            <a:off x="9111715" y="2590078"/>
+            <a:ext cx="3077109" cy="1660332"/>
+          </a:xfrm>
+          <a:prstGeom prst="rect">
+            <a:avLst/>
+          </a:prstGeom>
+          <a:solidFill>
+            <a:schemeClr val="accent1"/>
+          </a:solidFill>
+          <a:ln>
+            <a:noFill/>
+          </a:ln>
+        </p:spPr>
+        <p:style>
+          <a:lnRef idx="2">
+            <a:schemeClr val="accent1">
+              <a:shade val="50000"/>
+            </a:schemeClr>
+          </a:lnRef>
+          <a:fillRef idx="1">
+            <a:schemeClr val="accent1"/>
+          </a:fillRef>
+          <a:effectRef idx="0">
+            <a:schemeClr val="accent1"/>
+          </a:effectRef>
+          <a:fontRef idx="minor">
+            <a:schemeClr val="lt1"/>
+          </a:fontRef>
+        </p:style>
+      </p:sp>
+      <p:sp useBgFill="1">
+        <p:nvSpPr>
+          <p:cNvPr id="18" name="Rectangle 17">
+            <a:extLst>
+              <a:ext uri="{FF2B5EF4-FFF2-40B4-BE49-F238E27FC236}">
+                <a16:creationId xmlns:a16="http://schemas.microsoft.com/office/drawing/2014/main" id="{B2E911EF-80F5-4781-A4DF-44EFAF242FB8}"/>
+              </a:ext>
+              <a:ext uri="{C183D7F6-B498-43B3-948B-1728B52AA6E4}">
+                <adec:decorative xmlns:adec="http://schemas.microsoft.com/office/drawing/2017/decorative" val="1"/>
+              </a:ext>
+            </a:extLst>
+          </p:cNvPr>
+          <p:cNvSpPr>
+            <a:spLocks noGrp="1" noRot="1" noChangeAspect="1" noMove="1" noResize="1" noEditPoints="1" noAdjustHandles="1" noChangeArrowheads="1" noChangeShapeType="1" noTextEdit="1"/>
+          </p:cNvSpPr>
+          <p:nvPr>
+            <p:extLst>
+              <p:ext uri="{386F3935-93C4-4BCD-93E2-E3B085C9AB24}">
+                <p16:designElem xmlns:p16="http://schemas.microsoft.com/office/powerpoint/2015/main" val="1"/>
+              </p:ext>
+            </p:extLst>
+          </p:nvPr>
+        </p:nvSpPr>
+        <p:spPr>
+          <a:xfrm>
+            <a:off x="0" y="0"/>
+            <a:ext cx="12192000" cy="6858000"/>
+          </a:xfrm>
+          <a:prstGeom prst="rect">
+            <a:avLst/>
+          </a:prstGeom>
+          <a:ln>
+            <a:noFill/>
+          </a:ln>
+        </p:spPr>
+        <p:style>
+          <a:lnRef idx="2">
+            <a:schemeClr val="accent1">
+              <a:shade val="50000"/>
+            </a:schemeClr>
+          </a:lnRef>
+          <a:fillRef idx="1">
+            <a:schemeClr val="accent1"/>
+          </a:fillRef>
+          <a:effectRef idx="0">
+            <a:schemeClr val="accent1"/>
+          </a:effectRef>
+          <a:fontRef idx="minor">
+            <a:schemeClr val="lt1"/>
+          </a:fontRef>
+        </p:style>
+        <p:txBody>
+          <a:bodyPr rtlCol="0" anchor="ctr"/>
+          <a:lstStyle/>
+          <a:p>
+            <a:pPr algn="ctr"/>
+            <a:endParaRPr lang="en-US"/>
+          </a:p>
+        </p:txBody>
+      </p:sp>
+      <p:pic>
+        <p:nvPicPr>
+          <p:cNvPr id="20" name="Picture 19">
+            <a:extLst>
+              <a:ext uri="{FF2B5EF4-FFF2-40B4-BE49-F238E27FC236}">
+                <a16:creationId xmlns:a16="http://schemas.microsoft.com/office/drawing/2014/main" id="{B0A2A734-17E4-44D5-9630-D54D6AF74664}"/>
+              </a:ext>
+              <a:ext uri="{C183D7F6-B498-43B3-948B-1728B52AA6E4}">
+                <adec:decorative xmlns:adec="http://schemas.microsoft.com/office/drawing/2017/decorative" val="1"/>
+              </a:ext>
+            </a:extLst>
+          </p:cNvPr>
+          <p:cNvPicPr>
+            <a:picLocks noGrp="1" noRot="1" noChangeAspect="1" noMove="1" noResize="1" noEditPoints="1" noAdjustHandles="1" noChangeArrowheads="1" noChangeShapeType="1" noCrop="1"/>
+          </p:cNvPicPr>
+          <p:nvPr>
+            <p:extLst>
+              <p:ext uri="{386F3935-93C4-4BCD-93E2-E3B085C9AB24}">
+                <p16:designElem xmlns:p16="http://schemas.microsoft.com/office/powerpoint/2015/main" val="1"/>
+              </p:ext>
+            </p:extLst>
+          </p:nvPr>
+        </p:nvPicPr>
+        <p:blipFill>
+          <a:blip r:embed="rId3">
+            <a:alphaModFix amt="10000"/>
+            <a:extLst>
+              <a:ext uri="{28A0092B-C50C-407E-A947-70E740481C1C}">
+                <a14:useLocalDpi xmlns:a14="http://schemas.microsoft.com/office/drawing/2010/main" val="0"/>
+              </a:ext>
+            </a:extLst>
+          </a:blip>
+          <a:stretch>
+            <a:fillRect/>
+          </a:stretch>
+        </p:blipFill>
+        <p:spPr>
+          <a:xfrm>
+            <a:off x="0" y="0"/>
+            <a:ext cx="12192000" cy="6858000"/>
+          </a:xfrm>
+          <a:prstGeom prst="rect">
+            <a:avLst/>
+          </a:prstGeom>
+        </p:spPr>
+      </p:pic>
+      <p:sp>
+        <p:nvSpPr>
+          <p:cNvPr id="22" name="Rectangle 21">
+            <a:extLst>
+              <a:ext uri="{FF2B5EF4-FFF2-40B4-BE49-F238E27FC236}">
+                <a16:creationId xmlns:a16="http://schemas.microsoft.com/office/drawing/2014/main" id="{EFFB5C33-24B2-4764-BDBD-4C10A21DB1B4}"/>
+              </a:ext>
+              <a:ext uri="{C183D7F6-B498-43B3-948B-1728B52AA6E4}">
+                <adec:decorative xmlns:adec="http://schemas.microsoft.com/office/drawing/2017/decorative" val="1"/>
+              </a:ext>
+            </a:extLst>
+          </p:cNvPr>
+          <p:cNvSpPr>
+            <a:spLocks noGrp="1" noRot="1" noChangeAspect="1" noMove="1" noResize="1" noEditPoints="1" noAdjustHandles="1" noChangeArrowheads="1" noChangeShapeType="1" noTextEdit="1"/>
+          </p:cNvSpPr>
+          <p:nvPr>
+            <p:extLst>
+              <p:ext uri="{386F3935-93C4-4BCD-93E2-E3B085C9AB24}">
+                <p16:designElem xmlns:p16="http://schemas.microsoft.com/office/powerpoint/2015/main" val="1"/>
+              </p:ext>
+            </p:extLst>
+          </p:nvPr>
+        </p:nvSpPr>
+        <p:spPr>
+          <a:xfrm>
+            <a:off x="8788808" y="0"/>
+            <a:ext cx="3403192" cy="6858000"/>
+          </a:xfrm>
+          <a:prstGeom prst="rect">
+            <a:avLst/>
+          </a:prstGeom>
+          <a:solidFill>
+            <a:schemeClr val="accent1"/>
+          </a:solidFill>
+          <a:ln>
+            <a:noFill/>
+          </a:ln>
+        </p:spPr>
+        <p:style>
+          <a:lnRef idx="2">
+            <a:schemeClr val="accent1">
+              <a:shade val="50000"/>
+            </a:schemeClr>
+          </a:lnRef>
+          <a:fillRef idx="1">
+            <a:schemeClr val="accent1"/>
+          </a:fillRef>
+          <a:effectRef idx="0">
+            <a:schemeClr val="accent1"/>
+          </a:effectRef>
+          <a:fontRef idx="minor">
+            <a:schemeClr val="lt1"/>
+          </a:fontRef>
+        </p:style>
+      </p:sp>
+      <p:pic>
+        <p:nvPicPr>
+          <p:cNvPr id="24" name="Picture 23">
+            <a:extLst>
+              <a:ext uri="{FF2B5EF4-FFF2-40B4-BE49-F238E27FC236}">
+                <a16:creationId xmlns:a16="http://schemas.microsoft.com/office/drawing/2014/main" id="{FEB601E2-EFED-4313-BEE4-9E27B94FC679}"/>
+              </a:ext>
+              <a:ext uri="{C183D7F6-B498-43B3-948B-1728B52AA6E4}">
+                <adec:decorative xmlns:adec="http://schemas.microsoft.com/office/drawing/2017/decorative" val="1"/>
+              </a:ext>
+            </a:extLst>
+          </p:cNvPr>
+          <p:cNvPicPr>
+            <a:picLocks noGrp="1" noRot="1" noChangeAspect="1" noMove="1" noResize="1" noEditPoints="1" noAdjustHandles="1" noChangeArrowheads="1" noChangeShapeType="1" noCrop="1"/>
+          </p:cNvPicPr>
+          <p:nvPr>
+            <p:extLst>
+              <p:ext uri="{386F3935-93C4-4BCD-93E2-E3B085C9AB24}">
+                <p16:designElem xmlns:p16="http://schemas.microsoft.com/office/powerpoint/2015/main" val="1"/>
+              </p:ext>
+            </p:extLst>
+          </p:nvPr>
+        </p:nvPicPr>
+        <p:blipFill>
+          <a:blip r:embed="rId4">
+            <a:extLst>
+              <a:ext uri="{28A0092B-C50C-407E-A947-70E740481C1C}">
+                <a14:useLocalDpi xmlns:a14="http://schemas.microsoft.com/office/drawing/2010/main" val="0"/>
+              </a:ext>
+            </a:extLst>
+          </a:blip>
+          <a:stretch>
+            <a:fillRect/>
+          </a:stretch>
+        </p:blipFill>
+        <p:spPr>
+          <a:xfrm>
+            <a:off x="0" y="4242852"/>
+            <a:ext cx="9110541" cy="246557"/>
+          </a:xfrm>
+          <a:prstGeom prst="rect">
+            <a:avLst/>
+          </a:prstGeom>
+        </p:spPr>
+      </p:pic>
+      <p:sp>
+        <p:nvSpPr>
+          <p:cNvPr id="26" name="Rectangle 25">
+            <a:extLst>
+              <a:ext uri="{FF2B5EF4-FFF2-40B4-BE49-F238E27FC236}">
+                <a16:creationId xmlns:a16="http://schemas.microsoft.com/office/drawing/2014/main" id="{1425DB5A-CEE1-4EE1-8C4A-689E49D3542F}"/>
+              </a:ext>
+              <a:ext uri="{C183D7F6-B498-43B3-948B-1728B52AA6E4}">
+                <adec:decorative xmlns:adec="http://schemas.microsoft.com/office/drawing/2017/decorative" val="1"/>
+              </a:ext>
+            </a:extLst>
+          </p:cNvPr>
+          <p:cNvSpPr>
+            <a:spLocks noGrp="1" noRot="1" noChangeAspect="1" noMove="1" noResize="1" noEditPoints="1" noAdjustHandles="1" noChangeArrowheads="1" noChangeShapeType="1" noTextEdit="1"/>
+          </p:cNvSpPr>
+          <p:nvPr>
+            <p:extLst>
+              <p:ext uri="{386F3935-93C4-4BCD-93E2-E3B085C9AB24}">
+                <p16:designElem xmlns:p16="http://schemas.microsoft.com/office/powerpoint/2015/main" val="1"/>
+              </p:ext>
+            </p:extLst>
+          </p:nvPr>
+        </p:nvSpPr>
+        <p:spPr>
+          <a:xfrm>
+            <a:off x="-1" y="2590078"/>
+            <a:ext cx="9110542" cy="1660332"/>
+          </a:xfrm>
+          <a:prstGeom prst="rect">
+            <a:avLst/>
+          </a:prstGeom>
+          <a:solidFill>
+            <a:srgbClr val="262626"/>
+          </a:solidFill>
+          <a:ln>
+            <a:noFill/>
+          </a:ln>
+        </p:spPr>
+        <p:style>
+          <a:lnRef idx="2">
+            <a:schemeClr val="accent1">
+              <a:shade val="50000"/>
+            </a:schemeClr>
+          </a:lnRef>
+          <a:fillRef idx="1">
+            <a:schemeClr val="accent1"/>
+          </a:fillRef>
+          <a:effectRef idx="0">
+            <a:schemeClr val="accent1"/>
+          </a:effectRef>
+          <a:fontRef idx="minor">
+            <a:schemeClr val="lt1"/>
+          </a:fontRef>
+        </p:style>
+      </p:sp>
       <p:sp>
         <p:nvSpPr>
           <p:cNvPr id="3" name="Title 2">
@@ -13034,16 +14874,24 @@
             <p:ph type="title"/>
           </p:nvPr>
         </p:nvSpPr>
-        <p:spPr/>
+        <p:spPr>
+          <a:xfrm>
+            <a:off x="840510" y="2733709"/>
+            <a:ext cx="7657792" cy="1373070"/>
+          </a:xfrm>
+        </p:spPr>
         <p:txBody>
-          <a:bodyPr>
+          <a:bodyPr vert="horz" lIns="91440" tIns="45720" rIns="91440" bIns="45720" rtlCol="0" anchor="b">
             <a:normAutofit/>
           </a:bodyPr>
           <a:lstStyle/>
           <a:p>
-            <a:r>
-              <a:rPr lang="en-US" sz="3600" dirty="0">
-                <a:latin typeface="Lato" panose="020F0502020204030203"/>
+            <a:pPr algn="r"/>
+            <a:r>
+              <a:rPr lang="en-US" sz="5400" dirty="0">
+                <a:solidFill>
+                  <a:srgbClr val="FFFFFF"/>
+                </a:solidFill>
               </a:rPr>
               <a:t>Appendix</a:t>
             </a:r>
@@ -15384,63 +17232,6 @@
       </p:grpSpPr>
       <p:sp>
         <p:nvSpPr>
-          <p:cNvPr id="8" name="Rectangle 7">
-            <a:extLst>
-              <a:ext uri="{FF2B5EF4-FFF2-40B4-BE49-F238E27FC236}">
-                <a16:creationId xmlns:a16="http://schemas.microsoft.com/office/drawing/2014/main" id="{2F10420F-32EA-4759-B1A9-986EDF27F452}"/>
-              </a:ext>
-              <a:ext uri="{C183D7F6-B498-43B3-948B-1728B52AA6E4}">
-                <adec:decorative xmlns:adec="http://schemas.microsoft.com/office/drawing/2017/decorative" val="1"/>
-              </a:ext>
-            </a:extLst>
-          </p:cNvPr>
-          <p:cNvSpPr/>
-          <p:nvPr/>
-        </p:nvSpPr>
-        <p:spPr>
-          <a:xfrm>
-            <a:off x="0" y="0"/>
-            <a:ext cx="12192000" cy="6858000"/>
-          </a:xfrm>
-          <a:prstGeom prst="rect">
-            <a:avLst/>
-          </a:prstGeom>
-          <a:solidFill>
-            <a:schemeClr val="tx1">
-              <a:alpha val="75000"/>
-            </a:schemeClr>
-          </a:solidFill>
-          <a:ln>
-            <a:noFill/>
-          </a:ln>
-        </p:spPr>
-        <p:style>
-          <a:lnRef idx="2">
-            <a:schemeClr val="accent1">
-              <a:shade val="50000"/>
-            </a:schemeClr>
-          </a:lnRef>
-          <a:fillRef idx="1">
-            <a:schemeClr val="accent1"/>
-          </a:fillRef>
-          <a:effectRef idx="0">
-            <a:schemeClr val="accent1"/>
-          </a:effectRef>
-          <a:fontRef idx="minor">
-            <a:schemeClr val="lt1"/>
-          </a:fontRef>
-        </p:style>
-        <p:txBody>
-          <a:bodyPr rtlCol="0" anchor="ctr"/>
-          <a:lstStyle/>
-          <a:p>
-            <a:pPr algn="ctr"/>
-            <a:endParaRPr lang="en-US" dirty="0"/>
-          </a:p>
-        </p:txBody>
-      </p:sp>
-      <p:sp>
-        <p:nvSpPr>
           <p:cNvPr id="4" name="TextBox 3">
             <a:extLst>
               <a:ext uri="{FF2B5EF4-FFF2-40B4-BE49-F238E27FC236}">
@@ -15453,7 +17244,7 @@
         </p:nvSpPr>
         <p:spPr>
           <a:xfrm>
-            <a:off x="6957476" y="2315237"/>
+            <a:off x="6737415" y="2399397"/>
             <a:ext cx="3623472" cy="486287"/>
           </a:xfrm>
           <a:prstGeom prst="rect">
@@ -15500,7 +17291,7 @@
         </p:nvSpPr>
         <p:spPr>
           <a:xfrm>
-            <a:off x="7004543" y="2972715"/>
+            <a:off x="6737415" y="3075457"/>
             <a:ext cx="4943171" cy="3019609"/>
           </a:xfrm>
           <a:prstGeom prst="rect">
@@ -15647,36 +17438,6 @@
           </a:p>
         </p:txBody>
       </p:sp>
-      <p:pic>
-        <p:nvPicPr>
-          <p:cNvPr id="7" name="Picture 6">
-            <a:extLst>
-              <a:ext uri="{FF2B5EF4-FFF2-40B4-BE49-F238E27FC236}">
-                <a16:creationId xmlns:a16="http://schemas.microsoft.com/office/drawing/2014/main" id="{8402F3A6-D4E9-4D66-86DF-1C07BA872196}"/>
-              </a:ext>
-            </a:extLst>
-          </p:cNvPr>
-          <p:cNvPicPr>
-            <a:picLocks noChangeAspect="1"/>
-          </p:cNvPicPr>
-          <p:nvPr/>
-        </p:nvPicPr>
-        <p:blipFill>
-          <a:blip r:embed="rId3"/>
-          <a:stretch>
-            <a:fillRect/>
-          </a:stretch>
-        </p:blipFill>
-        <p:spPr>
-          <a:xfrm>
-            <a:off x="466898" y="2488275"/>
-            <a:ext cx="3843251" cy="3843251"/>
-          </a:xfrm>
-          <a:prstGeom prst="rect">
-            <a:avLst/>
-          </a:prstGeom>
-        </p:spPr>
-      </p:pic>
       <p:sp>
         <p:nvSpPr>
           <p:cNvPr id="2" name="Slide Number Placeholder 1">
@@ -15730,7 +17491,7 @@
           <p:nvPr/>
         </p:nvPicPr>
         <p:blipFill>
-          <a:blip r:embed="rId4">
+          <a:blip r:embed="rId3">
             <a:duotone>
               <a:schemeClr val="accent1">
                 <a:shade val="45000"/>
@@ -15747,6 +17508,36 @@
           <a:xfrm>
             <a:off x="10905565" y="6371074"/>
             <a:ext cx="1174656" cy="361010"/>
+          </a:xfrm>
+          <a:prstGeom prst="rect">
+            <a:avLst/>
+          </a:prstGeom>
+        </p:spPr>
+      </p:pic>
+      <p:pic>
+        <p:nvPicPr>
+          <p:cNvPr id="3" name="Picture 2">
+            <a:extLst>
+              <a:ext uri="{FF2B5EF4-FFF2-40B4-BE49-F238E27FC236}">
+                <a16:creationId xmlns:a16="http://schemas.microsoft.com/office/drawing/2014/main" id="{489A08E8-AB85-4EC7-B919-A645CE584844}"/>
+              </a:ext>
+            </a:extLst>
+          </p:cNvPr>
+          <p:cNvPicPr>
+            <a:picLocks noChangeAspect="1"/>
+          </p:cNvPicPr>
+          <p:nvPr/>
+        </p:nvPicPr>
+        <p:blipFill>
+          <a:blip r:embed="rId4"/>
+          <a:stretch>
+            <a:fillRect/>
+          </a:stretch>
+        </p:blipFill>
+        <p:spPr>
+          <a:xfrm>
+            <a:off x="600186" y="2399397"/>
+            <a:ext cx="3840813" cy="3846909"/>
           </a:xfrm>
           <a:prstGeom prst="rect">
             <a:avLst/>
@@ -15958,7 +17749,7 @@
         </p:nvSpPr>
         <p:spPr>
           <a:xfrm>
-            <a:off x="0" y="0"/>
+            <a:off x="133564" y="164386"/>
             <a:ext cx="10515600" cy="656851"/>
           </a:xfrm>
         </p:spPr>
@@ -15973,7 +17764,7 @@
                 </a:solidFill>
                 <a:latin typeface="Lato" panose="020F0502020204030203"/>
               </a:rPr>
-              <a:t>TOC</a:t>
+              <a:t>Table Of Contents</a:t>
             </a:r>
           </a:p>
         </p:txBody>
@@ -16121,7 +17912,7 @@
                 </a:solidFill>
                 <a:latin typeface="Lato" panose="020F0502020204030203"/>
               </a:rPr>
-              <a:t>Plot of Investors by State</a:t>
+              <a:t>Plot of Investors by State &amp; City</a:t>
             </a:r>
           </a:p>
           <a:p>
@@ -16246,7 +18037,7 @@
           <p:nvPr/>
         </p:nvPicPr>
         <p:blipFill>
-          <a:blip r:embed="rId2">
+          <a:blip r:embed="rId3">
             <a:duotone>
               <a:schemeClr val="accent1">
                 <a:shade val="45000"/>
@@ -16451,7 +18242,7 @@
         </p:nvSpPr>
         <p:spPr>
           <a:xfrm>
-            <a:off x="0" y="0"/>
+            <a:off x="242923" y="254845"/>
             <a:ext cx="10515600" cy="697193"/>
           </a:xfrm>
         </p:spPr>
@@ -16548,23 +18339,8 @@
                 </a:solidFill>
                 <a:latin typeface="Lato" panose="020F0502020204030203"/>
               </a:rPr>
-              <a:t>After we had some observations, we cleaned this data utilizing a combination of pandas and </a:t>
-            </a:r>
-            <a:r>
-              <a:rPr lang="en-US" sz="2400" dirty="0" err="1">
-                <a:solidFill>
-                  <a:srgbClr val="000000"/>
-                </a:solidFill>
-                <a:latin typeface="Lato" panose="020F0502020204030203"/>
-              </a:rPr>
-              <a:t>xls</a:t>
-            </a:r>
-            <a:endParaRPr lang="en-US" sz="2400" dirty="0">
-              <a:solidFill>
-                <a:srgbClr val="000000"/>
-              </a:solidFill>
-              <a:latin typeface="Lato" panose="020F0502020204030203"/>
-            </a:endParaRPr>
+              <a:t>After we had some observations, we cleaned this data utilizing a combination of pandas and excel</a:t>
+            </a:r>
           </a:p>
           <a:p>
             <a:pPr marL="742950" indent="-285750" fontAlgn="base">
@@ -16581,7 +18357,25 @@
                 </a:solidFill>
                 <a:latin typeface="Lato" panose="020F0502020204030203"/>
               </a:rPr>
-              <a:t>We then pulled in weather data from weather </a:t>
+              <a:t>We then pulled in weather data from </a:t>
+            </a:r>
+            <a:r>
+              <a:rPr lang="en-US" sz="2400" dirty="0" err="1">
+                <a:solidFill>
+                  <a:srgbClr val="000000"/>
+                </a:solidFill>
+                <a:latin typeface="Lato" panose="020F0502020204030203"/>
+              </a:rPr>
+              <a:t>openweathermap</a:t>
+            </a:r>
+            <a:r>
+              <a:rPr lang="en-US" sz="2400" dirty="0">
+                <a:solidFill>
+                  <a:srgbClr val="000000"/>
+                </a:solidFill>
+                <a:latin typeface="Lato" panose="020F0502020204030203"/>
+              </a:rPr>
+              <a:t> </a:t>
             </a:r>
             <a:r>
               <a:rPr lang="en-US" sz="2400" dirty="0" err="1">
@@ -16878,7 +18672,7 @@
         </p:nvSpPr>
         <p:spPr>
           <a:xfrm>
-            <a:off x="0" y="0"/>
+            <a:off x="154112" y="102741"/>
             <a:ext cx="10515600" cy="724087"/>
           </a:xfrm>
         </p:spPr>
@@ -16911,8 +18705,8 @@
         </p:nvSpPr>
         <p:spPr>
           <a:xfrm>
-            <a:off x="0" y="537833"/>
-            <a:ext cx="12080221" cy="6401753"/>
+            <a:off x="0" y="915013"/>
+            <a:ext cx="12080221" cy="5601533"/>
           </a:xfrm>
           <a:prstGeom prst="rect">
             <a:avLst/>
@@ -16932,7 +18726,7 @@
               <a:buChar char="•"/>
             </a:pPr>
             <a:r>
-              <a:rPr lang="en-US" sz="2400" dirty="0">
+              <a:rPr lang="en-US" sz="2200" dirty="0">
                 <a:solidFill>
                   <a:srgbClr val="000000"/>
                 </a:solidFill>
@@ -16950,7 +18744,7 @@
               <a:buChar char="•"/>
             </a:pPr>
             <a:r>
-              <a:rPr lang="en-US" sz="2400" dirty="0">
+              <a:rPr lang="en-US" sz="2200" dirty="0">
                 <a:solidFill>
                   <a:srgbClr val="000000"/>
                 </a:solidFill>
@@ -16968,7 +18762,7 @@
               <a:buChar char="•"/>
             </a:pPr>
             <a:r>
-              <a:rPr lang="en-US" sz="2400" dirty="0">
+              <a:rPr lang="en-US" sz="2200" dirty="0">
                 <a:solidFill>
                   <a:srgbClr val="000000"/>
                 </a:solidFill>
@@ -16986,7 +18780,7 @@
               <a:buChar char="•"/>
             </a:pPr>
             <a:r>
-              <a:rPr lang="en-US" sz="2400" dirty="0">
+              <a:rPr lang="en-US" sz="2200" dirty="0">
                 <a:solidFill>
                   <a:srgbClr val="000000"/>
                 </a:solidFill>
@@ -17004,7 +18798,7 @@
               <a:buChar char="•"/>
             </a:pPr>
             <a:r>
-              <a:rPr lang="en-US" sz="2400" dirty="0">
+              <a:rPr lang="en-US" sz="2200" dirty="0">
                 <a:solidFill>
                   <a:srgbClr val="000000"/>
                 </a:solidFill>
@@ -17022,7 +18816,7 @@
               <a:buChar char="•"/>
             </a:pPr>
             <a:r>
-              <a:rPr lang="en-US" sz="2400" dirty="0">
+              <a:rPr lang="en-US" sz="2200" dirty="0">
                 <a:solidFill>
                   <a:srgbClr val="000000"/>
                 </a:solidFill>
@@ -17253,7 +19047,7 @@
         </p:nvSpPr>
         <p:spPr>
           <a:xfrm>
-            <a:off x="0" y="6125"/>
+            <a:off x="0" y="50088"/>
             <a:ext cx="11953701" cy="631670"/>
           </a:xfrm>
         </p:spPr>
@@ -17297,7 +19091,7 @@
         </p:blipFill>
         <p:spPr>
           <a:xfrm>
-            <a:off x="3228731" y="675497"/>
+            <a:off x="3228731" y="694151"/>
             <a:ext cx="7513061" cy="3028826"/>
           </a:xfrm>
           <a:prstGeom prst="rect">
@@ -17327,7 +19121,7 @@
         </p:blipFill>
         <p:spPr>
           <a:xfrm>
-            <a:off x="3228732" y="3748149"/>
+            <a:off x="3228731" y="3742025"/>
             <a:ext cx="7513061" cy="3028826"/>
           </a:xfrm>
           <a:prstGeom prst="rect">
@@ -17707,7 +19501,7 @@
         </p:nvSpPr>
         <p:spPr>
           <a:xfrm>
-            <a:off x="0" y="0"/>
+            <a:off x="0" y="123216"/>
             <a:ext cx="11953701" cy="652181"/>
           </a:xfrm>
         </p:spPr>
@@ -18163,7 +19957,7 @@
         </p:nvSpPr>
         <p:spPr>
           <a:xfrm>
-            <a:off x="0" y="0"/>
+            <a:off x="126520" y="125916"/>
             <a:ext cx="11953701" cy="591670"/>
           </a:xfrm>
         </p:spPr>
@@ -18174,7 +19968,7 @@
           <a:lstStyle/>
           <a:p>
             <a:r>
-              <a:rPr lang="en-US">
+              <a:rPr lang="en-US" dirty="0">
                 <a:solidFill>
                   <a:schemeClr val="bg1"/>
                 </a:solidFill>
@@ -18182,12 +19976,6 @@
               </a:rPr>
               <a:t>Investment by Category</a:t>
             </a:r>
-            <a:endParaRPr lang="en-US" dirty="0">
-              <a:solidFill>
-                <a:schemeClr val="bg1"/>
-              </a:solidFill>
-              <a:latin typeface="Lato" panose="020F0502020204030203"/>
-            </a:endParaRPr>
           </a:p>
         </p:txBody>
       </p:sp>

</xml_diff>

<commit_message>
new slides for don
</commit_message>
<xml_diff>
--- a/Presentation/GiterDun Presentation.pptx
+++ b/Presentation/GiterDun Presentation.pptx
@@ -814,7 +814,7 @@
           <a:p>
             <a:fld id="{69685EF1-E703-46DB-B8E6-B1636C21AD63}" type="datetimeFigureOut">
               <a:rPr lang="en-US" smtClean="0"/>
-              <a:t>9/11/2019</a:t>
+              <a:t>9/12/19</a:t>
             </a:fld>
             <a:endParaRPr lang="en-US"/>
           </a:p>
@@ -10032,7 +10032,7 @@
                 </a:solidFill>
                 <a:latin typeface="Lato" panose="020F0502020204030203"/>
               </a:rPr>
-              <a:t>We have observed that the east dominates throughout the years, with more funding into its companies.</a:t>
+              <a:t>We have observed that the as expected the west dominates throughout the years, with more funding into its companies.</a:t>
             </a:r>
           </a:p>
         </p:txBody>

</xml_diff>

<commit_message>
overlay look for east/west fig
</commit_message>
<xml_diff>
--- a/Presentation/GiterDun Presentation.pptx
+++ b/Presentation/GiterDun Presentation.pptx
@@ -10211,10 +10211,10 @@
       </p:sp>
       <p:pic>
         <p:nvPicPr>
-          <p:cNvPr id="6" name="Picture 5">
+          <p:cNvPr id="4" name="Picture 3">
             <a:extLst>
               <a:ext uri="{FF2B5EF4-FFF2-40B4-BE49-F238E27FC236}">
-                <a16:creationId xmlns:a16="http://schemas.microsoft.com/office/drawing/2014/main" id="{C07E5AE7-1D7E-0F43-9130-CB3FF8E31491}"/>
+                <a16:creationId xmlns:a16="http://schemas.microsoft.com/office/drawing/2014/main" id="{1686BF26-A0EF-E845-AC45-D52C16A4CA23}"/>
               </a:ext>
             </a:extLst>
           </p:cNvPr>
@@ -10231,8 +10231,8 @@
         </p:blipFill>
         <p:spPr>
           <a:xfrm>
-            <a:off x="5199017" y="805067"/>
-            <a:ext cx="6493675" cy="5566007"/>
+            <a:off x="5408023" y="933287"/>
+            <a:ext cx="6274903" cy="5378488"/>
           </a:xfrm>
           <a:prstGeom prst="rect">
             <a:avLst/>

</xml_diff>